<commit_message>
Add negative test for ConvertToTooltip.
</commit_message>
<xml_diff>
--- a/doc/test/TooltipsLab/ConvertToTooltip.pptx
+++ b/doc/test/TooltipsLab/ConvertToTooltip.pptx
@@ -7,18 +7,21 @@
     <p:sldMasterId id="2147483672" r:id="rId3"/>
   </p:sldMasterIdLst>
   <p:notesMasterIdLst>
-    <p:notesMasterId r:id="rId13"/>
+    <p:notesMasterId r:id="rId16"/>
   </p:notesMasterIdLst>
   <p:sldIdLst>
     <p:sldId id="287" r:id="rId4"/>
     <p:sldId id="256" r:id="rId5"/>
     <p:sldId id="292" r:id="rId6"/>
-    <p:sldId id="306" r:id="rId7"/>
-    <p:sldId id="319" r:id="rId8"/>
-    <p:sldId id="315" r:id="rId9"/>
-    <p:sldId id="333" r:id="rId10"/>
-    <p:sldId id="334" r:id="rId11"/>
-    <p:sldId id="305" r:id="rId12"/>
+    <p:sldId id="337" r:id="rId7"/>
+    <p:sldId id="338" r:id="rId8"/>
+    <p:sldId id="336" r:id="rId9"/>
+    <p:sldId id="306" r:id="rId10"/>
+    <p:sldId id="319" r:id="rId11"/>
+    <p:sldId id="315" r:id="rId12"/>
+    <p:sldId id="333" r:id="rId13"/>
+    <p:sldId id="334" r:id="rId14"/>
+    <p:sldId id="305" r:id="rId15"/>
   </p:sldIdLst>
   <p:sldSz cx="9144000" cy="6858000" type="screen4x3"/>
   <p:notesSz cx="6858000" cy="9144000"/>
@@ -129,6 +132,9 @@
           <p14:sldIdLst>
             <p14:sldId id="256"/>
             <p14:sldId id="292"/>
+            <p14:sldId id="337"/>
+            <p14:sldId id="338"/>
+            <p14:sldId id="336"/>
             <p14:sldId id="306"/>
             <p14:sldId id="319"/>
             <p14:sldId id="315"/>
@@ -9510,1016 +9516,7 @@
 </p:sld>
 </file>
 
-<file path=ppt/slides/slide2.xml><?xml version="1.0" encoding="utf-8"?>
-<p:sld xmlns:a="http://schemas.openxmlformats.org/drawingml/2006/main" xmlns:r="http://schemas.openxmlformats.org/officeDocument/2006/relationships" xmlns:p="http://schemas.openxmlformats.org/presentationml/2006/main">
-  <p:cSld>
-    <p:bg>
-      <p:bgPr>
-        <a:solidFill>
-          <a:srgbClr val="E46C0A"/>
-        </a:solidFill>
-        <a:effectLst/>
-      </p:bgPr>
-    </p:bg>
-    <p:spTree>
-      <p:nvGrpSpPr>
-        <p:cNvPr id="1" name=""/>
-        <p:cNvGrpSpPr/>
-        <p:nvPr/>
-      </p:nvGrpSpPr>
-      <p:grpSpPr>
-        <a:xfrm>
-          <a:off x="0" y="0"/>
-          <a:ext cx="0" cy="0"/>
-          <a:chOff x="0" y="0"/>
-          <a:chExt cx="0" cy="0"/>
-        </a:xfrm>
-      </p:grpSpPr>
-      <p:sp>
-        <p:nvSpPr>
-          <p:cNvPr id="2" name="Title 1"/>
-          <p:cNvSpPr>
-            <a:spLocks noGrp="1"/>
-          </p:cNvSpPr>
-          <p:nvPr>
-            <p:ph type="title"/>
-          </p:nvPr>
-        </p:nvSpPr>
-        <p:spPr>
-          <a:xfrm>
-            <a:off x="381000" y="609600"/>
-            <a:ext cx="8229600" cy="1143000"/>
-          </a:xfrm>
-          <a:solidFill>
-            <a:srgbClr val="E46C0A"/>
-          </a:solidFill>
-        </p:spPr>
-        <p:txBody>
-          <a:bodyPr>
-            <a:noAutofit/>
-          </a:bodyPr>
-          <a:lstStyle/>
-          <a:p>
-            <a:pPr algn="l"/>
-            <a:r>
-              <a:rPr lang="en-US" sz="7200" dirty="0">
-                <a:solidFill>
-                  <a:schemeClr val="bg1"/>
-                </a:solidFill>
-              </a:rPr>
-              <a:t>Convert Shapes To Tooltip</a:t>
-            </a:r>
-            <a:endParaRPr lang="en-SG" sz="7200" dirty="0">
-              <a:solidFill>
-                <a:schemeClr val="bg1"/>
-              </a:solidFill>
-            </a:endParaRPr>
-          </a:p>
-        </p:txBody>
-      </p:sp>
-    </p:spTree>
-    <p:extLst>
-      <p:ext uri="{BB962C8B-B14F-4D97-AF65-F5344CB8AC3E}">
-        <p14:creationId xmlns:p14="http://schemas.microsoft.com/office/powerpoint/2010/main" val="1569131388"/>
-      </p:ext>
-    </p:extLst>
-  </p:cSld>
-  <p:clrMapOvr>
-    <a:masterClrMapping/>
-  </p:clrMapOvr>
-</p:sld>
-</file>
-
-<file path=ppt/slides/slide3.xml><?xml version="1.0" encoding="utf-8"?>
-<p:sld xmlns:a="http://schemas.openxmlformats.org/drawingml/2006/main" xmlns:r="http://schemas.openxmlformats.org/officeDocument/2006/relationships" xmlns:p="http://schemas.openxmlformats.org/presentationml/2006/main">
-  <p:cSld>
-    <p:bg>
-      <p:bgPr>
-        <a:solidFill>
-          <a:srgbClr val="0070BF"/>
-        </a:solidFill>
-        <a:effectLst/>
-      </p:bgPr>
-    </p:bg>
-    <p:spTree>
-      <p:nvGrpSpPr>
-        <p:cNvPr id="1" name=""/>
-        <p:cNvGrpSpPr/>
-        <p:nvPr/>
-      </p:nvGrpSpPr>
-      <p:grpSpPr>
-        <a:xfrm>
-          <a:off x="0" y="0"/>
-          <a:ext cx="0" cy="0"/>
-          <a:chOff x="0" y="0"/>
-          <a:chExt cx="0" cy="0"/>
-        </a:xfrm>
-      </p:grpSpPr>
-      <p:sp>
-        <p:nvSpPr>
-          <p:cNvPr id="2" name="Title 1"/>
-          <p:cNvSpPr>
-            <a:spLocks noGrp="1"/>
-          </p:cNvSpPr>
-          <p:nvPr>
-            <p:ph type="title"/>
-          </p:nvPr>
-        </p:nvSpPr>
-        <p:spPr>
-          <a:solidFill>
-            <a:srgbClr val="0070BF"/>
-          </a:solidFill>
-        </p:spPr>
-        <p:txBody>
-          <a:bodyPr/>
-          <a:lstStyle/>
-          <a:p>
-            <a:r>
-              <a:rPr lang="en-US" dirty="0"/>
-              <a:t>Convert Shapes To Tooltip: Two shapes</a:t>
-            </a:r>
-            <a:endParaRPr lang="en-SG" dirty="0"/>
-          </a:p>
-        </p:txBody>
-      </p:sp>
-      <p:sp>
-        <p:nvSpPr>
-          <p:cNvPr id="4" name="Content Placeholder 2"/>
-          <p:cNvSpPr>
-            <a:spLocks noGrp="1"/>
-          </p:cNvSpPr>
-          <p:nvPr>
-            <p:ph idx="1"/>
-          </p:nvPr>
-        </p:nvSpPr>
-        <p:spPr>
-          <a:xfrm>
-            <a:off x="457200" y="3124200"/>
-            <a:ext cx="8229600" cy="3001963"/>
-          </a:xfrm>
-        </p:spPr>
-        <p:txBody>
-          <a:bodyPr/>
-          <a:lstStyle/>
-          <a:p>
-            <a:r>
-              <a:rPr lang="en-US" dirty="0"/>
-              <a:t>Select trigger</a:t>
-            </a:r>
-          </a:p>
-          <a:p>
-            <a:r>
-              <a:rPr lang="en-US" dirty="0"/>
-              <a:t>Select callout</a:t>
-            </a:r>
-          </a:p>
-          <a:p>
-            <a:r>
-              <a:rPr lang="en-US" dirty="0"/>
-              <a:t>Click ‘Convert Shapes to Tooltip’</a:t>
-            </a:r>
-            <a:endParaRPr lang="en-SG" dirty="0"/>
-          </a:p>
-        </p:txBody>
-      </p:sp>
-    </p:spTree>
-    <p:extLst>
-      <p:ext uri="{BB962C8B-B14F-4D97-AF65-F5344CB8AC3E}">
-        <p14:creationId xmlns:p14="http://schemas.microsoft.com/office/powerpoint/2010/main" val="1286891872"/>
-      </p:ext>
-    </p:extLst>
-  </p:cSld>
-  <p:clrMapOvr>
-    <a:masterClrMapping/>
-  </p:clrMapOvr>
-</p:sld>
-</file>
-
-<file path=ppt/slides/slide4.xml><?xml version="1.0" encoding="utf-8"?>
-<p:sld xmlns:a="http://schemas.openxmlformats.org/drawingml/2006/main" xmlns:r="http://schemas.openxmlformats.org/officeDocument/2006/relationships" xmlns:p="http://schemas.openxmlformats.org/presentationml/2006/main">
-  <p:cSld>
-    <p:spTree>
-      <p:nvGrpSpPr>
-        <p:cNvPr id="1" name=""/>
-        <p:cNvGrpSpPr/>
-        <p:nvPr/>
-      </p:nvGrpSpPr>
-      <p:grpSpPr>
-        <a:xfrm>
-          <a:off x="0" y="0"/>
-          <a:ext cx="0" cy="0"/>
-          <a:chOff x="0" y="0"/>
-          <a:chExt cx="0" cy="0"/>
-        </a:xfrm>
-      </p:grpSpPr>
-      <p:sp>
-        <p:nvSpPr>
-          <p:cNvPr id="2" name="Trigger">
-            <a:extLst>
-              <a:ext uri="{FF2B5EF4-FFF2-40B4-BE49-F238E27FC236}">
-                <a16:creationId xmlns:a16="http://schemas.microsoft.com/office/drawing/2014/main" id="{015139AA-208E-41A9-9E9D-0FBF9B27A0E4}"/>
-              </a:ext>
-            </a:extLst>
-          </p:cNvPr>
-          <p:cNvSpPr/>
-          <p:nvPr/>
-        </p:nvSpPr>
-        <p:spPr>
-          <a:xfrm>
-            <a:off x="1600200" y="3733800"/>
-            <a:ext cx="1219200" cy="1219200"/>
-          </a:xfrm>
-          <a:prstGeom prst="ellipse">
-            <a:avLst/>
-          </a:prstGeom>
-        </p:spPr>
-        <p:style>
-          <a:lnRef idx="2">
-            <a:schemeClr val="accent1">
-              <a:shade val="50000"/>
-            </a:schemeClr>
-          </a:lnRef>
-          <a:fillRef idx="1">
-            <a:schemeClr val="accent1"/>
-          </a:fillRef>
-          <a:effectRef idx="0">
-            <a:schemeClr val="accent1"/>
-          </a:effectRef>
-          <a:fontRef idx="minor">
-            <a:schemeClr val="lt1"/>
-          </a:fontRef>
-        </p:style>
-        <p:txBody>
-          <a:bodyPr rtlCol="0" anchor="ctr"/>
-          <a:lstStyle/>
-          <a:p>
-            <a:pPr algn="ctr"/>
-            <a:r>
-              <a:rPr lang="en-US" dirty="0"/>
-              <a:t>Trigger</a:t>
-            </a:r>
-          </a:p>
-        </p:txBody>
-      </p:sp>
-      <p:sp>
-        <p:nvSpPr>
-          <p:cNvPr id="5" name="Callout">
-            <a:extLst>
-              <a:ext uri="{FF2B5EF4-FFF2-40B4-BE49-F238E27FC236}">
-                <a16:creationId xmlns:a16="http://schemas.microsoft.com/office/drawing/2014/main" id="{FA930241-05A7-4CEA-829A-96FA333C6D11}"/>
-              </a:ext>
-            </a:extLst>
-          </p:cNvPr>
-          <p:cNvSpPr/>
-          <p:nvPr/>
-        </p:nvSpPr>
-        <p:spPr>
-          <a:xfrm>
-            <a:off x="1866900" y="2209800"/>
-            <a:ext cx="1905000" cy="1270000"/>
-          </a:xfrm>
-          <a:prstGeom prst="wedgeRoundRectCallout">
-            <a:avLst/>
-          </a:prstGeom>
-          <a:solidFill>
-            <a:srgbClr val="000000">
-              <a:alpha val="80000"/>
-            </a:srgbClr>
-          </a:solidFill>
-          <a:ln w="635">
-            <a:solidFill>
-              <a:srgbClr val="FFFF00"/>
-            </a:solidFill>
-          </a:ln>
-          <a:effectLst>
-            <a:outerShdw blurRad="63500" sx="102000" sy="102000" algn="ctr">
-              <a:prstClr val="black">
-                <a:alpha val="40000"/>
-              </a:prstClr>
-            </a:outerShdw>
-          </a:effectLst>
-        </p:spPr>
-        <p:style>
-          <a:lnRef idx="2">
-            <a:schemeClr val="accent1">
-              <a:shade val="50000"/>
-            </a:schemeClr>
-          </a:lnRef>
-          <a:fillRef idx="1">
-            <a:schemeClr val="accent1"/>
-          </a:fillRef>
-          <a:effectRef idx="0">
-            <a:schemeClr val="accent1"/>
-          </a:effectRef>
-          <a:fontRef idx="minor">
-            <a:schemeClr val="lt1"/>
-          </a:fontRef>
-        </p:style>
-        <p:txBody>
-          <a:bodyPr rtlCol="0" anchor="ctr">
-            <a:normAutofit/>
-          </a:bodyPr>
-          <a:lstStyle/>
-          <a:p>
-            <a:pPr algn="ctr"/>
-            <a:r>
-              <a:rPr lang="en-SG" sz="1600" dirty="0">
-                <a:solidFill>
-                  <a:srgbClr val="FFFFFF"/>
-                </a:solidFill>
-              </a:rPr>
-              <a:t>Callout</a:t>
-            </a:r>
-          </a:p>
-        </p:txBody>
-      </p:sp>
-    </p:spTree>
-    <p:extLst>
-      <p:ext uri="{BB962C8B-B14F-4D97-AF65-F5344CB8AC3E}">
-        <p14:creationId xmlns:p14="http://schemas.microsoft.com/office/powerpoint/2010/main" val="2029890964"/>
-      </p:ext>
-    </p:extLst>
-  </p:cSld>
-  <p:clrMapOvr>
-    <a:masterClrMapping/>
-  </p:clrMapOvr>
-  <p:timing>
-    <p:tnLst>
-      <p:par>
-        <p:cTn id="1" dur="indefinite" restart="never" nodeType="tmRoot">
-          <p:childTnLst>
-            <p:seq concurrent="1" nextAc="seek">
-              <p:cTn id="2" dur="indefinite" nodeType="mainSeq">
-                <p:childTnLst>
-                  <p:par>
-                    <p:cTn id="3" fill="hold">
-                      <p:stCondLst>
-                        <p:cond delay="indefinite"/>
-                      </p:stCondLst>
-                      <p:childTnLst>
-                        <p:par>
-                          <p:cTn id="4" fill="hold">
-                            <p:stCondLst>
-                              <p:cond delay="0"/>
-                            </p:stCondLst>
-                            <p:childTnLst>
-                              <p:par>
-                                <p:cTn id="5" presetID="10" presetClass="entr" presetSubtype="0" fill="hold" grpId="0" nodeType="clickEffect">
-                                  <p:stCondLst>
-                                    <p:cond delay="0"/>
-                                  </p:stCondLst>
-                                  <p:childTnLst>
-                                    <p:set>
-                                      <p:cBhvr>
-                                        <p:cTn id="6" dur="1" fill="hold">
-                                          <p:stCondLst>
-                                            <p:cond delay="0"/>
-                                          </p:stCondLst>
-                                        </p:cTn>
-                                        <p:tgtEl>
-                                          <p:spTgt spid="5"/>
-                                        </p:tgtEl>
-                                        <p:attrNameLst>
-                                          <p:attrName>style.visibility</p:attrName>
-                                        </p:attrNameLst>
-                                      </p:cBhvr>
-                                      <p:to>
-                                        <p:strVal val="visible"/>
-                                      </p:to>
-                                    </p:set>
-                                    <p:animEffect transition="in" filter="fade">
-                                      <p:cBhvr>
-                                        <p:cTn id="7" dur="500"/>
-                                        <p:tgtEl>
-                                          <p:spTgt spid="5"/>
-                                        </p:tgtEl>
-                                      </p:cBhvr>
-                                    </p:animEffect>
-                                  </p:childTnLst>
-                                </p:cTn>
-                              </p:par>
-                            </p:childTnLst>
-                          </p:cTn>
-                        </p:par>
-                      </p:childTnLst>
-                    </p:cTn>
-                  </p:par>
-                  <p:par>
-                    <p:cTn id="8" fill="hold">
-                      <p:stCondLst>
-                        <p:cond delay="indefinite"/>
-                      </p:stCondLst>
-                      <p:childTnLst>
-                        <p:par>
-                          <p:cTn id="9" fill="hold">
-                            <p:stCondLst>
-                              <p:cond delay="0"/>
-                            </p:stCondLst>
-                            <p:childTnLst>
-                              <p:par>
-                                <p:cTn id="10" presetID="10" presetClass="exit" presetSubtype="0" fill="hold" grpId="1" nodeType="clickEffect">
-                                  <p:stCondLst>
-                                    <p:cond delay="0"/>
-                                  </p:stCondLst>
-                                  <p:childTnLst>
-                                    <p:animEffect transition="out" filter="fade">
-                                      <p:cBhvr>
-                                        <p:cTn id="11" dur="500"/>
-                                        <p:tgtEl>
-                                          <p:spTgt spid="5"/>
-                                        </p:tgtEl>
-                                      </p:cBhvr>
-                                    </p:animEffect>
-                                    <p:set>
-                                      <p:cBhvr>
-                                        <p:cTn id="12" dur="1" fill="hold">
-                                          <p:stCondLst>
-                                            <p:cond delay="499"/>
-                                          </p:stCondLst>
-                                        </p:cTn>
-                                        <p:tgtEl>
-                                          <p:spTgt spid="5"/>
-                                        </p:tgtEl>
-                                        <p:attrNameLst>
-                                          <p:attrName>style.visibility</p:attrName>
-                                        </p:attrNameLst>
-                                      </p:cBhvr>
-                                      <p:to>
-                                        <p:strVal val="hidden"/>
-                                      </p:to>
-                                    </p:set>
-                                  </p:childTnLst>
-                                </p:cTn>
-                              </p:par>
-                            </p:childTnLst>
-                          </p:cTn>
-                        </p:par>
-                      </p:childTnLst>
-                    </p:cTn>
-                  </p:par>
-                </p:childTnLst>
-              </p:cTn>
-              <p:prevCondLst>
-                <p:cond evt="onPrev" delay="0">
-                  <p:tgtEl>
-                    <p:sldTgt/>
-                  </p:tgtEl>
-                </p:cond>
-              </p:prevCondLst>
-              <p:nextCondLst>
-                <p:cond evt="onNext" delay="0">
-                  <p:tgtEl>
-                    <p:sldTgt/>
-                  </p:tgtEl>
-                </p:cond>
-              </p:nextCondLst>
-            </p:seq>
-          </p:childTnLst>
-        </p:cTn>
-      </p:par>
-    </p:tnLst>
-    <p:bldLst>
-      <p:bldP spid="5" grpId="0" animBg="1"/>
-      <p:bldP spid="5" grpId="1" animBg="1"/>
-    </p:bldLst>
-  </p:timing>
-</p:sld>
-</file>
-
-<file path=ppt/slides/slide5.xml><?xml version="1.0" encoding="utf-8"?>
-<p:sld xmlns:a="http://schemas.openxmlformats.org/drawingml/2006/main" xmlns:r="http://schemas.openxmlformats.org/officeDocument/2006/relationships" xmlns:p="http://schemas.openxmlformats.org/presentationml/2006/main">
-  <p:cSld>
-    <p:spTree>
-      <p:nvGrpSpPr>
-        <p:cNvPr id="1" name=""/>
-        <p:cNvGrpSpPr/>
-        <p:nvPr/>
-      </p:nvGrpSpPr>
-      <p:grpSpPr>
-        <a:xfrm>
-          <a:off x="0" y="0"/>
-          <a:ext cx="0" cy="0"/>
-          <a:chOff x="0" y="0"/>
-          <a:chExt cx="0" cy="0"/>
-        </a:xfrm>
-      </p:grpSpPr>
-      <p:sp>
-        <p:nvSpPr>
-          <p:cNvPr id="4" name="Trigger">
-            <a:extLst>
-              <a:ext uri="{FF2B5EF4-FFF2-40B4-BE49-F238E27FC236}">
-                <a16:creationId xmlns:a16="http://schemas.microsoft.com/office/drawing/2014/main" id="{B576714E-36F2-4FCC-9365-7AAC0983AB5F}"/>
-              </a:ext>
-            </a:extLst>
-          </p:cNvPr>
-          <p:cNvSpPr/>
-          <p:nvPr/>
-        </p:nvSpPr>
-        <p:spPr>
-          <a:xfrm>
-            <a:off x="1600200" y="3733800"/>
-            <a:ext cx="1219200" cy="1219200"/>
-          </a:xfrm>
-          <a:prstGeom prst="ellipse">
-            <a:avLst/>
-          </a:prstGeom>
-        </p:spPr>
-        <p:style>
-          <a:lnRef idx="2">
-            <a:schemeClr val="accent1">
-              <a:shade val="50000"/>
-            </a:schemeClr>
-          </a:lnRef>
-          <a:fillRef idx="1">
-            <a:schemeClr val="accent1"/>
-          </a:fillRef>
-          <a:effectRef idx="0">
-            <a:schemeClr val="accent1"/>
-          </a:effectRef>
-          <a:fontRef idx="minor">
-            <a:schemeClr val="lt1"/>
-          </a:fontRef>
-        </p:style>
-        <p:txBody>
-          <a:bodyPr rtlCol="0" anchor="ctr"/>
-          <a:lstStyle/>
-          <a:p>
-            <a:pPr algn="ctr"/>
-            <a:r>
-              <a:rPr lang="en-US" dirty="0"/>
-              <a:t>Trigger</a:t>
-            </a:r>
-          </a:p>
-        </p:txBody>
-      </p:sp>
-      <p:sp>
-        <p:nvSpPr>
-          <p:cNvPr id="5" name="Callout">
-            <a:extLst>
-              <a:ext uri="{FF2B5EF4-FFF2-40B4-BE49-F238E27FC236}">
-                <a16:creationId xmlns:a16="http://schemas.microsoft.com/office/drawing/2014/main" id="{FABB3E41-1653-4277-BE7E-D96C61AAF553}"/>
-              </a:ext>
-            </a:extLst>
-          </p:cNvPr>
-          <p:cNvSpPr/>
-          <p:nvPr/>
-        </p:nvSpPr>
-        <p:spPr>
-          <a:xfrm>
-            <a:off x="1866900" y="2209800"/>
-            <a:ext cx="1905000" cy="1270000"/>
-          </a:xfrm>
-          <a:prstGeom prst="wedgeRoundRectCallout">
-            <a:avLst/>
-          </a:prstGeom>
-          <a:solidFill>
-            <a:srgbClr val="000000">
-              <a:alpha val="80000"/>
-            </a:srgbClr>
-          </a:solidFill>
-          <a:ln w="635">
-            <a:solidFill>
-              <a:srgbClr val="FFFF00"/>
-            </a:solidFill>
-          </a:ln>
-          <a:effectLst>
-            <a:outerShdw blurRad="63500" sx="102000" sy="102000" algn="ctr">
-              <a:prstClr val="black">
-                <a:alpha val="40000"/>
-              </a:prstClr>
-            </a:outerShdw>
-          </a:effectLst>
-        </p:spPr>
-        <p:style>
-          <a:lnRef idx="2">
-            <a:schemeClr val="accent1">
-              <a:shade val="50000"/>
-            </a:schemeClr>
-          </a:lnRef>
-          <a:fillRef idx="1">
-            <a:schemeClr val="accent1"/>
-          </a:fillRef>
-          <a:effectRef idx="0">
-            <a:schemeClr val="accent1"/>
-          </a:effectRef>
-          <a:fontRef idx="minor">
-            <a:schemeClr val="lt1"/>
-          </a:fontRef>
-        </p:style>
-        <p:txBody>
-          <a:bodyPr rtlCol="0" anchor="ctr">
-            <a:normAutofit/>
-          </a:bodyPr>
-          <a:lstStyle/>
-          <a:p>
-            <a:pPr algn="ctr"/>
-            <a:r>
-              <a:rPr lang="en-SG" sz="1600" dirty="0">
-                <a:solidFill>
-                  <a:srgbClr val="FFFFFF"/>
-                </a:solidFill>
-              </a:rPr>
-              <a:t>Callout</a:t>
-            </a:r>
-          </a:p>
-        </p:txBody>
-      </p:sp>
-    </p:spTree>
-    <p:extLst>
-      <p:ext uri="{BB962C8B-B14F-4D97-AF65-F5344CB8AC3E}">
-        <p14:creationId xmlns:p14="http://schemas.microsoft.com/office/powerpoint/2010/main" val="2346979735"/>
-      </p:ext>
-    </p:extLst>
-  </p:cSld>
-  <p:clrMapOvr>
-    <a:masterClrMapping/>
-  </p:clrMapOvr>
-  <p:timing>
-    <p:tnLst>
-      <p:par>
-        <p:cTn id="1" dur="indefinite" restart="never" nodeType="tmRoot">
-          <p:childTnLst>
-            <p:seq concurrent="1" nextAc="seek">
-              <p:cTn id="2" dur="indefinite" nodeType="mainSeq">
-                <p:childTnLst>
-                  <p:par>
-                    <p:cTn id="3" fill="hold">
-                      <p:stCondLst>
-                        <p:cond delay="indefinite"/>
-                      </p:stCondLst>
-                      <p:childTnLst>
-                        <p:par>
-                          <p:cTn id="4" fill="hold">
-                            <p:stCondLst>
-                              <p:cond delay="0"/>
-                            </p:stCondLst>
-                            <p:childTnLst>
-                              <p:par>
-                                <p:cTn id="5" presetID="10" presetClass="entr" presetSubtype="0" fill="hold" grpId="0" nodeType="clickEffect">
-                                  <p:stCondLst>
-                                    <p:cond delay="0"/>
-                                  </p:stCondLst>
-                                  <p:childTnLst>
-                                    <p:set>
-                                      <p:cBhvr>
-                                        <p:cTn id="6" dur="1" fill="hold">
-                                          <p:stCondLst>
-                                            <p:cond delay="0"/>
-                                          </p:stCondLst>
-                                        </p:cTn>
-                                        <p:tgtEl>
-                                          <p:spTgt spid="5"/>
-                                        </p:tgtEl>
-                                        <p:attrNameLst>
-                                          <p:attrName>style.visibility</p:attrName>
-                                        </p:attrNameLst>
-                                      </p:cBhvr>
-                                      <p:to>
-                                        <p:strVal val="visible"/>
-                                      </p:to>
-                                    </p:set>
-                                    <p:animEffect transition="in" filter="fade">
-                                      <p:cBhvr>
-                                        <p:cTn id="7" dur="500"/>
-                                        <p:tgtEl>
-                                          <p:spTgt spid="5"/>
-                                        </p:tgtEl>
-                                      </p:cBhvr>
-                                    </p:animEffect>
-                                  </p:childTnLst>
-                                </p:cTn>
-                              </p:par>
-                            </p:childTnLst>
-                          </p:cTn>
-                        </p:par>
-                      </p:childTnLst>
-                    </p:cTn>
-                  </p:par>
-                  <p:par>
-                    <p:cTn id="8" fill="hold">
-                      <p:stCondLst>
-                        <p:cond delay="indefinite"/>
-                      </p:stCondLst>
-                      <p:childTnLst>
-                        <p:par>
-                          <p:cTn id="9" fill="hold">
-                            <p:stCondLst>
-                              <p:cond delay="0"/>
-                            </p:stCondLst>
-                            <p:childTnLst>
-                              <p:par>
-                                <p:cTn id="10" presetID="10" presetClass="exit" presetSubtype="0" fill="hold" grpId="1" nodeType="clickEffect">
-                                  <p:stCondLst>
-                                    <p:cond delay="0"/>
-                                  </p:stCondLst>
-                                  <p:childTnLst>
-                                    <p:animEffect transition="out" filter="fade">
-                                      <p:cBhvr>
-                                        <p:cTn id="11" dur="500"/>
-                                        <p:tgtEl>
-                                          <p:spTgt spid="5"/>
-                                        </p:tgtEl>
-                                      </p:cBhvr>
-                                    </p:animEffect>
-                                    <p:set>
-                                      <p:cBhvr>
-                                        <p:cTn id="12" dur="1" fill="hold">
-                                          <p:stCondLst>
-                                            <p:cond delay="499"/>
-                                          </p:stCondLst>
-                                        </p:cTn>
-                                        <p:tgtEl>
-                                          <p:spTgt spid="5"/>
-                                        </p:tgtEl>
-                                        <p:attrNameLst>
-                                          <p:attrName>style.visibility</p:attrName>
-                                        </p:attrNameLst>
-                                      </p:cBhvr>
-                                      <p:to>
-                                        <p:strVal val="hidden"/>
-                                      </p:to>
-                                    </p:set>
-                                  </p:childTnLst>
-                                </p:cTn>
-                              </p:par>
-                            </p:childTnLst>
-                          </p:cTn>
-                        </p:par>
-                      </p:childTnLst>
-                    </p:cTn>
-                  </p:par>
-                </p:childTnLst>
-              </p:cTn>
-              <p:prevCondLst>
-                <p:cond evt="onPrev" delay="0">
-                  <p:tgtEl>
-                    <p:sldTgt/>
-                  </p:tgtEl>
-                </p:cond>
-              </p:prevCondLst>
-              <p:nextCondLst>
-                <p:cond evt="onNext" delay="0">
-                  <p:tgtEl>
-                    <p:sldTgt/>
-                  </p:tgtEl>
-                </p:cond>
-              </p:nextCondLst>
-            </p:seq>
-            <p:seq concurrent="1" nextAc="seek">
-              <p:cTn id="13" restart="whenNotActive" fill="hold" evtFilter="cancelBubble" nodeType="interactiveSeq">
-                <p:stCondLst>
-                  <p:cond evt="onClick" delay="0">
-                    <p:tgtEl>
-                      <p:spTgt spid="4"/>
-                    </p:tgtEl>
-                  </p:cond>
-                </p:stCondLst>
-                <p:endSync evt="end" delay="0">
-                  <p:rtn val="all"/>
-                </p:endSync>
-                <p:childTnLst>
-                  <p:par>
-                    <p:cTn id="14" fill="hold">
-                      <p:stCondLst>
-                        <p:cond delay="0"/>
-                      </p:stCondLst>
-                      <p:childTnLst>
-                        <p:par>
-                          <p:cTn id="15" fill="hold">
-                            <p:stCondLst>
-                              <p:cond delay="0"/>
-                            </p:stCondLst>
-                            <p:childTnLst>
-                              <p:par>
-                                <p:cTn id="16" presetID="10" presetClass="entr" presetSubtype="0" fill="hold" grpId="2" nodeType="clickEffect">
-                                  <p:stCondLst>
-                                    <p:cond delay="0"/>
-                                  </p:stCondLst>
-                                  <p:childTnLst>
-                                    <p:set>
-                                      <p:cBhvr>
-                                        <p:cTn id="17" dur="1" fill="hold">
-                                          <p:stCondLst>
-                                            <p:cond delay="0"/>
-                                          </p:stCondLst>
-                                        </p:cTn>
-                                        <p:tgtEl>
-                                          <p:spTgt spid="5"/>
-                                        </p:tgtEl>
-                                        <p:attrNameLst>
-                                          <p:attrName>style.visibility</p:attrName>
-                                        </p:attrNameLst>
-                                      </p:cBhvr>
-                                      <p:to>
-                                        <p:strVal val="visible"/>
-                                      </p:to>
-                                    </p:set>
-                                    <p:animEffect transition="in" filter="fade">
-                                      <p:cBhvr>
-                                        <p:cTn id="18" dur="500"/>
-                                        <p:tgtEl>
-                                          <p:spTgt spid="5"/>
-                                        </p:tgtEl>
-                                      </p:cBhvr>
-                                    </p:animEffect>
-                                  </p:childTnLst>
-                                </p:cTn>
-                              </p:par>
-                            </p:childTnLst>
-                          </p:cTn>
-                        </p:par>
-                      </p:childTnLst>
-                    </p:cTn>
-                  </p:par>
-                  <p:par>
-                    <p:cTn id="19" fill="hold">
-                      <p:stCondLst>
-                        <p:cond delay="indefinite"/>
-                      </p:stCondLst>
-                      <p:childTnLst>
-                        <p:par>
-                          <p:cTn id="20" fill="hold">
-                            <p:stCondLst>
-                              <p:cond delay="0"/>
-                            </p:stCondLst>
-                            <p:childTnLst>
-                              <p:par>
-                                <p:cTn id="21" presetID="10" presetClass="exit" presetSubtype="0" fill="hold" grpId="3" nodeType="clickEffect">
-                                  <p:stCondLst>
-                                    <p:cond delay="0"/>
-                                  </p:stCondLst>
-                                  <p:childTnLst>
-                                    <p:animEffect transition="out" filter="fade">
-                                      <p:cBhvr>
-                                        <p:cTn id="22" dur="500"/>
-                                        <p:tgtEl>
-                                          <p:spTgt spid="5"/>
-                                        </p:tgtEl>
-                                      </p:cBhvr>
-                                    </p:animEffect>
-                                    <p:set>
-                                      <p:cBhvr>
-                                        <p:cTn id="23" dur="1" fill="hold">
-                                          <p:stCondLst>
-                                            <p:cond delay="499"/>
-                                          </p:stCondLst>
-                                        </p:cTn>
-                                        <p:tgtEl>
-                                          <p:spTgt spid="5"/>
-                                        </p:tgtEl>
-                                        <p:attrNameLst>
-                                          <p:attrName>style.visibility</p:attrName>
-                                        </p:attrNameLst>
-                                      </p:cBhvr>
-                                      <p:to>
-                                        <p:strVal val="hidden"/>
-                                      </p:to>
-                                    </p:set>
-                                  </p:childTnLst>
-                                </p:cTn>
-                              </p:par>
-                            </p:childTnLst>
-                          </p:cTn>
-                        </p:par>
-                      </p:childTnLst>
-                    </p:cTn>
-                  </p:par>
-                </p:childTnLst>
-              </p:cTn>
-              <p:nextCondLst>
-                <p:cond evt="onClick" delay="0">
-                  <p:tgtEl>
-                    <p:spTgt spid="4"/>
-                  </p:tgtEl>
-                </p:cond>
-              </p:nextCondLst>
-            </p:seq>
-          </p:childTnLst>
-        </p:cTn>
-      </p:par>
-    </p:tnLst>
-    <p:bldLst>
-      <p:bldP spid="5" grpId="0" animBg="1"/>
-      <p:bldP spid="5" grpId="1" animBg="1"/>
-      <p:bldP spid="5" grpId="2" animBg="1"/>
-      <p:bldP spid="5" grpId="3" animBg="1"/>
-    </p:bldLst>
-  </p:timing>
-</p:sld>
-</file>
-
-<file path=ppt/slides/slide6.xml><?xml version="1.0" encoding="utf-8"?>
-<p:sld xmlns:a="http://schemas.openxmlformats.org/drawingml/2006/main" xmlns:r="http://schemas.openxmlformats.org/officeDocument/2006/relationships" xmlns:p="http://schemas.openxmlformats.org/presentationml/2006/main">
-  <p:cSld>
-    <p:bg>
-      <p:bgPr>
-        <a:solidFill>
-          <a:srgbClr val="0070BF"/>
-        </a:solidFill>
-        <a:effectLst/>
-      </p:bgPr>
-    </p:bg>
-    <p:spTree>
-      <p:nvGrpSpPr>
-        <p:cNvPr id="1" name=""/>
-        <p:cNvGrpSpPr/>
-        <p:nvPr/>
-      </p:nvGrpSpPr>
-      <p:grpSpPr>
-        <a:xfrm>
-          <a:off x="0" y="0"/>
-          <a:ext cx="0" cy="0"/>
-          <a:chOff x="0" y="0"/>
-          <a:chExt cx="0" cy="0"/>
-        </a:xfrm>
-      </p:grpSpPr>
-      <p:sp>
-        <p:nvSpPr>
-          <p:cNvPr id="2" name="Title 1"/>
-          <p:cNvSpPr>
-            <a:spLocks noGrp="1"/>
-          </p:cNvSpPr>
-          <p:nvPr>
-            <p:ph type="title"/>
-          </p:nvPr>
-        </p:nvSpPr>
-        <p:spPr>
-          <a:solidFill>
-            <a:srgbClr val="0070BF"/>
-          </a:solidFill>
-        </p:spPr>
-        <p:txBody>
-          <a:bodyPr/>
-          <a:lstStyle/>
-          <a:p>
-            <a:r>
-              <a:rPr lang="en-US" dirty="0"/>
-              <a:t>Convert Shapes To Tooltip: Three shapes</a:t>
-            </a:r>
-            <a:endParaRPr lang="en-SG" dirty="0"/>
-          </a:p>
-        </p:txBody>
-      </p:sp>
-      <p:sp>
-        <p:nvSpPr>
-          <p:cNvPr id="4" name="Content Placeholder 2"/>
-          <p:cNvSpPr>
-            <a:spLocks noGrp="1"/>
-          </p:cNvSpPr>
-          <p:nvPr>
-            <p:ph idx="1"/>
-          </p:nvPr>
-        </p:nvSpPr>
-        <p:spPr>
-          <a:xfrm>
-            <a:off x="457200" y="3124200"/>
-            <a:ext cx="8229600" cy="3001963"/>
-          </a:xfrm>
-        </p:spPr>
-        <p:txBody>
-          <a:bodyPr/>
-          <a:lstStyle/>
-          <a:p>
-            <a:r>
-              <a:rPr lang="en-US" dirty="0"/>
-              <a:t>Select trigger</a:t>
-            </a:r>
-          </a:p>
-          <a:p>
-            <a:r>
-              <a:rPr lang="en-US" dirty="0"/>
-              <a:t>Select callout</a:t>
-            </a:r>
-          </a:p>
-          <a:p>
-            <a:r>
-              <a:rPr lang="en-US" dirty="0"/>
-              <a:t>Select callout 2</a:t>
-            </a:r>
-          </a:p>
-          <a:p>
-            <a:r>
-              <a:rPr lang="en-US" dirty="0"/>
-              <a:t>Click ‘Convert Shapes to Tooltip’</a:t>
-            </a:r>
-            <a:endParaRPr lang="en-SG" dirty="0"/>
-          </a:p>
-        </p:txBody>
-      </p:sp>
-    </p:spTree>
-    <p:extLst>
-      <p:ext uri="{BB962C8B-B14F-4D97-AF65-F5344CB8AC3E}">
-        <p14:creationId xmlns:p14="http://schemas.microsoft.com/office/powerpoint/2010/main" val="753770252"/>
-      </p:ext>
-    </p:extLst>
-  </p:cSld>
-  <p:clrMapOvr>
-    <a:masterClrMapping/>
-  </p:clrMapOvr>
-</p:sld>
-</file>
-
-<file path=ppt/slides/slide7.xml><?xml version="1.0" encoding="utf-8"?>
+<file path=ppt/slides/slide10.xml><?xml version="1.0" encoding="utf-8"?>
 <p:sld xmlns:a="http://schemas.openxmlformats.org/drawingml/2006/main" xmlns:r="http://schemas.openxmlformats.org/officeDocument/2006/relationships" xmlns:p="http://schemas.openxmlformats.org/presentationml/2006/main">
   <p:cSld>
     <p:spTree>
@@ -10990,7 +9987,7 @@
 </p:sld>
 </file>
 
-<file path=ppt/slides/slide8.xml><?xml version="1.0" encoding="utf-8"?>
+<file path=ppt/slides/slide11.xml><?xml version="1.0" encoding="utf-8"?>
 <p:sld xmlns:a="http://schemas.openxmlformats.org/drawingml/2006/main" xmlns:r="http://schemas.openxmlformats.org/officeDocument/2006/relationships" xmlns:p="http://schemas.openxmlformats.org/presentationml/2006/main">
   <p:cSld>
     <p:spTree>
@@ -11664,7 +10661,7 @@
 </p:sld>
 </file>
 
-<file path=ppt/slides/slide9.xml><?xml version="1.0" encoding="utf-8"?>
+<file path=ppt/slides/slide12.xml><?xml version="1.0" encoding="utf-8"?>
 <p:sld xmlns:a="http://schemas.openxmlformats.org/drawingml/2006/main" xmlns:r="http://schemas.openxmlformats.org/officeDocument/2006/relationships" xmlns:p="http://schemas.openxmlformats.org/presentationml/2006/main" show="0">
   <p:cSld name="PPTLabsAcknowledgementSlide">
     <p:spTree>
@@ -11715,6 +10712,1272 @@
     <p:extLst>
       <p:ext uri="{BB962C8B-B14F-4D97-AF65-F5344CB8AC3E}">
         <p14:creationId xmlns:p14="http://schemas.microsoft.com/office/powerpoint/2010/main" val="3753522111"/>
+      </p:ext>
+    </p:extLst>
+  </p:cSld>
+  <p:clrMapOvr>
+    <a:masterClrMapping/>
+  </p:clrMapOvr>
+</p:sld>
+</file>
+
+<file path=ppt/slides/slide2.xml><?xml version="1.0" encoding="utf-8"?>
+<p:sld xmlns:a="http://schemas.openxmlformats.org/drawingml/2006/main" xmlns:r="http://schemas.openxmlformats.org/officeDocument/2006/relationships" xmlns:p="http://schemas.openxmlformats.org/presentationml/2006/main">
+  <p:cSld>
+    <p:bg>
+      <p:bgPr>
+        <a:solidFill>
+          <a:srgbClr val="E46C0A"/>
+        </a:solidFill>
+        <a:effectLst/>
+      </p:bgPr>
+    </p:bg>
+    <p:spTree>
+      <p:nvGrpSpPr>
+        <p:cNvPr id="1" name=""/>
+        <p:cNvGrpSpPr/>
+        <p:nvPr/>
+      </p:nvGrpSpPr>
+      <p:grpSpPr>
+        <a:xfrm>
+          <a:off x="0" y="0"/>
+          <a:ext cx="0" cy="0"/>
+          <a:chOff x="0" y="0"/>
+          <a:chExt cx="0" cy="0"/>
+        </a:xfrm>
+      </p:grpSpPr>
+      <p:sp>
+        <p:nvSpPr>
+          <p:cNvPr id="2" name="Title 1"/>
+          <p:cNvSpPr>
+            <a:spLocks noGrp="1"/>
+          </p:cNvSpPr>
+          <p:nvPr>
+            <p:ph type="title"/>
+          </p:nvPr>
+        </p:nvSpPr>
+        <p:spPr>
+          <a:xfrm>
+            <a:off x="381000" y="609600"/>
+            <a:ext cx="8229600" cy="1143000"/>
+          </a:xfrm>
+          <a:solidFill>
+            <a:srgbClr val="E46C0A"/>
+          </a:solidFill>
+        </p:spPr>
+        <p:txBody>
+          <a:bodyPr>
+            <a:noAutofit/>
+          </a:bodyPr>
+          <a:lstStyle/>
+          <a:p>
+            <a:pPr algn="l"/>
+            <a:r>
+              <a:rPr lang="en-US" sz="7200" dirty="0">
+                <a:solidFill>
+                  <a:schemeClr val="bg1"/>
+                </a:solidFill>
+              </a:rPr>
+              <a:t>Convert Shapes To Tooltip</a:t>
+            </a:r>
+            <a:endParaRPr lang="en-SG" sz="7200" dirty="0">
+              <a:solidFill>
+                <a:schemeClr val="bg1"/>
+              </a:solidFill>
+            </a:endParaRPr>
+          </a:p>
+        </p:txBody>
+      </p:sp>
+    </p:spTree>
+    <p:extLst>
+      <p:ext uri="{BB962C8B-B14F-4D97-AF65-F5344CB8AC3E}">
+        <p14:creationId xmlns:p14="http://schemas.microsoft.com/office/powerpoint/2010/main" val="1569131388"/>
+      </p:ext>
+    </p:extLst>
+  </p:cSld>
+  <p:clrMapOvr>
+    <a:masterClrMapping/>
+  </p:clrMapOvr>
+</p:sld>
+</file>
+
+<file path=ppt/slides/slide3.xml><?xml version="1.0" encoding="utf-8"?>
+<p:sld xmlns:a="http://schemas.openxmlformats.org/drawingml/2006/main" xmlns:r="http://schemas.openxmlformats.org/officeDocument/2006/relationships" xmlns:p="http://schemas.openxmlformats.org/presentationml/2006/main">
+  <p:cSld>
+    <p:bg>
+      <p:bgPr>
+        <a:solidFill>
+          <a:srgbClr val="0070BF"/>
+        </a:solidFill>
+        <a:effectLst/>
+      </p:bgPr>
+    </p:bg>
+    <p:spTree>
+      <p:nvGrpSpPr>
+        <p:cNvPr id="1" name=""/>
+        <p:cNvGrpSpPr/>
+        <p:nvPr/>
+      </p:nvGrpSpPr>
+      <p:grpSpPr>
+        <a:xfrm>
+          <a:off x="0" y="0"/>
+          <a:ext cx="0" cy="0"/>
+          <a:chOff x="0" y="0"/>
+          <a:chExt cx="0" cy="0"/>
+        </a:xfrm>
+      </p:grpSpPr>
+      <p:sp>
+        <p:nvSpPr>
+          <p:cNvPr id="2" name="Title 1"/>
+          <p:cNvSpPr>
+            <a:spLocks noGrp="1"/>
+          </p:cNvSpPr>
+          <p:nvPr>
+            <p:ph type="title"/>
+          </p:nvPr>
+        </p:nvSpPr>
+        <p:spPr>
+          <a:solidFill>
+            <a:srgbClr val="0070BF"/>
+          </a:solidFill>
+        </p:spPr>
+        <p:txBody>
+          <a:bodyPr/>
+          <a:lstStyle/>
+          <a:p>
+            <a:r>
+              <a:rPr lang="en-US" dirty="0"/>
+              <a:t>Convert Shapes To Tooltip: One</a:t>
+            </a:r>
+            <a:endParaRPr lang="en-SG" dirty="0"/>
+          </a:p>
+        </p:txBody>
+      </p:sp>
+      <p:sp>
+        <p:nvSpPr>
+          <p:cNvPr id="4" name="Content Placeholder 2"/>
+          <p:cNvSpPr>
+            <a:spLocks noGrp="1"/>
+          </p:cNvSpPr>
+          <p:nvPr>
+            <p:ph idx="1"/>
+          </p:nvPr>
+        </p:nvSpPr>
+        <p:spPr>
+          <a:xfrm>
+            <a:off x="457200" y="3124200"/>
+            <a:ext cx="8229600" cy="3001963"/>
+          </a:xfrm>
+        </p:spPr>
+        <p:txBody>
+          <a:bodyPr/>
+          <a:lstStyle/>
+          <a:p>
+            <a:r>
+              <a:rPr lang="en-US" dirty="0"/>
+              <a:t>Select trigger</a:t>
+            </a:r>
+          </a:p>
+          <a:p>
+            <a:r>
+              <a:rPr lang="en-US" dirty="0"/>
+              <a:t>Click ‘Convert Shapes to Tooltip’</a:t>
+            </a:r>
+            <a:endParaRPr lang="en-SG" dirty="0"/>
+          </a:p>
+        </p:txBody>
+      </p:sp>
+    </p:spTree>
+    <p:extLst>
+      <p:ext uri="{BB962C8B-B14F-4D97-AF65-F5344CB8AC3E}">
+        <p14:creationId xmlns:p14="http://schemas.microsoft.com/office/powerpoint/2010/main" val="1286891872"/>
+      </p:ext>
+    </p:extLst>
+  </p:cSld>
+  <p:clrMapOvr>
+    <a:masterClrMapping/>
+  </p:clrMapOvr>
+</p:sld>
+</file>
+
+<file path=ppt/slides/slide4.xml><?xml version="1.0" encoding="utf-8"?>
+<p:sld xmlns:a="http://schemas.openxmlformats.org/drawingml/2006/main" xmlns:r="http://schemas.openxmlformats.org/officeDocument/2006/relationships" xmlns:p="http://schemas.openxmlformats.org/presentationml/2006/main">
+  <p:cSld>
+    <p:spTree>
+      <p:nvGrpSpPr>
+        <p:cNvPr id="1" name=""/>
+        <p:cNvGrpSpPr/>
+        <p:nvPr/>
+      </p:nvGrpSpPr>
+      <p:grpSpPr>
+        <a:xfrm>
+          <a:off x="0" y="0"/>
+          <a:ext cx="0" cy="0"/>
+          <a:chOff x="0" y="0"/>
+          <a:chExt cx="0" cy="0"/>
+        </a:xfrm>
+      </p:grpSpPr>
+      <p:sp>
+        <p:nvSpPr>
+          <p:cNvPr id="2" name="Trigger">
+            <a:extLst>
+              <a:ext uri="{FF2B5EF4-FFF2-40B4-BE49-F238E27FC236}">
+                <a16:creationId xmlns:a16="http://schemas.microsoft.com/office/drawing/2014/main" id="{015139AA-208E-41A9-9E9D-0FBF9B27A0E4}"/>
+              </a:ext>
+            </a:extLst>
+          </p:cNvPr>
+          <p:cNvSpPr/>
+          <p:nvPr/>
+        </p:nvSpPr>
+        <p:spPr>
+          <a:xfrm>
+            <a:off x="1600200" y="3733800"/>
+            <a:ext cx="1219200" cy="1219200"/>
+          </a:xfrm>
+          <a:prstGeom prst="ellipse">
+            <a:avLst/>
+          </a:prstGeom>
+        </p:spPr>
+        <p:style>
+          <a:lnRef idx="2">
+            <a:schemeClr val="accent1">
+              <a:shade val="50000"/>
+            </a:schemeClr>
+          </a:lnRef>
+          <a:fillRef idx="1">
+            <a:schemeClr val="accent1"/>
+          </a:fillRef>
+          <a:effectRef idx="0">
+            <a:schemeClr val="accent1"/>
+          </a:effectRef>
+          <a:fontRef idx="minor">
+            <a:schemeClr val="lt1"/>
+          </a:fontRef>
+        </p:style>
+        <p:txBody>
+          <a:bodyPr rtlCol="0" anchor="ctr"/>
+          <a:lstStyle/>
+          <a:p>
+            <a:pPr algn="ctr"/>
+            <a:r>
+              <a:rPr lang="en-US" dirty="0"/>
+              <a:t>Trigger</a:t>
+            </a:r>
+          </a:p>
+        </p:txBody>
+      </p:sp>
+    </p:spTree>
+    <p:extLst>
+      <p:ext uri="{BB962C8B-B14F-4D97-AF65-F5344CB8AC3E}">
+        <p14:creationId xmlns:p14="http://schemas.microsoft.com/office/powerpoint/2010/main" val="2817424113"/>
+      </p:ext>
+    </p:extLst>
+  </p:cSld>
+  <p:clrMapOvr>
+    <a:masterClrMapping/>
+  </p:clrMapOvr>
+</p:sld>
+</file>
+
+<file path=ppt/slides/slide5.xml><?xml version="1.0" encoding="utf-8"?>
+<p:sld xmlns:a="http://schemas.openxmlformats.org/drawingml/2006/main" xmlns:r="http://schemas.openxmlformats.org/officeDocument/2006/relationships" xmlns:p="http://schemas.openxmlformats.org/presentationml/2006/main">
+  <p:cSld>
+    <p:spTree>
+      <p:nvGrpSpPr>
+        <p:cNvPr id="1" name=""/>
+        <p:cNvGrpSpPr/>
+        <p:nvPr/>
+      </p:nvGrpSpPr>
+      <p:grpSpPr>
+        <a:xfrm>
+          <a:off x="0" y="0"/>
+          <a:ext cx="0" cy="0"/>
+          <a:chOff x="0" y="0"/>
+          <a:chExt cx="0" cy="0"/>
+        </a:xfrm>
+      </p:grpSpPr>
+      <p:sp>
+        <p:nvSpPr>
+          <p:cNvPr id="4" name="Trigger">
+            <a:extLst>
+              <a:ext uri="{FF2B5EF4-FFF2-40B4-BE49-F238E27FC236}">
+                <a16:creationId xmlns:a16="http://schemas.microsoft.com/office/drawing/2014/main" id="{B576714E-36F2-4FCC-9365-7AAC0983AB5F}"/>
+              </a:ext>
+            </a:extLst>
+          </p:cNvPr>
+          <p:cNvSpPr/>
+          <p:nvPr/>
+        </p:nvSpPr>
+        <p:spPr>
+          <a:xfrm>
+            <a:off x="1600200" y="3733800"/>
+            <a:ext cx="1219200" cy="1219200"/>
+          </a:xfrm>
+          <a:prstGeom prst="ellipse">
+            <a:avLst/>
+          </a:prstGeom>
+        </p:spPr>
+        <p:style>
+          <a:lnRef idx="2">
+            <a:schemeClr val="accent1">
+              <a:shade val="50000"/>
+            </a:schemeClr>
+          </a:lnRef>
+          <a:fillRef idx="1">
+            <a:schemeClr val="accent1"/>
+          </a:fillRef>
+          <a:effectRef idx="0">
+            <a:schemeClr val="accent1"/>
+          </a:effectRef>
+          <a:fontRef idx="minor">
+            <a:schemeClr val="lt1"/>
+          </a:fontRef>
+        </p:style>
+        <p:txBody>
+          <a:bodyPr rtlCol="0" anchor="ctr"/>
+          <a:lstStyle/>
+          <a:p>
+            <a:pPr algn="ctr"/>
+            <a:r>
+              <a:rPr lang="en-US" dirty="0"/>
+              <a:t>Trigger</a:t>
+            </a:r>
+          </a:p>
+        </p:txBody>
+      </p:sp>
+    </p:spTree>
+    <p:extLst>
+      <p:ext uri="{BB962C8B-B14F-4D97-AF65-F5344CB8AC3E}">
+        <p14:creationId xmlns:p14="http://schemas.microsoft.com/office/powerpoint/2010/main" val="1978377161"/>
+      </p:ext>
+    </p:extLst>
+  </p:cSld>
+  <p:clrMapOvr>
+    <a:masterClrMapping/>
+  </p:clrMapOvr>
+</p:sld>
+</file>
+
+<file path=ppt/slides/slide6.xml><?xml version="1.0" encoding="utf-8"?>
+<p:sld xmlns:a="http://schemas.openxmlformats.org/drawingml/2006/main" xmlns:r="http://schemas.openxmlformats.org/officeDocument/2006/relationships" xmlns:p="http://schemas.openxmlformats.org/presentationml/2006/main">
+  <p:cSld>
+    <p:bg>
+      <p:bgPr>
+        <a:solidFill>
+          <a:srgbClr val="0070BF"/>
+        </a:solidFill>
+        <a:effectLst/>
+      </p:bgPr>
+    </p:bg>
+    <p:spTree>
+      <p:nvGrpSpPr>
+        <p:cNvPr id="1" name=""/>
+        <p:cNvGrpSpPr/>
+        <p:nvPr/>
+      </p:nvGrpSpPr>
+      <p:grpSpPr>
+        <a:xfrm>
+          <a:off x="0" y="0"/>
+          <a:ext cx="0" cy="0"/>
+          <a:chOff x="0" y="0"/>
+          <a:chExt cx="0" cy="0"/>
+        </a:xfrm>
+      </p:grpSpPr>
+      <p:sp>
+        <p:nvSpPr>
+          <p:cNvPr id="2" name="Title 1"/>
+          <p:cNvSpPr>
+            <a:spLocks noGrp="1"/>
+          </p:cNvSpPr>
+          <p:nvPr>
+            <p:ph type="title"/>
+          </p:nvPr>
+        </p:nvSpPr>
+        <p:spPr>
+          <a:solidFill>
+            <a:srgbClr val="0070BF"/>
+          </a:solidFill>
+        </p:spPr>
+        <p:txBody>
+          <a:bodyPr/>
+          <a:lstStyle/>
+          <a:p>
+            <a:r>
+              <a:rPr lang="en-US" dirty="0"/>
+              <a:t>Convert Shapes To Tooltip: Two shapes</a:t>
+            </a:r>
+            <a:endParaRPr lang="en-SG" dirty="0"/>
+          </a:p>
+        </p:txBody>
+      </p:sp>
+      <p:sp>
+        <p:nvSpPr>
+          <p:cNvPr id="4" name="Content Placeholder 2"/>
+          <p:cNvSpPr>
+            <a:spLocks noGrp="1"/>
+          </p:cNvSpPr>
+          <p:nvPr>
+            <p:ph idx="1"/>
+          </p:nvPr>
+        </p:nvSpPr>
+        <p:spPr>
+          <a:xfrm>
+            <a:off x="457200" y="3124200"/>
+            <a:ext cx="8229600" cy="3001963"/>
+          </a:xfrm>
+        </p:spPr>
+        <p:txBody>
+          <a:bodyPr/>
+          <a:lstStyle/>
+          <a:p>
+            <a:r>
+              <a:rPr lang="en-US" dirty="0"/>
+              <a:t>Select trigger</a:t>
+            </a:r>
+          </a:p>
+          <a:p>
+            <a:r>
+              <a:rPr lang="en-US" dirty="0"/>
+              <a:t>Select callout</a:t>
+            </a:r>
+          </a:p>
+          <a:p>
+            <a:r>
+              <a:rPr lang="en-US" dirty="0"/>
+              <a:t>Click ‘Convert Shapes to Tooltip’</a:t>
+            </a:r>
+            <a:endParaRPr lang="en-SG" dirty="0"/>
+          </a:p>
+        </p:txBody>
+      </p:sp>
+    </p:spTree>
+    <p:extLst>
+      <p:ext uri="{BB962C8B-B14F-4D97-AF65-F5344CB8AC3E}">
+        <p14:creationId xmlns:p14="http://schemas.microsoft.com/office/powerpoint/2010/main" val="3546107793"/>
+      </p:ext>
+    </p:extLst>
+  </p:cSld>
+  <p:clrMapOvr>
+    <a:masterClrMapping/>
+  </p:clrMapOvr>
+</p:sld>
+</file>
+
+<file path=ppt/slides/slide7.xml><?xml version="1.0" encoding="utf-8"?>
+<p:sld xmlns:a="http://schemas.openxmlformats.org/drawingml/2006/main" xmlns:r="http://schemas.openxmlformats.org/officeDocument/2006/relationships" xmlns:p="http://schemas.openxmlformats.org/presentationml/2006/main">
+  <p:cSld>
+    <p:spTree>
+      <p:nvGrpSpPr>
+        <p:cNvPr id="1" name=""/>
+        <p:cNvGrpSpPr/>
+        <p:nvPr/>
+      </p:nvGrpSpPr>
+      <p:grpSpPr>
+        <a:xfrm>
+          <a:off x="0" y="0"/>
+          <a:ext cx="0" cy="0"/>
+          <a:chOff x="0" y="0"/>
+          <a:chExt cx="0" cy="0"/>
+        </a:xfrm>
+      </p:grpSpPr>
+      <p:sp>
+        <p:nvSpPr>
+          <p:cNvPr id="2" name="Trigger">
+            <a:extLst>
+              <a:ext uri="{FF2B5EF4-FFF2-40B4-BE49-F238E27FC236}">
+                <a16:creationId xmlns:a16="http://schemas.microsoft.com/office/drawing/2014/main" id="{015139AA-208E-41A9-9E9D-0FBF9B27A0E4}"/>
+              </a:ext>
+            </a:extLst>
+          </p:cNvPr>
+          <p:cNvSpPr/>
+          <p:nvPr/>
+        </p:nvSpPr>
+        <p:spPr>
+          <a:xfrm>
+            <a:off x="1600200" y="3733800"/>
+            <a:ext cx="1219200" cy="1219200"/>
+          </a:xfrm>
+          <a:prstGeom prst="ellipse">
+            <a:avLst/>
+          </a:prstGeom>
+        </p:spPr>
+        <p:style>
+          <a:lnRef idx="2">
+            <a:schemeClr val="accent1">
+              <a:shade val="50000"/>
+            </a:schemeClr>
+          </a:lnRef>
+          <a:fillRef idx="1">
+            <a:schemeClr val="accent1"/>
+          </a:fillRef>
+          <a:effectRef idx="0">
+            <a:schemeClr val="accent1"/>
+          </a:effectRef>
+          <a:fontRef idx="minor">
+            <a:schemeClr val="lt1"/>
+          </a:fontRef>
+        </p:style>
+        <p:txBody>
+          <a:bodyPr rtlCol="0" anchor="ctr"/>
+          <a:lstStyle/>
+          <a:p>
+            <a:pPr algn="ctr"/>
+            <a:r>
+              <a:rPr lang="en-US" dirty="0"/>
+              <a:t>Trigger</a:t>
+            </a:r>
+          </a:p>
+        </p:txBody>
+      </p:sp>
+      <p:sp>
+        <p:nvSpPr>
+          <p:cNvPr id="5" name="Callout">
+            <a:extLst>
+              <a:ext uri="{FF2B5EF4-FFF2-40B4-BE49-F238E27FC236}">
+                <a16:creationId xmlns:a16="http://schemas.microsoft.com/office/drawing/2014/main" id="{FA930241-05A7-4CEA-829A-96FA333C6D11}"/>
+              </a:ext>
+            </a:extLst>
+          </p:cNvPr>
+          <p:cNvSpPr/>
+          <p:nvPr/>
+        </p:nvSpPr>
+        <p:spPr>
+          <a:xfrm>
+            <a:off x="1866900" y="2209800"/>
+            <a:ext cx="1905000" cy="1270000"/>
+          </a:xfrm>
+          <a:prstGeom prst="wedgeRoundRectCallout">
+            <a:avLst/>
+          </a:prstGeom>
+          <a:solidFill>
+            <a:srgbClr val="000000">
+              <a:alpha val="80000"/>
+            </a:srgbClr>
+          </a:solidFill>
+          <a:ln w="635">
+            <a:solidFill>
+              <a:srgbClr val="FFFF00"/>
+            </a:solidFill>
+          </a:ln>
+          <a:effectLst>
+            <a:outerShdw blurRad="63500" sx="102000" sy="102000" algn="ctr">
+              <a:prstClr val="black">
+                <a:alpha val="40000"/>
+              </a:prstClr>
+            </a:outerShdw>
+          </a:effectLst>
+        </p:spPr>
+        <p:style>
+          <a:lnRef idx="2">
+            <a:schemeClr val="accent1">
+              <a:shade val="50000"/>
+            </a:schemeClr>
+          </a:lnRef>
+          <a:fillRef idx="1">
+            <a:schemeClr val="accent1"/>
+          </a:fillRef>
+          <a:effectRef idx="0">
+            <a:schemeClr val="accent1"/>
+          </a:effectRef>
+          <a:fontRef idx="minor">
+            <a:schemeClr val="lt1"/>
+          </a:fontRef>
+        </p:style>
+        <p:txBody>
+          <a:bodyPr rtlCol="0" anchor="ctr">
+            <a:normAutofit/>
+          </a:bodyPr>
+          <a:lstStyle/>
+          <a:p>
+            <a:pPr algn="ctr"/>
+            <a:r>
+              <a:rPr lang="en-SG" sz="1600" dirty="0">
+                <a:solidFill>
+                  <a:srgbClr val="FFFFFF"/>
+                </a:solidFill>
+              </a:rPr>
+              <a:t>Callout</a:t>
+            </a:r>
+          </a:p>
+        </p:txBody>
+      </p:sp>
+    </p:spTree>
+    <p:extLst>
+      <p:ext uri="{BB962C8B-B14F-4D97-AF65-F5344CB8AC3E}">
+        <p14:creationId xmlns:p14="http://schemas.microsoft.com/office/powerpoint/2010/main" val="2029890964"/>
+      </p:ext>
+    </p:extLst>
+  </p:cSld>
+  <p:clrMapOvr>
+    <a:masterClrMapping/>
+  </p:clrMapOvr>
+  <p:timing>
+    <p:tnLst>
+      <p:par>
+        <p:cTn id="1" dur="indefinite" restart="never" nodeType="tmRoot">
+          <p:childTnLst>
+            <p:seq concurrent="1" nextAc="seek">
+              <p:cTn id="2" dur="indefinite" nodeType="mainSeq">
+                <p:childTnLst>
+                  <p:par>
+                    <p:cTn id="3" fill="hold">
+                      <p:stCondLst>
+                        <p:cond delay="indefinite"/>
+                      </p:stCondLst>
+                      <p:childTnLst>
+                        <p:par>
+                          <p:cTn id="4" fill="hold">
+                            <p:stCondLst>
+                              <p:cond delay="0"/>
+                            </p:stCondLst>
+                            <p:childTnLst>
+                              <p:par>
+                                <p:cTn id="5" presetID="10" presetClass="entr" presetSubtype="0" fill="hold" grpId="0" nodeType="clickEffect">
+                                  <p:stCondLst>
+                                    <p:cond delay="0"/>
+                                  </p:stCondLst>
+                                  <p:childTnLst>
+                                    <p:set>
+                                      <p:cBhvr>
+                                        <p:cTn id="6" dur="1" fill="hold">
+                                          <p:stCondLst>
+                                            <p:cond delay="0"/>
+                                          </p:stCondLst>
+                                        </p:cTn>
+                                        <p:tgtEl>
+                                          <p:spTgt spid="5"/>
+                                        </p:tgtEl>
+                                        <p:attrNameLst>
+                                          <p:attrName>style.visibility</p:attrName>
+                                        </p:attrNameLst>
+                                      </p:cBhvr>
+                                      <p:to>
+                                        <p:strVal val="visible"/>
+                                      </p:to>
+                                    </p:set>
+                                    <p:animEffect transition="in" filter="fade">
+                                      <p:cBhvr>
+                                        <p:cTn id="7" dur="500"/>
+                                        <p:tgtEl>
+                                          <p:spTgt spid="5"/>
+                                        </p:tgtEl>
+                                      </p:cBhvr>
+                                    </p:animEffect>
+                                  </p:childTnLst>
+                                </p:cTn>
+                              </p:par>
+                            </p:childTnLst>
+                          </p:cTn>
+                        </p:par>
+                      </p:childTnLst>
+                    </p:cTn>
+                  </p:par>
+                  <p:par>
+                    <p:cTn id="8" fill="hold">
+                      <p:stCondLst>
+                        <p:cond delay="indefinite"/>
+                      </p:stCondLst>
+                      <p:childTnLst>
+                        <p:par>
+                          <p:cTn id="9" fill="hold">
+                            <p:stCondLst>
+                              <p:cond delay="0"/>
+                            </p:stCondLst>
+                            <p:childTnLst>
+                              <p:par>
+                                <p:cTn id="10" presetID="10" presetClass="exit" presetSubtype="0" fill="hold" grpId="1" nodeType="clickEffect">
+                                  <p:stCondLst>
+                                    <p:cond delay="0"/>
+                                  </p:stCondLst>
+                                  <p:childTnLst>
+                                    <p:animEffect transition="out" filter="fade">
+                                      <p:cBhvr>
+                                        <p:cTn id="11" dur="500"/>
+                                        <p:tgtEl>
+                                          <p:spTgt spid="5"/>
+                                        </p:tgtEl>
+                                      </p:cBhvr>
+                                    </p:animEffect>
+                                    <p:set>
+                                      <p:cBhvr>
+                                        <p:cTn id="12" dur="1" fill="hold">
+                                          <p:stCondLst>
+                                            <p:cond delay="499"/>
+                                          </p:stCondLst>
+                                        </p:cTn>
+                                        <p:tgtEl>
+                                          <p:spTgt spid="5"/>
+                                        </p:tgtEl>
+                                        <p:attrNameLst>
+                                          <p:attrName>style.visibility</p:attrName>
+                                        </p:attrNameLst>
+                                      </p:cBhvr>
+                                      <p:to>
+                                        <p:strVal val="hidden"/>
+                                      </p:to>
+                                    </p:set>
+                                  </p:childTnLst>
+                                </p:cTn>
+                              </p:par>
+                            </p:childTnLst>
+                          </p:cTn>
+                        </p:par>
+                      </p:childTnLst>
+                    </p:cTn>
+                  </p:par>
+                </p:childTnLst>
+              </p:cTn>
+              <p:prevCondLst>
+                <p:cond evt="onPrev" delay="0">
+                  <p:tgtEl>
+                    <p:sldTgt/>
+                  </p:tgtEl>
+                </p:cond>
+              </p:prevCondLst>
+              <p:nextCondLst>
+                <p:cond evt="onNext" delay="0">
+                  <p:tgtEl>
+                    <p:sldTgt/>
+                  </p:tgtEl>
+                </p:cond>
+              </p:nextCondLst>
+            </p:seq>
+          </p:childTnLst>
+        </p:cTn>
+      </p:par>
+    </p:tnLst>
+    <p:bldLst>
+      <p:bldP spid="5" grpId="0" animBg="1"/>
+      <p:bldP spid="5" grpId="1" animBg="1"/>
+    </p:bldLst>
+  </p:timing>
+</p:sld>
+</file>
+
+<file path=ppt/slides/slide8.xml><?xml version="1.0" encoding="utf-8"?>
+<p:sld xmlns:a="http://schemas.openxmlformats.org/drawingml/2006/main" xmlns:r="http://schemas.openxmlformats.org/officeDocument/2006/relationships" xmlns:p="http://schemas.openxmlformats.org/presentationml/2006/main">
+  <p:cSld>
+    <p:spTree>
+      <p:nvGrpSpPr>
+        <p:cNvPr id="1" name=""/>
+        <p:cNvGrpSpPr/>
+        <p:nvPr/>
+      </p:nvGrpSpPr>
+      <p:grpSpPr>
+        <a:xfrm>
+          <a:off x="0" y="0"/>
+          <a:ext cx="0" cy="0"/>
+          <a:chOff x="0" y="0"/>
+          <a:chExt cx="0" cy="0"/>
+        </a:xfrm>
+      </p:grpSpPr>
+      <p:sp>
+        <p:nvSpPr>
+          <p:cNvPr id="4" name="Trigger">
+            <a:extLst>
+              <a:ext uri="{FF2B5EF4-FFF2-40B4-BE49-F238E27FC236}">
+                <a16:creationId xmlns:a16="http://schemas.microsoft.com/office/drawing/2014/main" id="{B576714E-36F2-4FCC-9365-7AAC0983AB5F}"/>
+              </a:ext>
+            </a:extLst>
+          </p:cNvPr>
+          <p:cNvSpPr/>
+          <p:nvPr/>
+        </p:nvSpPr>
+        <p:spPr>
+          <a:xfrm>
+            <a:off x="1600200" y="3733800"/>
+            <a:ext cx="1219200" cy="1219200"/>
+          </a:xfrm>
+          <a:prstGeom prst="ellipse">
+            <a:avLst/>
+          </a:prstGeom>
+        </p:spPr>
+        <p:style>
+          <a:lnRef idx="2">
+            <a:schemeClr val="accent1">
+              <a:shade val="50000"/>
+            </a:schemeClr>
+          </a:lnRef>
+          <a:fillRef idx="1">
+            <a:schemeClr val="accent1"/>
+          </a:fillRef>
+          <a:effectRef idx="0">
+            <a:schemeClr val="accent1"/>
+          </a:effectRef>
+          <a:fontRef idx="minor">
+            <a:schemeClr val="lt1"/>
+          </a:fontRef>
+        </p:style>
+        <p:txBody>
+          <a:bodyPr rtlCol="0" anchor="ctr"/>
+          <a:lstStyle/>
+          <a:p>
+            <a:pPr algn="ctr"/>
+            <a:r>
+              <a:rPr lang="en-US" dirty="0"/>
+              <a:t>Trigger</a:t>
+            </a:r>
+          </a:p>
+        </p:txBody>
+      </p:sp>
+      <p:sp>
+        <p:nvSpPr>
+          <p:cNvPr id="5" name="Callout">
+            <a:extLst>
+              <a:ext uri="{FF2B5EF4-FFF2-40B4-BE49-F238E27FC236}">
+                <a16:creationId xmlns:a16="http://schemas.microsoft.com/office/drawing/2014/main" id="{FABB3E41-1653-4277-BE7E-D96C61AAF553}"/>
+              </a:ext>
+            </a:extLst>
+          </p:cNvPr>
+          <p:cNvSpPr/>
+          <p:nvPr/>
+        </p:nvSpPr>
+        <p:spPr>
+          <a:xfrm>
+            <a:off x="1866900" y="2209800"/>
+            <a:ext cx="1905000" cy="1270000"/>
+          </a:xfrm>
+          <a:prstGeom prst="wedgeRoundRectCallout">
+            <a:avLst/>
+          </a:prstGeom>
+          <a:solidFill>
+            <a:srgbClr val="000000">
+              <a:alpha val="80000"/>
+            </a:srgbClr>
+          </a:solidFill>
+          <a:ln w="635">
+            <a:solidFill>
+              <a:srgbClr val="FFFF00"/>
+            </a:solidFill>
+          </a:ln>
+          <a:effectLst>
+            <a:outerShdw blurRad="63500" sx="102000" sy="102000" algn="ctr">
+              <a:prstClr val="black">
+                <a:alpha val="40000"/>
+              </a:prstClr>
+            </a:outerShdw>
+          </a:effectLst>
+        </p:spPr>
+        <p:style>
+          <a:lnRef idx="2">
+            <a:schemeClr val="accent1">
+              <a:shade val="50000"/>
+            </a:schemeClr>
+          </a:lnRef>
+          <a:fillRef idx="1">
+            <a:schemeClr val="accent1"/>
+          </a:fillRef>
+          <a:effectRef idx="0">
+            <a:schemeClr val="accent1"/>
+          </a:effectRef>
+          <a:fontRef idx="minor">
+            <a:schemeClr val="lt1"/>
+          </a:fontRef>
+        </p:style>
+        <p:txBody>
+          <a:bodyPr rtlCol="0" anchor="ctr">
+            <a:normAutofit/>
+          </a:bodyPr>
+          <a:lstStyle/>
+          <a:p>
+            <a:pPr algn="ctr"/>
+            <a:r>
+              <a:rPr lang="en-SG" sz="1600" dirty="0">
+                <a:solidFill>
+                  <a:srgbClr val="FFFFFF"/>
+                </a:solidFill>
+              </a:rPr>
+              <a:t>Callout</a:t>
+            </a:r>
+          </a:p>
+        </p:txBody>
+      </p:sp>
+    </p:spTree>
+    <p:extLst>
+      <p:ext uri="{BB962C8B-B14F-4D97-AF65-F5344CB8AC3E}">
+        <p14:creationId xmlns:p14="http://schemas.microsoft.com/office/powerpoint/2010/main" val="2346979735"/>
+      </p:ext>
+    </p:extLst>
+  </p:cSld>
+  <p:clrMapOvr>
+    <a:masterClrMapping/>
+  </p:clrMapOvr>
+  <p:timing>
+    <p:tnLst>
+      <p:par>
+        <p:cTn id="1" dur="indefinite" restart="never" nodeType="tmRoot">
+          <p:childTnLst>
+            <p:seq concurrent="1" nextAc="seek">
+              <p:cTn id="2" dur="indefinite" nodeType="mainSeq">
+                <p:childTnLst>
+                  <p:par>
+                    <p:cTn id="3" fill="hold">
+                      <p:stCondLst>
+                        <p:cond delay="indefinite"/>
+                      </p:stCondLst>
+                      <p:childTnLst>
+                        <p:par>
+                          <p:cTn id="4" fill="hold">
+                            <p:stCondLst>
+                              <p:cond delay="0"/>
+                            </p:stCondLst>
+                            <p:childTnLst>
+                              <p:par>
+                                <p:cTn id="5" presetID="10" presetClass="entr" presetSubtype="0" fill="hold" grpId="0" nodeType="clickEffect">
+                                  <p:stCondLst>
+                                    <p:cond delay="0"/>
+                                  </p:stCondLst>
+                                  <p:childTnLst>
+                                    <p:set>
+                                      <p:cBhvr>
+                                        <p:cTn id="6" dur="1" fill="hold">
+                                          <p:stCondLst>
+                                            <p:cond delay="0"/>
+                                          </p:stCondLst>
+                                        </p:cTn>
+                                        <p:tgtEl>
+                                          <p:spTgt spid="5"/>
+                                        </p:tgtEl>
+                                        <p:attrNameLst>
+                                          <p:attrName>style.visibility</p:attrName>
+                                        </p:attrNameLst>
+                                      </p:cBhvr>
+                                      <p:to>
+                                        <p:strVal val="visible"/>
+                                      </p:to>
+                                    </p:set>
+                                    <p:animEffect transition="in" filter="fade">
+                                      <p:cBhvr>
+                                        <p:cTn id="7" dur="500"/>
+                                        <p:tgtEl>
+                                          <p:spTgt spid="5"/>
+                                        </p:tgtEl>
+                                      </p:cBhvr>
+                                    </p:animEffect>
+                                  </p:childTnLst>
+                                </p:cTn>
+                              </p:par>
+                            </p:childTnLst>
+                          </p:cTn>
+                        </p:par>
+                      </p:childTnLst>
+                    </p:cTn>
+                  </p:par>
+                  <p:par>
+                    <p:cTn id="8" fill="hold">
+                      <p:stCondLst>
+                        <p:cond delay="indefinite"/>
+                      </p:stCondLst>
+                      <p:childTnLst>
+                        <p:par>
+                          <p:cTn id="9" fill="hold">
+                            <p:stCondLst>
+                              <p:cond delay="0"/>
+                            </p:stCondLst>
+                            <p:childTnLst>
+                              <p:par>
+                                <p:cTn id="10" presetID="10" presetClass="exit" presetSubtype="0" fill="hold" grpId="1" nodeType="clickEffect">
+                                  <p:stCondLst>
+                                    <p:cond delay="0"/>
+                                  </p:stCondLst>
+                                  <p:childTnLst>
+                                    <p:animEffect transition="out" filter="fade">
+                                      <p:cBhvr>
+                                        <p:cTn id="11" dur="500"/>
+                                        <p:tgtEl>
+                                          <p:spTgt spid="5"/>
+                                        </p:tgtEl>
+                                      </p:cBhvr>
+                                    </p:animEffect>
+                                    <p:set>
+                                      <p:cBhvr>
+                                        <p:cTn id="12" dur="1" fill="hold">
+                                          <p:stCondLst>
+                                            <p:cond delay="499"/>
+                                          </p:stCondLst>
+                                        </p:cTn>
+                                        <p:tgtEl>
+                                          <p:spTgt spid="5"/>
+                                        </p:tgtEl>
+                                        <p:attrNameLst>
+                                          <p:attrName>style.visibility</p:attrName>
+                                        </p:attrNameLst>
+                                      </p:cBhvr>
+                                      <p:to>
+                                        <p:strVal val="hidden"/>
+                                      </p:to>
+                                    </p:set>
+                                  </p:childTnLst>
+                                </p:cTn>
+                              </p:par>
+                            </p:childTnLst>
+                          </p:cTn>
+                        </p:par>
+                      </p:childTnLst>
+                    </p:cTn>
+                  </p:par>
+                </p:childTnLst>
+              </p:cTn>
+              <p:prevCondLst>
+                <p:cond evt="onPrev" delay="0">
+                  <p:tgtEl>
+                    <p:sldTgt/>
+                  </p:tgtEl>
+                </p:cond>
+              </p:prevCondLst>
+              <p:nextCondLst>
+                <p:cond evt="onNext" delay="0">
+                  <p:tgtEl>
+                    <p:sldTgt/>
+                  </p:tgtEl>
+                </p:cond>
+              </p:nextCondLst>
+            </p:seq>
+            <p:seq concurrent="1" nextAc="seek">
+              <p:cTn id="13" restart="whenNotActive" fill="hold" evtFilter="cancelBubble" nodeType="interactiveSeq">
+                <p:stCondLst>
+                  <p:cond evt="onClick" delay="0">
+                    <p:tgtEl>
+                      <p:spTgt spid="4"/>
+                    </p:tgtEl>
+                  </p:cond>
+                </p:stCondLst>
+                <p:endSync evt="end" delay="0">
+                  <p:rtn val="all"/>
+                </p:endSync>
+                <p:childTnLst>
+                  <p:par>
+                    <p:cTn id="14" fill="hold">
+                      <p:stCondLst>
+                        <p:cond delay="0"/>
+                      </p:stCondLst>
+                      <p:childTnLst>
+                        <p:par>
+                          <p:cTn id="15" fill="hold">
+                            <p:stCondLst>
+                              <p:cond delay="0"/>
+                            </p:stCondLst>
+                            <p:childTnLst>
+                              <p:par>
+                                <p:cTn id="16" presetID="10" presetClass="entr" presetSubtype="0" fill="hold" grpId="2" nodeType="clickEffect">
+                                  <p:stCondLst>
+                                    <p:cond delay="0"/>
+                                  </p:stCondLst>
+                                  <p:childTnLst>
+                                    <p:set>
+                                      <p:cBhvr>
+                                        <p:cTn id="17" dur="1" fill="hold">
+                                          <p:stCondLst>
+                                            <p:cond delay="0"/>
+                                          </p:stCondLst>
+                                        </p:cTn>
+                                        <p:tgtEl>
+                                          <p:spTgt spid="5"/>
+                                        </p:tgtEl>
+                                        <p:attrNameLst>
+                                          <p:attrName>style.visibility</p:attrName>
+                                        </p:attrNameLst>
+                                      </p:cBhvr>
+                                      <p:to>
+                                        <p:strVal val="visible"/>
+                                      </p:to>
+                                    </p:set>
+                                    <p:animEffect transition="in" filter="fade">
+                                      <p:cBhvr>
+                                        <p:cTn id="18" dur="500"/>
+                                        <p:tgtEl>
+                                          <p:spTgt spid="5"/>
+                                        </p:tgtEl>
+                                      </p:cBhvr>
+                                    </p:animEffect>
+                                  </p:childTnLst>
+                                </p:cTn>
+                              </p:par>
+                            </p:childTnLst>
+                          </p:cTn>
+                        </p:par>
+                      </p:childTnLst>
+                    </p:cTn>
+                  </p:par>
+                  <p:par>
+                    <p:cTn id="19" fill="hold">
+                      <p:stCondLst>
+                        <p:cond delay="indefinite"/>
+                      </p:stCondLst>
+                      <p:childTnLst>
+                        <p:par>
+                          <p:cTn id="20" fill="hold">
+                            <p:stCondLst>
+                              <p:cond delay="0"/>
+                            </p:stCondLst>
+                            <p:childTnLst>
+                              <p:par>
+                                <p:cTn id="21" presetID="10" presetClass="exit" presetSubtype="0" fill="hold" grpId="3" nodeType="clickEffect">
+                                  <p:stCondLst>
+                                    <p:cond delay="0"/>
+                                  </p:stCondLst>
+                                  <p:childTnLst>
+                                    <p:animEffect transition="out" filter="fade">
+                                      <p:cBhvr>
+                                        <p:cTn id="22" dur="500"/>
+                                        <p:tgtEl>
+                                          <p:spTgt spid="5"/>
+                                        </p:tgtEl>
+                                      </p:cBhvr>
+                                    </p:animEffect>
+                                    <p:set>
+                                      <p:cBhvr>
+                                        <p:cTn id="23" dur="1" fill="hold">
+                                          <p:stCondLst>
+                                            <p:cond delay="499"/>
+                                          </p:stCondLst>
+                                        </p:cTn>
+                                        <p:tgtEl>
+                                          <p:spTgt spid="5"/>
+                                        </p:tgtEl>
+                                        <p:attrNameLst>
+                                          <p:attrName>style.visibility</p:attrName>
+                                        </p:attrNameLst>
+                                      </p:cBhvr>
+                                      <p:to>
+                                        <p:strVal val="hidden"/>
+                                      </p:to>
+                                    </p:set>
+                                  </p:childTnLst>
+                                </p:cTn>
+                              </p:par>
+                            </p:childTnLst>
+                          </p:cTn>
+                        </p:par>
+                      </p:childTnLst>
+                    </p:cTn>
+                  </p:par>
+                </p:childTnLst>
+              </p:cTn>
+              <p:nextCondLst>
+                <p:cond evt="onClick" delay="0">
+                  <p:tgtEl>
+                    <p:spTgt spid="4"/>
+                  </p:tgtEl>
+                </p:cond>
+              </p:nextCondLst>
+            </p:seq>
+          </p:childTnLst>
+        </p:cTn>
+      </p:par>
+    </p:tnLst>
+    <p:bldLst>
+      <p:bldP spid="5" grpId="0" animBg="1"/>
+      <p:bldP spid="5" grpId="1" animBg="1"/>
+      <p:bldP spid="5" grpId="2" animBg="1"/>
+      <p:bldP spid="5" grpId="3" animBg="1"/>
+    </p:bldLst>
+  </p:timing>
+</p:sld>
+</file>
+
+<file path=ppt/slides/slide9.xml><?xml version="1.0" encoding="utf-8"?>
+<p:sld xmlns:a="http://schemas.openxmlformats.org/drawingml/2006/main" xmlns:r="http://schemas.openxmlformats.org/officeDocument/2006/relationships" xmlns:p="http://schemas.openxmlformats.org/presentationml/2006/main">
+  <p:cSld>
+    <p:bg>
+      <p:bgPr>
+        <a:solidFill>
+          <a:srgbClr val="0070BF"/>
+        </a:solidFill>
+        <a:effectLst/>
+      </p:bgPr>
+    </p:bg>
+    <p:spTree>
+      <p:nvGrpSpPr>
+        <p:cNvPr id="1" name=""/>
+        <p:cNvGrpSpPr/>
+        <p:nvPr/>
+      </p:nvGrpSpPr>
+      <p:grpSpPr>
+        <a:xfrm>
+          <a:off x="0" y="0"/>
+          <a:ext cx="0" cy="0"/>
+          <a:chOff x="0" y="0"/>
+          <a:chExt cx="0" cy="0"/>
+        </a:xfrm>
+      </p:grpSpPr>
+      <p:sp>
+        <p:nvSpPr>
+          <p:cNvPr id="2" name="Title 1"/>
+          <p:cNvSpPr>
+            <a:spLocks noGrp="1"/>
+          </p:cNvSpPr>
+          <p:nvPr>
+            <p:ph type="title"/>
+          </p:nvPr>
+        </p:nvSpPr>
+        <p:spPr>
+          <a:solidFill>
+            <a:srgbClr val="0070BF"/>
+          </a:solidFill>
+        </p:spPr>
+        <p:txBody>
+          <a:bodyPr/>
+          <a:lstStyle/>
+          <a:p>
+            <a:r>
+              <a:rPr lang="en-US" dirty="0"/>
+              <a:t>Convert Shapes To Tooltip: Three shapes</a:t>
+            </a:r>
+            <a:endParaRPr lang="en-SG" dirty="0"/>
+          </a:p>
+        </p:txBody>
+      </p:sp>
+      <p:sp>
+        <p:nvSpPr>
+          <p:cNvPr id="4" name="Content Placeholder 2"/>
+          <p:cNvSpPr>
+            <a:spLocks noGrp="1"/>
+          </p:cNvSpPr>
+          <p:nvPr>
+            <p:ph idx="1"/>
+          </p:nvPr>
+        </p:nvSpPr>
+        <p:spPr>
+          <a:xfrm>
+            <a:off x="457200" y="3124200"/>
+            <a:ext cx="8229600" cy="3001963"/>
+          </a:xfrm>
+        </p:spPr>
+        <p:txBody>
+          <a:bodyPr/>
+          <a:lstStyle/>
+          <a:p>
+            <a:r>
+              <a:rPr lang="en-US" dirty="0"/>
+              <a:t>Select trigger</a:t>
+            </a:r>
+          </a:p>
+          <a:p>
+            <a:r>
+              <a:rPr lang="en-US" dirty="0"/>
+              <a:t>Select callout</a:t>
+            </a:r>
+          </a:p>
+          <a:p>
+            <a:r>
+              <a:rPr lang="en-US" dirty="0"/>
+              <a:t>Select callout 2</a:t>
+            </a:r>
+          </a:p>
+          <a:p>
+            <a:r>
+              <a:rPr lang="en-US" dirty="0"/>
+              <a:t>Click ‘Convert Shapes to Tooltip’</a:t>
+            </a:r>
+            <a:endParaRPr lang="en-SG" dirty="0"/>
+          </a:p>
+        </p:txBody>
+      </p:sp>
+    </p:spTree>
+    <p:extLst>
+      <p:ext uri="{BB962C8B-B14F-4D97-AF65-F5344CB8AC3E}">
+        <p14:creationId xmlns:p14="http://schemas.microsoft.com/office/powerpoint/2010/main" val="753770252"/>
       </p:ext>
     </p:extLst>
   </p:cSld>

</xml_diff>

<commit_message>
Add test case for 10 shapes.
</commit_message>
<xml_diff>
--- a/doc/test/TooltipsLab/ConvertToTooltip.pptx
+++ b/doc/test/TooltipsLab/ConvertToTooltip.pptx
@@ -7,7 +7,7 @@
     <p:sldMasterId id="2147483672" r:id="rId3"/>
   </p:sldMasterIdLst>
   <p:notesMasterIdLst>
-    <p:notesMasterId r:id="rId16"/>
+    <p:notesMasterId r:id="rId19"/>
   </p:notesMasterIdLst>
   <p:sldIdLst>
     <p:sldId id="287" r:id="rId4"/>
@@ -21,7 +21,10 @@
     <p:sldId id="315" r:id="rId12"/>
     <p:sldId id="333" r:id="rId13"/>
     <p:sldId id="334" r:id="rId14"/>
-    <p:sldId id="305" r:id="rId15"/>
+    <p:sldId id="339" r:id="rId15"/>
+    <p:sldId id="340" r:id="rId16"/>
+    <p:sldId id="341" r:id="rId17"/>
+    <p:sldId id="305" r:id="rId18"/>
   </p:sldIdLst>
   <p:sldSz cx="9144000" cy="6858000" type="screen4x3"/>
   <p:notesSz cx="6858000" cy="9144000"/>
@@ -140,6 +143,9 @@
             <p14:sldId id="315"/>
             <p14:sldId id="333"/>
             <p14:sldId id="334"/>
+            <p14:sldId id="339"/>
+            <p14:sldId id="340"/>
+            <p14:sldId id="341"/>
             <p14:sldId id="305"/>
           </p14:sldIdLst>
         </p14:section>
@@ -245,7 +251,7 @@
           <a:p>
             <a:fld id="{7B6B14F6-3F9A-43ED-BCC2-4547CC5017BD}" type="datetimeFigureOut">
               <a:rPr lang="en-SG" smtClean="0"/>
-              <a:t>11/4/2019</a:t>
+              <a:t>18/4/2019</a:t>
             </a:fld>
             <a:endParaRPr lang="en-SG"/>
           </a:p>
@@ -692,7 +698,7 @@
           <a:p>
             <a:fld id="{699DC775-C286-4358-8C92-D7E584E969B3}" type="datetimeFigureOut">
               <a:rPr lang="en-US" smtClean="0"/>
-              <a:t>4/11/2019</a:t>
+              <a:t>4/18/2019</a:t>
             </a:fld>
             <a:endParaRPr lang="en-US"/>
           </a:p>
@@ -860,7 +866,7 @@
           <a:p>
             <a:fld id="{699DC775-C286-4358-8C92-D7E584E969B3}" type="datetimeFigureOut">
               <a:rPr lang="en-US" smtClean="0"/>
-              <a:t>4/11/2019</a:t>
+              <a:t>4/18/2019</a:t>
             </a:fld>
             <a:endParaRPr lang="en-US"/>
           </a:p>
@@ -1038,7 +1044,7 @@
           <a:p>
             <a:fld id="{699DC775-C286-4358-8C92-D7E584E969B3}" type="datetimeFigureOut">
               <a:rPr lang="en-US" smtClean="0"/>
-              <a:t>4/11/2019</a:t>
+              <a:t>4/18/2019</a:t>
             </a:fld>
             <a:endParaRPr lang="en-US"/>
           </a:p>
@@ -1278,7 +1284,7 @@
           <a:p>
             <a:fld id="{699DC775-C286-4358-8C92-D7E584E969B3}" type="datetimeFigureOut">
               <a:rPr lang="en-US" smtClean="0"/>
-              <a:t>4/11/2019</a:t>
+              <a:t>4/18/2019</a:t>
             </a:fld>
             <a:endParaRPr lang="en-US"/>
           </a:p>
@@ -1446,7 +1452,7 @@
           <a:p>
             <a:fld id="{699DC775-C286-4358-8C92-D7E584E969B3}" type="datetimeFigureOut">
               <a:rPr lang="en-US" smtClean="0"/>
-              <a:t>4/11/2019</a:t>
+              <a:t>4/18/2019</a:t>
             </a:fld>
             <a:endParaRPr lang="en-US"/>
           </a:p>
@@ -1691,7 +1697,7 @@
           <a:p>
             <a:fld id="{699DC775-C286-4358-8C92-D7E584E969B3}" type="datetimeFigureOut">
               <a:rPr lang="en-US" smtClean="0"/>
-              <a:t>4/11/2019</a:t>
+              <a:t>4/18/2019</a:t>
             </a:fld>
             <a:endParaRPr lang="en-US"/>
           </a:p>
@@ -1976,7 +1982,7 @@
           <a:p>
             <a:fld id="{699DC775-C286-4358-8C92-D7E584E969B3}" type="datetimeFigureOut">
               <a:rPr lang="en-US" smtClean="0"/>
-              <a:t>4/11/2019</a:t>
+              <a:t>4/18/2019</a:t>
             </a:fld>
             <a:endParaRPr lang="en-US"/>
           </a:p>
@@ -2395,7 +2401,7 @@
           <a:p>
             <a:fld id="{699DC775-C286-4358-8C92-D7E584E969B3}" type="datetimeFigureOut">
               <a:rPr lang="en-US" smtClean="0"/>
-              <a:t>4/11/2019</a:t>
+              <a:t>4/18/2019</a:t>
             </a:fld>
             <a:endParaRPr lang="en-US"/>
           </a:p>
@@ -2512,7 +2518,7 @@
           <a:p>
             <a:fld id="{699DC775-C286-4358-8C92-D7E584E969B3}" type="datetimeFigureOut">
               <a:rPr lang="en-US" smtClean="0"/>
-              <a:t>4/11/2019</a:t>
+              <a:t>4/18/2019</a:t>
             </a:fld>
             <a:endParaRPr lang="en-US"/>
           </a:p>
@@ -2607,7 +2613,7 @@
           <a:p>
             <a:fld id="{699DC775-C286-4358-8C92-D7E584E969B3}" type="datetimeFigureOut">
               <a:rPr lang="en-US" smtClean="0"/>
-              <a:t>4/11/2019</a:t>
+              <a:t>4/18/2019</a:t>
             </a:fld>
             <a:endParaRPr lang="en-US"/>
           </a:p>
@@ -2882,7 +2888,7 @@
           <a:p>
             <a:fld id="{699DC775-C286-4358-8C92-D7E584E969B3}" type="datetimeFigureOut">
               <a:rPr lang="en-US" smtClean="0"/>
-              <a:t>4/11/2019</a:t>
+              <a:t>4/18/2019</a:t>
             </a:fld>
             <a:endParaRPr lang="en-US"/>
           </a:p>
@@ -3050,7 +3056,7 @@
           <a:p>
             <a:fld id="{699DC775-C286-4358-8C92-D7E584E969B3}" type="datetimeFigureOut">
               <a:rPr lang="en-US" smtClean="0"/>
-              <a:t>4/11/2019</a:t>
+              <a:t>4/18/2019</a:t>
             </a:fld>
             <a:endParaRPr lang="en-US"/>
           </a:p>
@@ -3302,7 +3308,7 @@
           <a:p>
             <a:fld id="{699DC775-C286-4358-8C92-D7E584E969B3}" type="datetimeFigureOut">
               <a:rPr lang="en-US" smtClean="0"/>
-              <a:t>4/11/2019</a:t>
+              <a:t>4/18/2019</a:t>
             </a:fld>
             <a:endParaRPr lang="en-US"/>
           </a:p>
@@ -3470,7 +3476,7 @@
           <a:p>
             <a:fld id="{699DC775-C286-4358-8C92-D7E584E969B3}" type="datetimeFigureOut">
               <a:rPr lang="en-US" smtClean="0"/>
-              <a:t>4/11/2019</a:t>
+              <a:t>4/18/2019</a:t>
             </a:fld>
             <a:endParaRPr lang="en-US"/>
           </a:p>
@@ -3648,7 +3654,7 @@
           <a:p>
             <a:fld id="{699DC775-C286-4358-8C92-D7E584E969B3}" type="datetimeFigureOut">
               <a:rPr lang="en-US" smtClean="0"/>
-              <a:t>4/11/2019</a:t>
+              <a:t>4/18/2019</a:t>
             </a:fld>
             <a:endParaRPr lang="en-US"/>
           </a:p>
@@ -3888,7 +3894,7 @@
           <a:p>
             <a:fld id="{699DC775-C286-4358-8C92-D7E584E969B3}" type="datetimeFigureOut">
               <a:rPr lang="en-US" smtClean="0"/>
-              <a:t>4/11/2019</a:t>
+              <a:t>4/18/2019</a:t>
             </a:fld>
             <a:endParaRPr lang="en-US"/>
           </a:p>
@@ -4056,7 +4062,7 @@
           <a:p>
             <a:fld id="{699DC775-C286-4358-8C92-D7E584E969B3}" type="datetimeFigureOut">
               <a:rPr lang="en-US" smtClean="0"/>
-              <a:t>4/11/2019</a:t>
+              <a:t>4/18/2019</a:t>
             </a:fld>
             <a:endParaRPr lang="en-US"/>
           </a:p>
@@ -4301,7 +4307,7 @@
           <a:p>
             <a:fld id="{699DC775-C286-4358-8C92-D7E584E969B3}" type="datetimeFigureOut">
               <a:rPr lang="en-US" smtClean="0"/>
-              <a:t>4/11/2019</a:t>
+              <a:t>4/18/2019</a:t>
             </a:fld>
             <a:endParaRPr lang="en-US"/>
           </a:p>
@@ -4586,7 +4592,7 @@
           <a:p>
             <a:fld id="{699DC775-C286-4358-8C92-D7E584E969B3}" type="datetimeFigureOut">
               <a:rPr lang="en-US" smtClean="0"/>
-              <a:t>4/11/2019</a:t>
+              <a:t>4/18/2019</a:t>
             </a:fld>
             <a:endParaRPr lang="en-US"/>
           </a:p>
@@ -5005,7 +5011,7 @@
           <a:p>
             <a:fld id="{699DC775-C286-4358-8C92-D7E584E969B3}" type="datetimeFigureOut">
               <a:rPr lang="en-US" smtClean="0"/>
-              <a:t>4/11/2019</a:t>
+              <a:t>4/18/2019</a:t>
             </a:fld>
             <a:endParaRPr lang="en-US"/>
           </a:p>
@@ -5122,7 +5128,7 @@
           <a:p>
             <a:fld id="{699DC775-C286-4358-8C92-D7E584E969B3}" type="datetimeFigureOut">
               <a:rPr lang="en-US" smtClean="0"/>
-              <a:t>4/11/2019</a:t>
+              <a:t>4/18/2019</a:t>
             </a:fld>
             <a:endParaRPr lang="en-US"/>
           </a:p>
@@ -5217,7 +5223,7 @@
           <a:p>
             <a:fld id="{699DC775-C286-4358-8C92-D7E584E969B3}" type="datetimeFigureOut">
               <a:rPr lang="en-US" smtClean="0"/>
-              <a:t>4/11/2019</a:t>
+              <a:t>4/18/2019</a:t>
             </a:fld>
             <a:endParaRPr lang="en-US"/>
           </a:p>
@@ -5462,7 +5468,7 @@
           <a:p>
             <a:fld id="{699DC775-C286-4358-8C92-D7E584E969B3}" type="datetimeFigureOut">
               <a:rPr lang="en-US" smtClean="0"/>
-              <a:t>4/11/2019</a:t>
+              <a:t>4/18/2019</a:t>
             </a:fld>
             <a:endParaRPr lang="en-US"/>
           </a:p>
@@ -5737,7 +5743,7 @@
           <a:p>
             <a:fld id="{699DC775-C286-4358-8C92-D7E584E969B3}" type="datetimeFigureOut">
               <a:rPr lang="en-US" smtClean="0"/>
-              <a:t>4/11/2019</a:t>
+              <a:t>4/18/2019</a:t>
             </a:fld>
             <a:endParaRPr lang="en-US"/>
           </a:p>
@@ -5989,7 +5995,7 @@
           <a:p>
             <a:fld id="{699DC775-C286-4358-8C92-D7E584E969B3}" type="datetimeFigureOut">
               <a:rPr lang="en-US" smtClean="0"/>
-              <a:t>4/11/2019</a:t>
+              <a:t>4/18/2019</a:t>
             </a:fld>
             <a:endParaRPr lang="en-US"/>
           </a:p>
@@ -6157,7 +6163,7 @@
           <a:p>
             <a:fld id="{699DC775-C286-4358-8C92-D7E584E969B3}" type="datetimeFigureOut">
               <a:rPr lang="en-US" smtClean="0"/>
-              <a:t>4/11/2019</a:t>
+              <a:t>4/18/2019</a:t>
             </a:fld>
             <a:endParaRPr lang="en-US"/>
           </a:p>
@@ -6335,7 +6341,7 @@
           <a:p>
             <a:fld id="{699DC775-C286-4358-8C92-D7E584E969B3}" type="datetimeFigureOut">
               <a:rPr lang="en-US" smtClean="0"/>
-              <a:t>4/11/2019</a:t>
+              <a:t>4/18/2019</a:t>
             </a:fld>
             <a:endParaRPr lang="en-US"/>
           </a:p>
@@ -6620,7 +6626,7 @@
           <a:p>
             <a:fld id="{699DC775-C286-4358-8C92-D7E584E969B3}" type="datetimeFigureOut">
               <a:rPr lang="en-US" smtClean="0"/>
-              <a:t>4/11/2019</a:t>
+              <a:t>4/18/2019</a:t>
             </a:fld>
             <a:endParaRPr lang="en-US"/>
           </a:p>
@@ -7039,7 +7045,7 @@
           <a:p>
             <a:fld id="{699DC775-C286-4358-8C92-D7E584E969B3}" type="datetimeFigureOut">
               <a:rPr lang="en-US" smtClean="0"/>
-              <a:t>4/11/2019</a:t>
+              <a:t>4/18/2019</a:t>
             </a:fld>
             <a:endParaRPr lang="en-US"/>
           </a:p>
@@ -7156,7 +7162,7 @@
           <a:p>
             <a:fld id="{699DC775-C286-4358-8C92-D7E584E969B3}" type="datetimeFigureOut">
               <a:rPr lang="en-US" smtClean="0"/>
-              <a:t>4/11/2019</a:t>
+              <a:t>4/18/2019</a:t>
             </a:fld>
             <a:endParaRPr lang="en-US"/>
           </a:p>
@@ -7251,7 +7257,7 @@
           <a:p>
             <a:fld id="{699DC775-C286-4358-8C92-D7E584E969B3}" type="datetimeFigureOut">
               <a:rPr lang="en-US" smtClean="0"/>
-              <a:t>4/11/2019</a:t>
+              <a:t>4/18/2019</a:t>
             </a:fld>
             <a:endParaRPr lang="en-US"/>
           </a:p>
@@ -7526,7 +7532,7 @@
           <a:p>
             <a:fld id="{699DC775-C286-4358-8C92-D7E584E969B3}" type="datetimeFigureOut">
               <a:rPr lang="en-US" smtClean="0"/>
-              <a:t>4/11/2019</a:t>
+              <a:t>4/18/2019</a:t>
             </a:fld>
             <a:endParaRPr lang="en-US"/>
           </a:p>
@@ -7778,7 +7784,7 @@
           <a:p>
             <a:fld id="{699DC775-C286-4358-8C92-D7E584E969B3}" type="datetimeFigureOut">
               <a:rPr lang="en-US" smtClean="0"/>
-              <a:t>4/11/2019</a:t>
+              <a:t>4/18/2019</a:t>
             </a:fld>
             <a:endParaRPr lang="en-US"/>
           </a:p>
@@ -7992,7 +7998,7 @@
           <a:p>
             <a:fld id="{699DC775-C286-4358-8C92-D7E584E969B3}" type="datetimeFigureOut">
               <a:rPr lang="en-US" smtClean="0"/>
-              <a:t>4/11/2019</a:t>
+              <a:t>4/18/2019</a:t>
             </a:fld>
             <a:endParaRPr lang="en-US"/>
           </a:p>
@@ -8503,7 +8509,7 @@
           <a:p>
             <a:fld id="{699DC775-C286-4358-8C92-D7E584E969B3}" type="datetimeFigureOut">
               <a:rPr lang="en-US" smtClean="0"/>
-              <a:t>4/11/2019</a:t>
+              <a:t>4/18/2019</a:t>
             </a:fld>
             <a:endParaRPr lang="en-US"/>
           </a:p>
@@ -9014,7 +9020,7 @@
           <a:p>
             <a:fld id="{699DC775-C286-4358-8C92-D7E584E969B3}" type="datetimeFigureOut">
               <a:rPr lang="en-US" smtClean="0"/>
-              <a:t>4/11/2019</a:t>
+              <a:t>4/18/2019</a:t>
             </a:fld>
             <a:endParaRPr lang="en-US"/>
           </a:p>
@@ -10662,6 +10668,4280 @@
 </file>
 
 <file path=ppt/slides/slide12.xml><?xml version="1.0" encoding="utf-8"?>
+<p:sld xmlns:a="http://schemas.openxmlformats.org/drawingml/2006/main" xmlns:r="http://schemas.openxmlformats.org/officeDocument/2006/relationships" xmlns:p="http://schemas.openxmlformats.org/presentationml/2006/main">
+  <p:cSld>
+    <p:bg>
+      <p:bgPr>
+        <a:solidFill>
+          <a:srgbClr val="0070BF"/>
+        </a:solidFill>
+        <a:effectLst/>
+      </p:bgPr>
+    </p:bg>
+    <p:spTree>
+      <p:nvGrpSpPr>
+        <p:cNvPr id="1" name=""/>
+        <p:cNvGrpSpPr/>
+        <p:nvPr/>
+      </p:nvGrpSpPr>
+      <p:grpSpPr>
+        <a:xfrm>
+          <a:off x="0" y="0"/>
+          <a:ext cx="0" cy="0"/>
+          <a:chOff x="0" y="0"/>
+          <a:chExt cx="0" cy="0"/>
+        </a:xfrm>
+      </p:grpSpPr>
+      <p:sp>
+        <p:nvSpPr>
+          <p:cNvPr id="2" name="Title 1"/>
+          <p:cNvSpPr>
+            <a:spLocks noGrp="1"/>
+          </p:cNvSpPr>
+          <p:nvPr>
+            <p:ph type="title"/>
+          </p:nvPr>
+        </p:nvSpPr>
+        <p:spPr>
+          <a:solidFill>
+            <a:srgbClr val="0070BF"/>
+          </a:solidFill>
+        </p:spPr>
+        <p:txBody>
+          <a:bodyPr/>
+          <a:lstStyle/>
+          <a:p>
+            <a:r>
+              <a:rPr lang="en-US" dirty="0"/>
+              <a:t>Convert Shapes To Tooltip: Ten shapes</a:t>
+            </a:r>
+            <a:endParaRPr lang="en-SG" dirty="0"/>
+          </a:p>
+        </p:txBody>
+      </p:sp>
+      <p:sp>
+        <p:nvSpPr>
+          <p:cNvPr id="4" name="Content Placeholder 2"/>
+          <p:cNvSpPr>
+            <a:spLocks noGrp="1"/>
+          </p:cNvSpPr>
+          <p:nvPr>
+            <p:ph idx="1"/>
+          </p:nvPr>
+        </p:nvSpPr>
+        <p:spPr>
+          <a:xfrm>
+            <a:off x="457200" y="3124200"/>
+            <a:ext cx="8229600" cy="3001963"/>
+          </a:xfrm>
+        </p:spPr>
+        <p:txBody>
+          <a:bodyPr/>
+          <a:lstStyle/>
+          <a:p>
+            <a:r>
+              <a:rPr lang="en-US" dirty="0"/>
+              <a:t>Select trigger</a:t>
+            </a:r>
+          </a:p>
+          <a:p>
+            <a:r>
+              <a:rPr lang="en-US" dirty="0"/>
+              <a:t>Select callouts</a:t>
+            </a:r>
+          </a:p>
+          <a:p>
+            <a:r>
+              <a:rPr lang="en-US" dirty="0"/>
+              <a:t>Click ‘Convert Shapes to Tooltip’</a:t>
+            </a:r>
+            <a:endParaRPr lang="en-SG" dirty="0"/>
+          </a:p>
+        </p:txBody>
+      </p:sp>
+    </p:spTree>
+    <p:extLst>
+      <p:ext uri="{BB962C8B-B14F-4D97-AF65-F5344CB8AC3E}">
+        <p14:creationId xmlns:p14="http://schemas.microsoft.com/office/powerpoint/2010/main" val="1496908678"/>
+      </p:ext>
+    </p:extLst>
+  </p:cSld>
+  <p:clrMapOvr>
+    <a:masterClrMapping/>
+  </p:clrMapOvr>
+</p:sld>
+</file>
+
+<file path=ppt/slides/slide13.xml><?xml version="1.0" encoding="utf-8"?>
+<p:sld xmlns:a="http://schemas.openxmlformats.org/drawingml/2006/main" xmlns:r="http://schemas.openxmlformats.org/officeDocument/2006/relationships" xmlns:p="http://schemas.openxmlformats.org/presentationml/2006/main">
+  <p:cSld>
+    <p:spTree>
+      <p:nvGrpSpPr>
+        <p:cNvPr id="1" name=""/>
+        <p:cNvGrpSpPr/>
+        <p:nvPr/>
+      </p:nvGrpSpPr>
+      <p:grpSpPr>
+        <a:xfrm>
+          <a:off x="0" y="0"/>
+          <a:ext cx="0" cy="0"/>
+          <a:chOff x="0" y="0"/>
+          <a:chExt cx="0" cy="0"/>
+        </a:xfrm>
+      </p:grpSpPr>
+      <p:sp>
+        <p:nvSpPr>
+          <p:cNvPr id="2" name="Trigger">
+            <a:extLst>
+              <a:ext uri="{FF2B5EF4-FFF2-40B4-BE49-F238E27FC236}">
+                <a16:creationId xmlns:a16="http://schemas.microsoft.com/office/drawing/2014/main" id="{015139AA-208E-41A9-9E9D-0FBF9B27A0E4}"/>
+              </a:ext>
+            </a:extLst>
+          </p:cNvPr>
+          <p:cNvSpPr/>
+          <p:nvPr/>
+        </p:nvSpPr>
+        <p:spPr>
+          <a:xfrm>
+            <a:off x="1600200" y="3733800"/>
+            <a:ext cx="1219200" cy="1219200"/>
+          </a:xfrm>
+          <a:prstGeom prst="ellipse">
+            <a:avLst/>
+          </a:prstGeom>
+        </p:spPr>
+        <p:style>
+          <a:lnRef idx="2">
+            <a:schemeClr val="accent1">
+              <a:shade val="50000"/>
+            </a:schemeClr>
+          </a:lnRef>
+          <a:fillRef idx="1">
+            <a:schemeClr val="accent1"/>
+          </a:fillRef>
+          <a:effectRef idx="0">
+            <a:schemeClr val="accent1"/>
+          </a:effectRef>
+          <a:fontRef idx="minor">
+            <a:schemeClr val="lt1"/>
+          </a:fontRef>
+        </p:style>
+        <p:txBody>
+          <a:bodyPr rtlCol="0" anchor="ctr"/>
+          <a:lstStyle/>
+          <a:p>
+            <a:pPr algn="ctr"/>
+            <a:r>
+              <a:rPr lang="en-US" dirty="0"/>
+              <a:t>Trigger</a:t>
+            </a:r>
+          </a:p>
+        </p:txBody>
+      </p:sp>
+      <p:sp>
+        <p:nvSpPr>
+          <p:cNvPr id="5" name="Callout">
+            <a:extLst>
+              <a:ext uri="{FF2B5EF4-FFF2-40B4-BE49-F238E27FC236}">
+                <a16:creationId xmlns:a16="http://schemas.microsoft.com/office/drawing/2014/main" id="{FA930241-05A7-4CEA-829A-96FA333C6D11}"/>
+              </a:ext>
+            </a:extLst>
+          </p:cNvPr>
+          <p:cNvSpPr/>
+          <p:nvPr/>
+        </p:nvSpPr>
+        <p:spPr>
+          <a:xfrm>
+            <a:off x="1866900" y="2209800"/>
+            <a:ext cx="1905000" cy="1270000"/>
+          </a:xfrm>
+          <a:prstGeom prst="wedgeRoundRectCallout">
+            <a:avLst/>
+          </a:prstGeom>
+          <a:solidFill>
+            <a:srgbClr val="000000">
+              <a:alpha val="80000"/>
+            </a:srgbClr>
+          </a:solidFill>
+          <a:ln w="635">
+            <a:solidFill>
+              <a:srgbClr val="FFFF00"/>
+            </a:solidFill>
+          </a:ln>
+          <a:effectLst>
+            <a:outerShdw blurRad="63500" sx="102000" sy="102000" algn="ctr">
+              <a:prstClr val="black">
+                <a:alpha val="40000"/>
+              </a:prstClr>
+            </a:outerShdw>
+          </a:effectLst>
+        </p:spPr>
+        <p:style>
+          <a:lnRef idx="2">
+            <a:schemeClr val="accent1">
+              <a:shade val="50000"/>
+            </a:schemeClr>
+          </a:lnRef>
+          <a:fillRef idx="1">
+            <a:schemeClr val="accent1"/>
+          </a:fillRef>
+          <a:effectRef idx="0">
+            <a:schemeClr val="accent1"/>
+          </a:effectRef>
+          <a:fontRef idx="minor">
+            <a:schemeClr val="lt1"/>
+          </a:fontRef>
+        </p:style>
+        <p:txBody>
+          <a:bodyPr rtlCol="0" anchor="ctr">
+            <a:normAutofit/>
+          </a:bodyPr>
+          <a:lstStyle/>
+          <a:p>
+            <a:pPr algn="ctr"/>
+            <a:r>
+              <a:rPr lang="en-SG" sz="1600" dirty="0">
+                <a:solidFill>
+                  <a:srgbClr val="FFFFFF"/>
+                </a:solidFill>
+              </a:rPr>
+              <a:t>Callout</a:t>
+            </a:r>
+          </a:p>
+        </p:txBody>
+      </p:sp>
+      <p:sp>
+        <p:nvSpPr>
+          <p:cNvPr id="4" name="Callout 2">
+            <a:extLst>
+              <a:ext uri="{FF2B5EF4-FFF2-40B4-BE49-F238E27FC236}">
+                <a16:creationId xmlns:a16="http://schemas.microsoft.com/office/drawing/2014/main" id="{0D5E0CA6-439B-4BDF-B437-B1B94696F950}"/>
+              </a:ext>
+            </a:extLst>
+          </p:cNvPr>
+          <p:cNvSpPr/>
+          <p:nvPr/>
+        </p:nvSpPr>
+        <p:spPr>
+          <a:xfrm>
+            <a:off x="381000" y="2209800"/>
+            <a:ext cx="1905000" cy="1270000"/>
+          </a:xfrm>
+          <a:prstGeom prst="wedgeRoundRectCallout">
+            <a:avLst/>
+          </a:prstGeom>
+          <a:solidFill>
+            <a:srgbClr val="000000">
+              <a:alpha val="80000"/>
+            </a:srgbClr>
+          </a:solidFill>
+          <a:ln w="635">
+            <a:solidFill>
+              <a:srgbClr val="FFFF00"/>
+            </a:solidFill>
+          </a:ln>
+          <a:effectLst>
+            <a:outerShdw blurRad="63500" sx="102000" sy="102000" algn="ctr">
+              <a:prstClr val="black">
+                <a:alpha val="40000"/>
+              </a:prstClr>
+            </a:outerShdw>
+          </a:effectLst>
+        </p:spPr>
+        <p:style>
+          <a:lnRef idx="2">
+            <a:schemeClr val="accent1">
+              <a:shade val="50000"/>
+            </a:schemeClr>
+          </a:lnRef>
+          <a:fillRef idx="1">
+            <a:schemeClr val="accent1"/>
+          </a:fillRef>
+          <a:effectRef idx="0">
+            <a:schemeClr val="accent1"/>
+          </a:effectRef>
+          <a:fontRef idx="minor">
+            <a:schemeClr val="lt1"/>
+          </a:fontRef>
+        </p:style>
+        <p:txBody>
+          <a:bodyPr rtlCol="0" anchor="ctr">
+            <a:normAutofit/>
+          </a:bodyPr>
+          <a:lstStyle/>
+          <a:p>
+            <a:pPr algn="ctr"/>
+            <a:r>
+              <a:rPr lang="en-SG" sz="1600" dirty="0">
+                <a:solidFill>
+                  <a:srgbClr val="FFFFFF"/>
+                </a:solidFill>
+              </a:rPr>
+              <a:t>Callout 2</a:t>
+            </a:r>
+          </a:p>
+        </p:txBody>
+      </p:sp>
+      <p:sp>
+        <p:nvSpPr>
+          <p:cNvPr id="6" name="Callout 4">
+            <a:extLst>
+              <a:ext uri="{FF2B5EF4-FFF2-40B4-BE49-F238E27FC236}">
+                <a16:creationId xmlns:a16="http://schemas.microsoft.com/office/drawing/2014/main" id="{A86F9699-5E67-465E-B139-66238F1EC41F}"/>
+              </a:ext>
+            </a:extLst>
+          </p:cNvPr>
+          <p:cNvSpPr/>
+          <p:nvPr/>
+        </p:nvSpPr>
+        <p:spPr>
+          <a:xfrm>
+            <a:off x="1866900" y="939800"/>
+            <a:ext cx="1905000" cy="1270000"/>
+          </a:xfrm>
+          <a:prstGeom prst="wedgeRoundRectCallout">
+            <a:avLst/>
+          </a:prstGeom>
+          <a:solidFill>
+            <a:srgbClr val="000000">
+              <a:alpha val="80000"/>
+            </a:srgbClr>
+          </a:solidFill>
+          <a:ln w="635">
+            <a:solidFill>
+              <a:srgbClr val="FFFF00"/>
+            </a:solidFill>
+          </a:ln>
+          <a:effectLst>
+            <a:outerShdw blurRad="63500" sx="102000" sy="102000" algn="ctr">
+              <a:prstClr val="black">
+                <a:alpha val="40000"/>
+              </a:prstClr>
+            </a:outerShdw>
+          </a:effectLst>
+        </p:spPr>
+        <p:style>
+          <a:lnRef idx="2">
+            <a:schemeClr val="accent1">
+              <a:shade val="50000"/>
+            </a:schemeClr>
+          </a:lnRef>
+          <a:fillRef idx="1">
+            <a:schemeClr val="accent1"/>
+          </a:fillRef>
+          <a:effectRef idx="0">
+            <a:schemeClr val="accent1"/>
+          </a:effectRef>
+          <a:fontRef idx="minor">
+            <a:schemeClr val="lt1"/>
+          </a:fontRef>
+        </p:style>
+        <p:txBody>
+          <a:bodyPr rtlCol="0" anchor="ctr">
+            <a:normAutofit/>
+          </a:bodyPr>
+          <a:lstStyle/>
+          <a:p>
+            <a:pPr algn="ctr"/>
+            <a:r>
+              <a:rPr lang="en-SG" sz="1600" dirty="0">
+                <a:solidFill>
+                  <a:srgbClr val="FFFFFF"/>
+                </a:solidFill>
+              </a:rPr>
+              <a:t>Callout 4</a:t>
+            </a:r>
+          </a:p>
+        </p:txBody>
+      </p:sp>
+      <p:sp>
+        <p:nvSpPr>
+          <p:cNvPr id="7" name="Callout 3">
+            <a:extLst>
+              <a:ext uri="{FF2B5EF4-FFF2-40B4-BE49-F238E27FC236}">
+                <a16:creationId xmlns:a16="http://schemas.microsoft.com/office/drawing/2014/main" id="{6BEC63F4-B377-46BB-9031-F5E92074DA81}"/>
+              </a:ext>
+            </a:extLst>
+          </p:cNvPr>
+          <p:cNvSpPr/>
+          <p:nvPr/>
+        </p:nvSpPr>
+        <p:spPr>
+          <a:xfrm>
+            <a:off x="381000" y="939800"/>
+            <a:ext cx="1905000" cy="1270000"/>
+          </a:xfrm>
+          <a:prstGeom prst="wedgeRoundRectCallout">
+            <a:avLst/>
+          </a:prstGeom>
+          <a:solidFill>
+            <a:srgbClr val="000000">
+              <a:alpha val="80000"/>
+            </a:srgbClr>
+          </a:solidFill>
+          <a:ln w="635">
+            <a:solidFill>
+              <a:srgbClr val="FFFF00"/>
+            </a:solidFill>
+          </a:ln>
+          <a:effectLst>
+            <a:outerShdw blurRad="63500" sx="102000" sy="102000" algn="ctr">
+              <a:prstClr val="black">
+                <a:alpha val="40000"/>
+              </a:prstClr>
+            </a:outerShdw>
+          </a:effectLst>
+        </p:spPr>
+        <p:style>
+          <a:lnRef idx="2">
+            <a:schemeClr val="accent1">
+              <a:shade val="50000"/>
+            </a:schemeClr>
+          </a:lnRef>
+          <a:fillRef idx="1">
+            <a:schemeClr val="accent1"/>
+          </a:fillRef>
+          <a:effectRef idx="0">
+            <a:schemeClr val="accent1"/>
+          </a:effectRef>
+          <a:fontRef idx="minor">
+            <a:schemeClr val="lt1"/>
+          </a:fontRef>
+        </p:style>
+        <p:txBody>
+          <a:bodyPr rtlCol="0" anchor="ctr">
+            <a:normAutofit/>
+          </a:bodyPr>
+          <a:lstStyle/>
+          <a:p>
+            <a:pPr algn="ctr"/>
+            <a:r>
+              <a:rPr lang="en-SG" sz="1600" dirty="0">
+                <a:solidFill>
+                  <a:srgbClr val="FFFFFF"/>
+                </a:solidFill>
+              </a:rPr>
+              <a:t>Callout 3</a:t>
+            </a:r>
+          </a:p>
+        </p:txBody>
+      </p:sp>
+      <p:sp>
+        <p:nvSpPr>
+          <p:cNvPr id="8" name="Callout 6">
+            <a:extLst>
+              <a:ext uri="{FF2B5EF4-FFF2-40B4-BE49-F238E27FC236}">
+                <a16:creationId xmlns:a16="http://schemas.microsoft.com/office/drawing/2014/main" id="{9A839260-D667-4D78-8D0D-5D6227E305B6}"/>
+              </a:ext>
+            </a:extLst>
+          </p:cNvPr>
+          <p:cNvSpPr/>
+          <p:nvPr/>
+        </p:nvSpPr>
+        <p:spPr>
+          <a:xfrm>
+            <a:off x="5242560" y="939800"/>
+            <a:ext cx="1905000" cy="1270000"/>
+          </a:xfrm>
+          <a:prstGeom prst="wedgeRoundRectCallout">
+            <a:avLst/>
+          </a:prstGeom>
+          <a:solidFill>
+            <a:srgbClr val="000000">
+              <a:alpha val="80000"/>
+            </a:srgbClr>
+          </a:solidFill>
+          <a:ln w="635">
+            <a:solidFill>
+              <a:srgbClr val="FFFF00"/>
+            </a:solidFill>
+          </a:ln>
+          <a:effectLst>
+            <a:outerShdw blurRad="63500" sx="102000" sy="102000" algn="ctr">
+              <a:prstClr val="black">
+                <a:alpha val="40000"/>
+              </a:prstClr>
+            </a:outerShdw>
+          </a:effectLst>
+        </p:spPr>
+        <p:style>
+          <a:lnRef idx="2">
+            <a:schemeClr val="accent1">
+              <a:shade val="50000"/>
+            </a:schemeClr>
+          </a:lnRef>
+          <a:fillRef idx="1">
+            <a:schemeClr val="accent1"/>
+          </a:fillRef>
+          <a:effectRef idx="0">
+            <a:schemeClr val="accent1"/>
+          </a:effectRef>
+          <a:fontRef idx="minor">
+            <a:schemeClr val="lt1"/>
+          </a:fontRef>
+        </p:style>
+        <p:txBody>
+          <a:bodyPr rtlCol="0" anchor="ctr">
+            <a:normAutofit/>
+          </a:bodyPr>
+          <a:lstStyle/>
+          <a:p>
+            <a:pPr algn="ctr"/>
+            <a:r>
+              <a:rPr lang="en-SG" sz="1600" dirty="0">
+                <a:solidFill>
+                  <a:srgbClr val="FFFFFF"/>
+                </a:solidFill>
+              </a:rPr>
+              <a:t>Callout 6</a:t>
+            </a:r>
+          </a:p>
+        </p:txBody>
+      </p:sp>
+      <p:sp>
+        <p:nvSpPr>
+          <p:cNvPr id="9" name="Callout 5">
+            <a:extLst>
+              <a:ext uri="{FF2B5EF4-FFF2-40B4-BE49-F238E27FC236}">
+                <a16:creationId xmlns:a16="http://schemas.microsoft.com/office/drawing/2014/main" id="{E32D3B2F-2936-431E-8434-9010773C86BF}"/>
+              </a:ext>
+            </a:extLst>
+          </p:cNvPr>
+          <p:cNvSpPr/>
+          <p:nvPr/>
+        </p:nvSpPr>
+        <p:spPr>
+          <a:xfrm>
+            <a:off x="3756660" y="939800"/>
+            <a:ext cx="1905000" cy="1270000"/>
+          </a:xfrm>
+          <a:prstGeom prst="wedgeRoundRectCallout">
+            <a:avLst/>
+          </a:prstGeom>
+          <a:solidFill>
+            <a:srgbClr val="000000">
+              <a:alpha val="80000"/>
+            </a:srgbClr>
+          </a:solidFill>
+          <a:ln w="635">
+            <a:solidFill>
+              <a:srgbClr val="FFFF00"/>
+            </a:solidFill>
+          </a:ln>
+          <a:effectLst>
+            <a:outerShdw blurRad="63500" sx="102000" sy="102000" algn="ctr">
+              <a:prstClr val="black">
+                <a:alpha val="40000"/>
+              </a:prstClr>
+            </a:outerShdw>
+          </a:effectLst>
+        </p:spPr>
+        <p:style>
+          <a:lnRef idx="2">
+            <a:schemeClr val="accent1">
+              <a:shade val="50000"/>
+            </a:schemeClr>
+          </a:lnRef>
+          <a:fillRef idx="1">
+            <a:schemeClr val="accent1"/>
+          </a:fillRef>
+          <a:effectRef idx="0">
+            <a:schemeClr val="accent1"/>
+          </a:effectRef>
+          <a:fontRef idx="minor">
+            <a:schemeClr val="lt1"/>
+          </a:fontRef>
+        </p:style>
+        <p:txBody>
+          <a:bodyPr rtlCol="0" anchor="ctr">
+            <a:normAutofit/>
+          </a:bodyPr>
+          <a:lstStyle/>
+          <a:p>
+            <a:pPr algn="ctr"/>
+            <a:r>
+              <a:rPr lang="en-SG" sz="1600" dirty="0">
+                <a:solidFill>
+                  <a:srgbClr val="FFFFFF"/>
+                </a:solidFill>
+              </a:rPr>
+              <a:t>Callout 5</a:t>
+            </a:r>
+          </a:p>
+        </p:txBody>
+      </p:sp>
+      <p:sp>
+        <p:nvSpPr>
+          <p:cNvPr id="10" name="Callout 7">
+            <a:extLst>
+              <a:ext uri="{FF2B5EF4-FFF2-40B4-BE49-F238E27FC236}">
+                <a16:creationId xmlns:a16="http://schemas.microsoft.com/office/drawing/2014/main" id="{C00545B0-92B4-4E45-AA70-2FF3EC6E1D80}"/>
+              </a:ext>
+            </a:extLst>
+          </p:cNvPr>
+          <p:cNvSpPr/>
+          <p:nvPr/>
+        </p:nvSpPr>
+        <p:spPr>
+          <a:xfrm>
+            <a:off x="5257800" y="2194560"/>
+            <a:ext cx="1905000" cy="1270000"/>
+          </a:xfrm>
+          <a:prstGeom prst="wedgeRoundRectCallout">
+            <a:avLst/>
+          </a:prstGeom>
+          <a:solidFill>
+            <a:srgbClr val="000000">
+              <a:alpha val="80000"/>
+            </a:srgbClr>
+          </a:solidFill>
+          <a:ln w="635">
+            <a:solidFill>
+              <a:srgbClr val="FFFF00"/>
+            </a:solidFill>
+          </a:ln>
+          <a:effectLst>
+            <a:outerShdw blurRad="63500" sx="102000" sy="102000" algn="ctr">
+              <a:prstClr val="black">
+                <a:alpha val="40000"/>
+              </a:prstClr>
+            </a:outerShdw>
+          </a:effectLst>
+        </p:spPr>
+        <p:style>
+          <a:lnRef idx="2">
+            <a:schemeClr val="accent1">
+              <a:shade val="50000"/>
+            </a:schemeClr>
+          </a:lnRef>
+          <a:fillRef idx="1">
+            <a:schemeClr val="accent1"/>
+          </a:fillRef>
+          <a:effectRef idx="0">
+            <a:schemeClr val="accent1"/>
+          </a:effectRef>
+          <a:fontRef idx="minor">
+            <a:schemeClr val="lt1"/>
+          </a:fontRef>
+        </p:style>
+        <p:txBody>
+          <a:bodyPr rtlCol="0" anchor="ctr">
+            <a:normAutofit/>
+          </a:bodyPr>
+          <a:lstStyle/>
+          <a:p>
+            <a:pPr algn="ctr"/>
+            <a:r>
+              <a:rPr lang="en-SG" sz="1600" dirty="0">
+                <a:solidFill>
+                  <a:srgbClr val="FFFFFF"/>
+                </a:solidFill>
+              </a:rPr>
+              <a:t>Callout 7</a:t>
+            </a:r>
+          </a:p>
+        </p:txBody>
+      </p:sp>
+      <p:sp>
+        <p:nvSpPr>
+          <p:cNvPr id="11" name="Callout 9">
+            <a:extLst>
+              <a:ext uri="{FF2B5EF4-FFF2-40B4-BE49-F238E27FC236}">
+                <a16:creationId xmlns:a16="http://schemas.microsoft.com/office/drawing/2014/main" id="{F9283D71-D8F1-41A9-884A-D8DA2401B34F}"/>
+              </a:ext>
+            </a:extLst>
+          </p:cNvPr>
+          <p:cNvSpPr/>
+          <p:nvPr/>
+        </p:nvSpPr>
+        <p:spPr>
+          <a:xfrm>
+            <a:off x="3771900" y="2194560"/>
+            <a:ext cx="1905000" cy="1270000"/>
+          </a:xfrm>
+          <a:prstGeom prst="wedgeRoundRectCallout">
+            <a:avLst/>
+          </a:prstGeom>
+          <a:solidFill>
+            <a:srgbClr val="000000">
+              <a:alpha val="80000"/>
+            </a:srgbClr>
+          </a:solidFill>
+          <a:ln w="635">
+            <a:solidFill>
+              <a:srgbClr val="FFFF00"/>
+            </a:solidFill>
+          </a:ln>
+          <a:effectLst>
+            <a:outerShdw blurRad="63500" sx="102000" sy="102000" algn="ctr">
+              <a:prstClr val="black">
+                <a:alpha val="40000"/>
+              </a:prstClr>
+            </a:outerShdw>
+          </a:effectLst>
+        </p:spPr>
+        <p:style>
+          <a:lnRef idx="2">
+            <a:schemeClr val="accent1">
+              <a:shade val="50000"/>
+            </a:schemeClr>
+          </a:lnRef>
+          <a:fillRef idx="1">
+            <a:schemeClr val="accent1"/>
+          </a:fillRef>
+          <a:effectRef idx="0">
+            <a:schemeClr val="accent1"/>
+          </a:effectRef>
+          <a:fontRef idx="minor">
+            <a:schemeClr val="lt1"/>
+          </a:fontRef>
+        </p:style>
+        <p:txBody>
+          <a:bodyPr rtlCol="0" anchor="ctr">
+            <a:normAutofit/>
+          </a:bodyPr>
+          <a:lstStyle/>
+          <a:p>
+            <a:pPr algn="ctr"/>
+            <a:r>
+              <a:rPr lang="en-SG" sz="1600" dirty="0">
+                <a:solidFill>
+                  <a:srgbClr val="FFFFFF"/>
+                </a:solidFill>
+              </a:rPr>
+              <a:t>Callout 9</a:t>
+            </a:r>
+          </a:p>
+        </p:txBody>
+      </p:sp>
+      <p:sp>
+        <p:nvSpPr>
+          <p:cNvPr id="12" name="Callout 8">
+            <a:extLst>
+              <a:ext uri="{FF2B5EF4-FFF2-40B4-BE49-F238E27FC236}">
+                <a16:creationId xmlns:a16="http://schemas.microsoft.com/office/drawing/2014/main" id="{9CE155FA-FF9D-4C68-9F68-76370ECF0CEB}"/>
+              </a:ext>
+            </a:extLst>
+          </p:cNvPr>
+          <p:cNvSpPr/>
+          <p:nvPr/>
+        </p:nvSpPr>
+        <p:spPr>
+          <a:xfrm>
+            <a:off x="4394202" y="3200400"/>
+            <a:ext cx="1905000" cy="1270000"/>
+          </a:xfrm>
+          <a:prstGeom prst="wedgeRoundRectCallout">
+            <a:avLst/>
+          </a:prstGeom>
+          <a:solidFill>
+            <a:srgbClr val="000000">
+              <a:alpha val="80000"/>
+            </a:srgbClr>
+          </a:solidFill>
+          <a:ln w="635">
+            <a:solidFill>
+              <a:srgbClr val="FFFF00"/>
+            </a:solidFill>
+          </a:ln>
+          <a:effectLst>
+            <a:outerShdw blurRad="63500" sx="102000" sy="102000" algn="ctr">
+              <a:prstClr val="black">
+                <a:alpha val="40000"/>
+              </a:prstClr>
+            </a:outerShdw>
+          </a:effectLst>
+        </p:spPr>
+        <p:style>
+          <a:lnRef idx="2">
+            <a:schemeClr val="accent1">
+              <a:shade val="50000"/>
+            </a:schemeClr>
+          </a:lnRef>
+          <a:fillRef idx="1">
+            <a:schemeClr val="accent1"/>
+          </a:fillRef>
+          <a:effectRef idx="0">
+            <a:schemeClr val="accent1"/>
+          </a:effectRef>
+          <a:fontRef idx="minor">
+            <a:schemeClr val="lt1"/>
+          </a:fontRef>
+        </p:style>
+        <p:txBody>
+          <a:bodyPr rtlCol="0" anchor="ctr">
+            <a:normAutofit/>
+          </a:bodyPr>
+          <a:lstStyle/>
+          <a:p>
+            <a:pPr algn="ctr"/>
+            <a:r>
+              <a:rPr lang="en-SG" sz="1600" dirty="0">
+                <a:solidFill>
+                  <a:srgbClr val="FFFFFF"/>
+                </a:solidFill>
+              </a:rPr>
+              <a:t>Callout 8</a:t>
+            </a:r>
+          </a:p>
+        </p:txBody>
+      </p:sp>
+    </p:spTree>
+    <p:extLst>
+      <p:ext uri="{BB962C8B-B14F-4D97-AF65-F5344CB8AC3E}">
+        <p14:creationId xmlns:p14="http://schemas.microsoft.com/office/powerpoint/2010/main" val="421488768"/>
+      </p:ext>
+    </p:extLst>
+  </p:cSld>
+  <p:clrMapOvr>
+    <a:masterClrMapping/>
+  </p:clrMapOvr>
+  <p:timing>
+    <p:tnLst>
+      <p:par>
+        <p:cTn id="1" dur="indefinite" restart="never" nodeType="tmRoot">
+          <p:childTnLst>
+            <p:seq concurrent="1" nextAc="seek">
+              <p:cTn id="2" dur="indefinite" nodeType="mainSeq">
+                <p:childTnLst>
+                  <p:par>
+                    <p:cTn id="3" fill="hold">
+                      <p:stCondLst>
+                        <p:cond delay="indefinite"/>
+                      </p:stCondLst>
+                      <p:childTnLst>
+                        <p:par>
+                          <p:cTn id="4" fill="hold">
+                            <p:stCondLst>
+                              <p:cond delay="0"/>
+                            </p:stCondLst>
+                            <p:childTnLst>
+                              <p:par>
+                                <p:cTn id="5" presetID="10" presetClass="entr" presetSubtype="0" fill="hold" grpId="0" nodeType="clickEffect">
+                                  <p:stCondLst>
+                                    <p:cond delay="0"/>
+                                  </p:stCondLst>
+                                  <p:childTnLst>
+                                    <p:set>
+                                      <p:cBhvr>
+                                        <p:cTn id="6" dur="1" fill="hold">
+                                          <p:stCondLst>
+                                            <p:cond delay="0"/>
+                                          </p:stCondLst>
+                                        </p:cTn>
+                                        <p:tgtEl>
+                                          <p:spTgt spid="5"/>
+                                        </p:tgtEl>
+                                        <p:attrNameLst>
+                                          <p:attrName>style.visibility</p:attrName>
+                                        </p:attrNameLst>
+                                      </p:cBhvr>
+                                      <p:to>
+                                        <p:strVal val="visible"/>
+                                      </p:to>
+                                    </p:set>
+                                    <p:animEffect transition="in" filter="fade">
+                                      <p:cBhvr>
+                                        <p:cTn id="7" dur="500"/>
+                                        <p:tgtEl>
+                                          <p:spTgt spid="5"/>
+                                        </p:tgtEl>
+                                      </p:cBhvr>
+                                    </p:animEffect>
+                                  </p:childTnLst>
+                                </p:cTn>
+                              </p:par>
+                            </p:childTnLst>
+                          </p:cTn>
+                        </p:par>
+                      </p:childTnLst>
+                    </p:cTn>
+                  </p:par>
+                  <p:par>
+                    <p:cTn id="8" fill="hold">
+                      <p:stCondLst>
+                        <p:cond delay="indefinite"/>
+                      </p:stCondLst>
+                      <p:childTnLst>
+                        <p:par>
+                          <p:cTn id="9" fill="hold">
+                            <p:stCondLst>
+                              <p:cond delay="0"/>
+                            </p:stCondLst>
+                            <p:childTnLst>
+                              <p:par>
+                                <p:cTn id="10" presetID="10" presetClass="exit" presetSubtype="0" fill="hold" grpId="1" nodeType="clickEffect">
+                                  <p:stCondLst>
+                                    <p:cond delay="0"/>
+                                  </p:stCondLst>
+                                  <p:childTnLst>
+                                    <p:animEffect transition="out" filter="fade">
+                                      <p:cBhvr>
+                                        <p:cTn id="11" dur="500"/>
+                                        <p:tgtEl>
+                                          <p:spTgt spid="5"/>
+                                        </p:tgtEl>
+                                      </p:cBhvr>
+                                    </p:animEffect>
+                                    <p:set>
+                                      <p:cBhvr>
+                                        <p:cTn id="12" dur="1" fill="hold">
+                                          <p:stCondLst>
+                                            <p:cond delay="499"/>
+                                          </p:stCondLst>
+                                        </p:cTn>
+                                        <p:tgtEl>
+                                          <p:spTgt spid="5"/>
+                                        </p:tgtEl>
+                                        <p:attrNameLst>
+                                          <p:attrName>style.visibility</p:attrName>
+                                        </p:attrNameLst>
+                                      </p:cBhvr>
+                                      <p:to>
+                                        <p:strVal val="hidden"/>
+                                      </p:to>
+                                    </p:set>
+                                  </p:childTnLst>
+                                </p:cTn>
+                              </p:par>
+                            </p:childTnLst>
+                          </p:cTn>
+                        </p:par>
+                      </p:childTnLst>
+                    </p:cTn>
+                  </p:par>
+                  <p:par>
+                    <p:cTn id="13" fill="hold">
+                      <p:stCondLst>
+                        <p:cond delay="indefinite"/>
+                      </p:stCondLst>
+                      <p:childTnLst>
+                        <p:par>
+                          <p:cTn id="14" fill="hold">
+                            <p:stCondLst>
+                              <p:cond delay="0"/>
+                            </p:stCondLst>
+                            <p:childTnLst>
+                              <p:par>
+                                <p:cTn id="15" presetID="10" presetClass="entr" presetSubtype="0" fill="hold" grpId="0" nodeType="clickEffect">
+                                  <p:stCondLst>
+                                    <p:cond delay="0"/>
+                                  </p:stCondLst>
+                                  <p:childTnLst>
+                                    <p:set>
+                                      <p:cBhvr>
+                                        <p:cTn id="16" dur="1" fill="hold">
+                                          <p:stCondLst>
+                                            <p:cond delay="0"/>
+                                          </p:stCondLst>
+                                        </p:cTn>
+                                        <p:tgtEl>
+                                          <p:spTgt spid="4"/>
+                                        </p:tgtEl>
+                                        <p:attrNameLst>
+                                          <p:attrName>style.visibility</p:attrName>
+                                        </p:attrNameLst>
+                                      </p:cBhvr>
+                                      <p:to>
+                                        <p:strVal val="visible"/>
+                                      </p:to>
+                                    </p:set>
+                                    <p:animEffect transition="in" filter="fade">
+                                      <p:cBhvr>
+                                        <p:cTn id="17" dur="500"/>
+                                        <p:tgtEl>
+                                          <p:spTgt spid="4"/>
+                                        </p:tgtEl>
+                                      </p:cBhvr>
+                                    </p:animEffect>
+                                  </p:childTnLst>
+                                </p:cTn>
+                              </p:par>
+                            </p:childTnLst>
+                          </p:cTn>
+                        </p:par>
+                      </p:childTnLst>
+                    </p:cTn>
+                  </p:par>
+                  <p:par>
+                    <p:cTn id="18" fill="hold">
+                      <p:stCondLst>
+                        <p:cond delay="indefinite"/>
+                      </p:stCondLst>
+                      <p:childTnLst>
+                        <p:par>
+                          <p:cTn id="19" fill="hold">
+                            <p:stCondLst>
+                              <p:cond delay="0"/>
+                            </p:stCondLst>
+                            <p:childTnLst>
+                              <p:par>
+                                <p:cTn id="20" presetID="10" presetClass="exit" presetSubtype="0" fill="hold" grpId="1" nodeType="clickEffect">
+                                  <p:stCondLst>
+                                    <p:cond delay="0"/>
+                                  </p:stCondLst>
+                                  <p:childTnLst>
+                                    <p:animEffect transition="out" filter="fade">
+                                      <p:cBhvr>
+                                        <p:cTn id="21" dur="500"/>
+                                        <p:tgtEl>
+                                          <p:spTgt spid="4"/>
+                                        </p:tgtEl>
+                                      </p:cBhvr>
+                                    </p:animEffect>
+                                    <p:set>
+                                      <p:cBhvr>
+                                        <p:cTn id="22" dur="1" fill="hold">
+                                          <p:stCondLst>
+                                            <p:cond delay="499"/>
+                                          </p:stCondLst>
+                                        </p:cTn>
+                                        <p:tgtEl>
+                                          <p:spTgt spid="4"/>
+                                        </p:tgtEl>
+                                        <p:attrNameLst>
+                                          <p:attrName>style.visibility</p:attrName>
+                                        </p:attrNameLst>
+                                      </p:cBhvr>
+                                      <p:to>
+                                        <p:strVal val="hidden"/>
+                                      </p:to>
+                                    </p:set>
+                                  </p:childTnLst>
+                                </p:cTn>
+                              </p:par>
+                            </p:childTnLst>
+                          </p:cTn>
+                        </p:par>
+                      </p:childTnLst>
+                    </p:cTn>
+                  </p:par>
+                  <p:par>
+                    <p:cTn id="23" fill="hold">
+                      <p:stCondLst>
+                        <p:cond delay="indefinite"/>
+                      </p:stCondLst>
+                      <p:childTnLst>
+                        <p:par>
+                          <p:cTn id="24" fill="hold">
+                            <p:stCondLst>
+                              <p:cond delay="0"/>
+                            </p:stCondLst>
+                            <p:childTnLst>
+                              <p:par>
+                                <p:cTn id="25" presetID="10" presetClass="entr" presetSubtype="0" fill="hold" grpId="0" nodeType="clickEffect">
+                                  <p:stCondLst>
+                                    <p:cond delay="0"/>
+                                  </p:stCondLst>
+                                  <p:childTnLst>
+                                    <p:set>
+                                      <p:cBhvr>
+                                        <p:cTn id="26" dur="1" fill="hold">
+                                          <p:stCondLst>
+                                            <p:cond delay="0"/>
+                                          </p:stCondLst>
+                                        </p:cTn>
+                                        <p:tgtEl>
+                                          <p:spTgt spid="6"/>
+                                        </p:tgtEl>
+                                        <p:attrNameLst>
+                                          <p:attrName>style.visibility</p:attrName>
+                                        </p:attrNameLst>
+                                      </p:cBhvr>
+                                      <p:to>
+                                        <p:strVal val="visible"/>
+                                      </p:to>
+                                    </p:set>
+                                    <p:animEffect transition="in" filter="fade">
+                                      <p:cBhvr>
+                                        <p:cTn id="27" dur="500"/>
+                                        <p:tgtEl>
+                                          <p:spTgt spid="6"/>
+                                        </p:tgtEl>
+                                      </p:cBhvr>
+                                    </p:animEffect>
+                                  </p:childTnLst>
+                                </p:cTn>
+                              </p:par>
+                            </p:childTnLst>
+                          </p:cTn>
+                        </p:par>
+                      </p:childTnLst>
+                    </p:cTn>
+                  </p:par>
+                  <p:par>
+                    <p:cTn id="28" fill="hold">
+                      <p:stCondLst>
+                        <p:cond delay="indefinite"/>
+                      </p:stCondLst>
+                      <p:childTnLst>
+                        <p:par>
+                          <p:cTn id="29" fill="hold">
+                            <p:stCondLst>
+                              <p:cond delay="0"/>
+                            </p:stCondLst>
+                            <p:childTnLst>
+                              <p:par>
+                                <p:cTn id="30" presetID="10" presetClass="exit" presetSubtype="0" fill="hold" grpId="1" nodeType="clickEffect">
+                                  <p:stCondLst>
+                                    <p:cond delay="0"/>
+                                  </p:stCondLst>
+                                  <p:childTnLst>
+                                    <p:animEffect transition="out" filter="fade">
+                                      <p:cBhvr>
+                                        <p:cTn id="31" dur="500"/>
+                                        <p:tgtEl>
+                                          <p:spTgt spid="6"/>
+                                        </p:tgtEl>
+                                      </p:cBhvr>
+                                    </p:animEffect>
+                                    <p:set>
+                                      <p:cBhvr>
+                                        <p:cTn id="32" dur="1" fill="hold">
+                                          <p:stCondLst>
+                                            <p:cond delay="499"/>
+                                          </p:stCondLst>
+                                        </p:cTn>
+                                        <p:tgtEl>
+                                          <p:spTgt spid="6"/>
+                                        </p:tgtEl>
+                                        <p:attrNameLst>
+                                          <p:attrName>style.visibility</p:attrName>
+                                        </p:attrNameLst>
+                                      </p:cBhvr>
+                                      <p:to>
+                                        <p:strVal val="hidden"/>
+                                      </p:to>
+                                    </p:set>
+                                  </p:childTnLst>
+                                </p:cTn>
+                              </p:par>
+                            </p:childTnLst>
+                          </p:cTn>
+                        </p:par>
+                      </p:childTnLst>
+                    </p:cTn>
+                  </p:par>
+                  <p:par>
+                    <p:cTn id="33" fill="hold">
+                      <p:stCondLst>
+                        <p:cond delay="indefinite"/>
+                      </p:stCondLst>
+                      <p:childTnLst>
+                        <p:par>
+                          <p:cTn id="34" fill="hold">
+                            <p:stCondLst>
+                              <p:cond delay="0"/>
+                            </p:stCondLst>
+                            <p:childTnLst>
+                              <p:par>
+                                <p:cTn id="35" presetID="10" presetClass="entr" presetSubtype="0" fill="hold" grpId="0" nodeType="clickEffect">
+                                  <p:stCondLst>
+                                    <p:cond delay="0"/>
+                                  </p:stCondLst>
+                                  <p:childTnLst>
+                                    <p:set>
+                                      <p:cBhvr>
+                                        <p:cTn id="36" dur="1" fill="hold">
+                                          <p:stCondLst>
+                                            <p:cond delay="0"/>
+                                          </p:stCondLst>
+                                        </p:cTn>
+                                        <p:tgtEl>
+                                          <p:spTgt spid="7"/>
+                                        </p:tgtEl>
+                                        <p:attrNameLst>
+                                          <p:attrName>style.visibility</p:attrName>
+                                        </p:attrNameLst>
+                                      </p:cBhvr>
+                                      <p:to>
+                                        <p:strVal val="visible"/>
+                                      </p:to>
+                                    </p:set>
+                                    <p:animEffect transition="in" filter="fade">
+                                      <p:cBhvr>
+                                        <p:cTn id="37" dur="500"/>
+                                        <p:tgtEl>
+                                          <p:spTgt spid="7"/>
+                                        </p:tgtEl>
+                                      </p:cBhvr>
+                                    </p:animEffect>
+                                  </p:childTnLst>
+                                </p:cTn>
+                              </p:par>
+                            </p:childTnLst>
+                          </p:cTn>
+                        </p:par>
+                      </p:childTnLst>
+                    </p:cTn>
+                  </p:par>
+                  <p:par>
+                    <p:cTn id="38" fill="hold">
+                      <p:stCondLst>
+                        <p:cond delay="indefinite"/>
+                      </p:stCondLst>
+                      <p:childTnLst>
+                        <p:par>
+                          <p:cTn id="39" fill="hold">
+                            <p:stCondLst>
+                              <p:cond delay="0"/>
+                            </p:stCondLst>
+                            <p:childTnLst>
+                              <p:par>
+                                <p:cTn id="40" presetID="10" presetClass="exit" presetSubtype="0" fill="hold" grpId="1" nodeType="clickEffect">
+                                  <p:stCondLst>
+                                    <p:cond delay="0"/>
+                                  </p:stCondLst>
+                                  <p:childTnLst>
+                                    <p:animEffect transition="out" filter="fade">
+                                      <p:cBhvr>
+                                        <p:cTn id="41" dur="500"/>
+                                        <p:tgtEl>
+                                          <p:spTgt spid="7"/>
+                                        </p:tgtEl>
+                                      </p:cBhvr>
+                                    </p:animEffect>
+                                    <p:set>
+                                      <p:cBhvr>
+                                        <p:cTn id="42" dur="1" fill="hold">
+                                          <p:stCondLst>
+                                            <p:cond delay="499"/>
+                                          </p:stCondLst>
+                                        </p:cTn>
+                                        <p:tgtEl>
+                                          <p:spTgt spid="7"/>
+                                        </p:tgtEl>
+                                        <p:attrNameLst>
+                                          <p:attrName>style.visibility</p:attrName>
+                                        </p:attrNameLst>
+                                      </p:cBhvr>
+                                      <p:to>
+                                        <p:strVal val="hidden"/>
+                                      </p:to>
+                                    </p:set>
+                                  </p:childTnLst>
+                                </p:cTn>
+                              </p:par>
+                            </p:childTnLst>
+                          </p:cTn>
+                        </p:par>
+                      </p:childTnLst>
+                    </p:cTn>
+                  </p:par>
+                  <p:par>
+                    <p:cTn id="43" fill="hold">
+                      <p:stCondLst>
+                        <p:cond delay="indefinite"/>
+                      </p:stCondLst>
+                      <p:childTnLst>
+                        <p:par>
+                          <p:cTn id="44" fill="hold">
+                            <p:stCondLst>
+                              <p:cond delay="0"/>
+                            </p:stCondLst>
+                            <p:childTnLst>
+                              <p:par>
+                                <p:cTn id="45" presetID="10" presetClass="entr" presetSubtype="0" fill="hold" grpId="0" nodeType="clickEffect">
+                                  <p:stCondLst>
+                                    <p:cond delay="0"/>
+                                  </p:stCondLst>
+                                  <p:childTnLst>
+                                    <p:set>
+                                      <p:cBhvr>
+                                        <p:cTn id="46" dur="1" fill="hold">
+                                          <p:stCondLst>
+                                            <p:cond delay="0"/>
+                                          </p:stCondLst>
+                                        </p:cTn>
+                                        <p:tgtEl>
+                                          <p:spTgt spid="8"/>
+                                        </p:tgtEl>
+                                        <p:attrNameLst>
+                                          <p:attrName>style.visibility</p:attrName>
+                                        </p:attrNameLst>
+                                      </p:cBhvr>
+                                      <p:to>
+                                        <p:strVal val="visible"/>
+                                      </p:to>
+                                    </p:set>
+                                    <p:animEffect transition="in" filter="fade">
+                                      <p:cBhvr>
+                                        <p:cTn id="47" dur="500"/>
+                                        <p:tgtEl>
+                                          <p:spTgt spid="8"/>
+                                        </p:tgtEl>
+                                      </p:cBhvr>
+                                    </p:animEffect>
+                                  </p:childTnLst>
+                                </p:cTn>
+                              </p:par>
+                            </p:childTnLst>
+                          </p:cTn>
+                        </p:par>
+                      </p:childTnLst>
+                    </p:cTn>
+                  </p:par>
+                  <p:par>
+                    <p:cTn id="48" fill="hold">
+                      <p:stCondLst>
+                        <p:cond delay="indefinite"/>
+                      </p:stCondLst>
+                      <p:childTnLst>
+                        <p:par>
+                          <p:cTn id="49" fill="hold">
+                            <p:stCondLst>
+                              <p:cond delay="0"/>
+                            </p:stCondLst>
+                            <p:childTnLst>
+                              <p:par>
+                                <p:cTn id="50" presetID="10" presetClass="exit" presetSubtype="0" fill="hold" grpId="1" nodeType="clickEffect">
+                                  <p:stCondLst>
+                                    <p:cond delay="0"/>
+                                  </p:stCondLst>
+                                  <p:childTnLst>
+                                    <p:animEffect transition="out" filter="fade">
+                                      <p:cBhvr>
+                                        <p:cTn id="51" dur="500"/>
+                                        <p:tgtEl>
+                                          <p:spTgt spid="8"/>
+                                        </p:tgtEl>
+                                      </p:cBhvr>
+                                    </p:animEffect>
+                                    <p:set>
+                                      <p:cBhvr>
+                                        <p:cTn id="52" dur="1" fill="hold">
+                                          <p:stCondLst>
+                                            <p:cond delay="499"/>
+                                          </p:stCondLst>
+                                        </p:cTn>
+                                        <p:tgtEl>
+                                          <p:spTgt spid="8"/>
+                                        </p:tgtEl>
+                                        <p:attrNameLst>
+                                          <p:attrName>style.visibility</p:attrName>
+                                        </p:attrNameLst>
+                                      </p:cBhvr>
+                                      <p:to>
+                                        <p:strVal val="hidden"/>
+                                      </p:to>
+                                    </p:set>
+                                  </p:childTnLst>
+                                </p:cTn>
+                              </p:par>
+                            </p:childTnLst>
+                          </p:cTn>
+                        </p:par>
+                      </p:childTnLst>
+                    </p:cTn>
+                  </p:par>
+                  <p:par>
+                    <p:cTn id="53" fill="hold">
+                      <p:stCondLst>
+                        <p:cond delay="indefinite"/>
+                      </p:stCondLst>
+                      <p:childTnLst>
+                        <p:par>
+                          <p:cTn id="54" fill="hold">
+                            <p:stCondLst>
+                              <p:cond delay="0"/>
+                            </p:stCondLst>
+                            <p:childTnLst>
+                              <p:par>
+                                <p:cTn id="55" presetID="10" presetClass="entr" presetSubtype="0" fill="hold" grpId="0" nodeType="clickEffect">
+                                  <p:stCondLst>
+                                    <p:cond delay="0"/>
+                                  </p:stCondLst>
+                                  <p:childTnLst>
+                                    <p:set>
+                                      <p:cBhvr>
+                                        <p:cTn id="56" dur="1" fill="hold">
+                                          <p:stCondLst>
+                                            <p:cond delay="0"/>
+                                          </p:stCondLst>
+                                        </p:cTn>
+                                        <p:tgtEl>
+                                          <p:spTgt spid="9"/>
+                                        </p:tgtEl>
+                                        <p:attrNameLst>
+                                          <p:attrName>style.visibility</p:attrName>
+                                        </p:attrNameLst>
+                                      </p:cBhvr>
+                                      <p:to>
+                                        <p:strVal val="visible"/>
+                                      </p:to>
+                                    </p:set>
+                                    <p:animEffect transition="in" filter="fade">
+                                      <p:cBhvr>
+                                        <p:cTn id="57" dur="500"/>
+                                        <p:tgtEl>
+                                          <p:spTgt spid="9"/>
+                                        </p:tgtEl>
+                                      </p:cBhvr>
+                                    </p:animEffect>
+                                  </p:childTnLst>
+                                </p:cTn>
+                              </p:par>
+                            </p:childTnLst>
+                          </p:cTn>
+                        </p:par>
+                      </p:childTnLst>
+                    </p:cTn>
+                  </p:par>
+                  <p:par>
+                    <p:cTn id="58" fill="hold">
+                      <p:stCondLst>
+                        <p:cond delay="indefinite"/>
+                      </p:stCondLst>
+                      <p:childTnLst>
+                        <p:par>
+                          <p:cTn id="59" fill="hold">
+                            <p:stCondLst>
+                              <p:cond delay="0"/>
+                            </p:stCondLst>
+                            <p:childTnLst>
+                              <p:par>
+                                <p:cTn id="60" presetID="10" presetClass="exit" presetSubtype="0" fill="hold" grpId="1" nodeType="clickEffect">
+                                  <p:stCondLst>
+                                    <p:cond delay="0"/>
+                                  </p:stCondLst>
+                                  <p:childTnLst>
+                                    <p:animEffect transition="out" filter="fade">
+                                      <p:cBhvr>
+                                        <p:cTn id="61" dur="500"/>
+                                        <p:tgtEl>
+                                          <p:spTgt spid="9"/>
+                                        </p:tgtEl>
+                                      </p:cBhvr>
+                                    </p:animEffect>
+                                    <p:set>
+                                      <p:cBhvr>
+                                        <p:cTn id="62" dur="1" fill="hold">
+                                          <p:stCondLst>
+                                            <p:cond delay="499"/>
+                                          </p:stCondLst>
+                                        </p:cTn>
+                                        <p:tgtEl>
+                                          <p:spTgt spid="9"/>
+                                        </p:tgtEl>
+                                        <p:attrNameLst>
+                                          <p:attrName>style.visibility</p:attrName>
+                                        </p:attrNameLst>
+                                      </p:cBhvr>
+                                      <p:to>
+                                        <p:strVal val="hidden"/>
+                                      </p:to>
+                                    </p:set>
+                                  </p:childTnLst>
+                                </p:cTn>
+                              </p:par>
+                            </p:childTnLst>
+                          </p:cTn>
+                        </p:par>
+                      </p:childTnLst>
+                    </p:cTn>
+                  </p:par>
+                  <p:par>
+                    <p:cTn id="63" fill="hold">
+                      <p:stCondLst>
+                        <p:cond delay="indefinite"/>
+                      </p:stCondLst>
+                      <p:childTnLst>
+                        <p:par>
+                          <p:cTn id="64" fill="hold">
+                            <p:stCondLst>
+                              <p:cond delay="0"/>
+                            </p:stCondLst>
+                            <p:childTnLst>
+                              <p:par>
+                                <p:cTn id="65" presetID="10" presetClass="entr" presetSubtype="0" fill="hold" grpId="0" nodeType="clickEffect">
+                                  <p:stCondLst>
+                                    <p:cond delay="0"/>
+                                  </p:stCondLst>
+                                  <p:childTnLst>
+                                    <p:set>
+                                      <p:cBhvr>
+                                        <p:cTn id="66" dur="1" fill="hold">
+                                          <p:stCondLst>
+                                            <p:cond delay="0"/>
+                                          </p:stCondLst>
+                                        </p:cTn>
+                                        <p:tgtEl>
+                                          <p:spTgt spid="10"/>
+                                        </p:tgtEl>
+                                        <p:attrNameLst>
+                                          <p:attrName>style.visibility</p:attrName>
+                                        </p:attrNameLst>
+                                      </p:cBhvr>
+                                      <p:to>
+                                        <p:strVal val="visible"/>
+                                      </p:to>
+                                    </p:set>
+                                    <p:animEffect transition="in" filter="fade">
+                                      <p:cBhvr>
+                                        <p:cTn id="67" dur="500"/>
+                                        <p:tgtEl>
+                                          <p:spTgt spid="10"/>
+                                        </p:tgtEl>
+                                      </p:cBhvr>
+                                    </p:animEffect>
+                                  </p:childTnLst>
+                                </p:cTn>
+                              </p:par>
+                            </p:childTnLst>
+                          </p:cTn>
+                        </p:par>
+                      </p:childTnLst>
+                    </p:cTn>
+                  </p:par>
+                  <p:par>
+                    <p:cTn id="68" fill="hold">
+                      <p:stCondLst>
+                        <p:cond delay="indefinite"/>
+                      </p:stCondLst>
+                      <p:childTnLst>
+                        <p:par>
+                          <p:cTn id="69" fill="hold">
+                            <p:stCondLst>
+                              <p:cond delay="0"/>
+                            </p:stCondLst>
+                            <p:childTnLst>
+                              <p:par>
+                                <p:cTn id="70" presetID="10" presetClass="exit" presetSubtype="0" fill="hold" grpId="1" nodeType="clickEffect">
+                                  <p:stCondLst>
+                                    <p:cond delay="0"/>
+                                  </p:stCondLst>
+                                  <p:childTnLst>
+                                    <p:animEffect transition="out" filter="fade">
+                                      <p:cBhvr>
+                                        <p:cTn id="71" dur="500"/>
+                                        <p:tgtEl>
+                                          <p:spTgt spid="10"/>
+                                        </p:tgtEl>
+                                      </p:cBhvr>
+                                    </p:animEffect>
+                                    <p:set>
+                                      <p:cBhvr>
+                                        <p:cTn id="72" dur="1" fill="hold">
+                                          <p:stCondLst>
+                                            <p:cond delay="499"/>
+                                          </p:stCondLst>
+                                        </p:cTn>
+                                        <p:tgtEl>
+                                          <p:spTgt spid="10"/>
+                                        </p:tgtEl>
+                                        <p:attrNameLst>
+                                          <p:attrName>style.visibility</p:attrName>
+                                        </p:attrNameLst>
+                                      </p:cBhvr>
+                                      <p:to>
+                                        <p:strVal val="hidden"/>
+                                      </p:to>
+                                    </p:set>
+                                  </p:childTnLst>
+                                </p:cTn>
+                              </p:par>
+                            </p:childTnLst>
+                          </p:cTn>
+                        </p:par>
+                      </p:childTnLst>
+                    </p:cTn>
+                  </p:par>
+                  <p:par>
+                    <p:cTn id="73" fill="hold">
+                      <p:stCondLst>
+                        <p:cond delay="indefinite"/>
+                      </p:stCondLst>
+                      <p:childTnLst>
+                        <p:par>
+                          <p:cTn id="74" fill="hold">
+                            <p:stCondLst>
+                              <p:cond delay="0"/>
+                            </p:stCondLst>
+                            <p:childTnLst>
+                              <p:par>
+                                <p:cTn id="75" presetID="10" presetClass="entr" presetSubtype="0" fill="hold" grpId="0" nodeType="clickEffect">
+                                  <p:stCondLst>
+                                    <p:cond delay="0"/>
+                                  </p:stCondLst>
+                                  <p:childTnLst>
+                                    <p:set>
+                                      <p:cBhvr>
+                                        <p:cTn id="76" dur="1" fill="hold">
+                                          <p:stCondLst>
+                                            <p:cond delay="0"/>
+                                          </p:stCondLst>
+                                        </p:cTn>
+                                        <p:tgtEl>
+                                          <p:spTgt spid="11"/>
+                                        </p:tgtEl>
+                                        <p:attrNameLst>
+                                          <p:attrName>style.visibility</p:attrName>
+                                        </p:attrNameLst>
+                                      </p:cBhvr>
+                                      <p:to>
+                                        <p:strVal val="visible"/>
+                                      </p:to>
+                                    </p:set>
+                                    <p:animEffect transition="in" filter="fade">
+                                      <p:cBhvr>
+                                        <p:cTn id="77" dur="500"/>
+                                        <p:tgtEl>
+                                          <p:spTgt spid="11"/>
+                                        </p:tgtEl>
+                                      </p:cBhvr>
+                                    </p:animEffect>
+                                  </p:childTnLst>
+                                </p:cTn>
+                              </p:par>
+                            </p:childTnLst>
+                          </p:cTn>
+                        </p:par>
+                      </p:childTnLst>
+                    </p:cTn>
+                  </p:par>
+                  <p:par>
+                    <p:cTn id="78" fill="hold">
+                      <p:stCondLst>
+                        <p:cond delay="indefinite"/>
+                      </p:stCondLst>
+                      <p:childTnLst>
+                        <p:par>
+                          <p:cTn id="79" fill="hold">
+                            <p:stCondLst>
+                              <p:cond delay="0"/>
+                            </p:stCondLst>
+                            <p:childTnLst>
+                              <p:par>
+                                <p:cTn id="80" presetID="10" presetClass="exit" presetSubtype="0" fill="hold" grpId="1" nodeType="clickEffect">
+                                  <p:stCondLst>
+                                    <p:cond delay="0"/>
+                                  </p:stCondLst>
+                                  <p:childTnLst>
+                                    <p:animEffect transition="out" filter="fade">
+                                      <p:cBhvr>
+                                        <p:cTn id="81" dur="500"/>
+                                        <p:tgtEl>
+                                          <p:spTgt spid="11"/>
+                                        </p:tgtEl>
+                                      </p:cBhvr>
+                                    </p:animEffect>
+                                    <p:set>
+                                      <p:cBhvr>
+                                        <p:cTn id="82" dur="1" fill="hold">
+                                          <p:stCondLst>
+                                            <p:cond delay="499"/>
+                                          </p:stCondLst>
+                                        </p:cTn>
+                                        <p:tgtEl>
+                                          <p:spTgt spid="11"/>
+                                        </p:tgtEl>
+                                        <p:attrNameLst>
+                                          <p:attrName>style.visibility</p:attrName>
+                                        </p:attrNameLst>
+                                      </p:cBhvr>
+                                      <p:to>
+                                        <p:strVal val="hidden"/>
+                                      </p:to>
+                                    </p:set>
+                                  </p:childTnLst>
+                                </p:cTn>
+                              </p:par>
+                            </p:childTnLst>
+                          </p:cTn>
+                        </p:par>
+                      </p:childTnLst>
+                    </p:cTn>
+                  </p:par>
+                  <p:par>
+                    <p:cTn id="83" fill="hold">
+                      <p:stCondLst>
+                        <p:cond delay="indefinite"/>
+                      </p:stCondLst>
+                      <p:childTnLst>
+                        <p:par>
+                          <p:cTn id="84" fill="hold">
+                            <p:stCondLst>
+                              <p:cond delay="0"/>
+                            </p:stCondLst>
+                            <p:childTnLst>
+                              <p:par>
+                                <p:cTn id="85" presetID="10" presetClass="entr" presetSubtype="0" fill="hold" grpId="0" nodeType="clickEffect">
+                                  <p:stCondLst>
+                                    <p:cond delay="0"/>
+                                  </p:stCondLst>
+                                  <p:childTnLst>
+                                    <p:set>
+                                      <p:cBhvr>
+                                        <p:cTn id="86" dur="1" fill="hold">
+                                          <p:stCondLst>
+                                            <p:cond delay="0"/>
+                                          </p:stCondLst>
+                                        </p:cTn>
+                                        <p:tgtEl>
+                                          <p:spTgt spid="12"/>
+                                        </p:tgtEl>
+                                        <p:attrNameLst>
+                                          <p:attrName>style.visibility</p:attrName>
+                                        </p:attrNameLst>
+                                      </p:cBhvr>
+                                      <p:to>
+                                        <p:strVal val="visible"/>
+                                      </p:to>
+                                    </p:set>
+                                    <p:animEffect transition="in" filter="fade">
+                                      <p:cBhvr>
+                                        <p:cTn id="87" dur="500"/>
+                                        <p:tgtEl>
+                                          <p:spTgt spid="12"/>
+                                        </p:tgtEl>
+                                      </p:cBhvr>
+                                    </p:animEffect>
+                                  </p:childTnLst>
+                                </p:cTn>
+                              </p:par>
+                            </p:childTnLst>
+                          </p:cTn>
+                        </p:par>
+                      </p:childTnLst>
+                    </p:cTn>
+                  </p:par>
+                  <p:par>
+                    <p:cTn id="88" fill="hold">
+                      <p:stCondLst>
+                        <p:cond delay="indefinite"/>
+                      </p:stCondLst>
+                      <p:childTnLst>
+                        <p:par>
+                          <p:cTn id="89" fill="hold">
+                            <p:stCondLst>
+                              <p:cond delay="0"/>
+                            </p:stCondLst>
+                            <p:childTnLst>
+                              <p:par>
+                                <p:cTn id="90" presetID="10" presetClass="exit" presetSubtype="0" fill="hold" grpId="1" nodeType="clickEffect">
+                                  <p:stCondLst>
+                                    <p:cond delay="0"/>
+                                  </p:stCondLst>
+                                  <p:childTnLst>
+                                    <p:animEffect transition="out" filter="fade">
+                                      <p:cBhvr>
+                                        <p:cTn id="91" dur="500"/>
+                                        <p:tgtEl>
+                                          <p:spTgt spid="12"/>
+                                        </p:tgtEl>
+                                      </p:cBhvr>
+                                    </p:animEffect>
+                                    <p:set>
+                                      <p:cBhvr>
+                                        <p:cTn id="92" dur="1" fill="hold">
+                                          <p:stCondLst>
+                                            <p:cond delay="499"/>
+                                          </p:stCondLst>
+                                        </p:cTn>
+                                        <p:tgtEl>
+                                          <p:spTgt spid="12"/>
+                                        </p:tgtEl>
+                                        <p:attrNameLst>
+                                          <p:attrName>style.visibility</p:attrName>
+                                        </p:attrNameLst>
+                                      </p:cBhvr>
+                                      <p:to>
+                                        <p:strVal val="hidden"/>
+                                      </p:to>
+                                    </p:set>
+                                  </p:childTnLst>
+                                </p:cTn>
+                              </p:par>
+                            </p:childTnLst>
+                          </p:cTn>
+                        </p:par>
+                      </p:childTnLst>
+                    </p:cTn>
+                  </p:par>
+                </p:childTnLst>
+              </p:cTn>
+              <p:prevCondLst>
+                <p:cond evt="onPrev" delay="0">
+                  <p:tgtEl>
+                    <p:sldTgt/>
+                  </p:tgtEl>
+                </p:cond>
+              </p:prevCondLst>
+              <p:nextCondLst>
+                <p:cond evt="onNext" delay="0">
+                  <p:tgtEl>
+                    <p:sldTgt/>
+                  </p:tgtEl>
+                </p:cond>
+              </p:nextCondLst>
+            </p:seq>
+          </p:childTnLst>
+        </p:cTn>
+      </p:par>
+    </p:tnLst>
+    <p:bldLst>
+      <p:bldP spid="5" grpId="0" animBg="1"/>
+      <p:bldP spid="5" grpId="1" animBg="1"/>
+      <p:bldP spid="4" grpId="0" animBg="1"/>
+      <p:bldP spid="4" grpId="1" animBg="1"/>
+      <p:bldP spid="6" grpId="0" animBg="1"/>
+      <p:bldP spid="6" grpId="1" animBg="1"/>
+      <p:bldP spid="7" grpId="0" animBg="1"/>
+      <p:bldP spid="7" grpId="1" animBg="1"/>
+      <p:bldP spid="8" grpId="0" animBg="1"/>
+      <p:bldP spid="8" grpId="1" animBg="1"/>
+      <p:bldP spid="9" grpId="0" animBg="1"/>
+      <p:bldP spid="9" grpId="1" animBg="1"/>
+      <p:bldP spid="10" grpId="0" animBg="1"/>
+      <p:bldP spid="10" grpId="1" animBg="1"/>
+      <p:bldP spid="11" grpId="0" animBg="1"/>
+      <p:bldP spid="11" grpId="1" animBg="1"/>
+      <p:bldP spid="12" grpId="0" animBg="1"/>
+      <p:bldP spid="12" grpId="1" animBg="1"/>
+    </p:bldLst>
+  </p:timing>
+</p:sld>
+</file>
+
+<file path=ppt/slides/slide14.xml><?xml version="1.0" encoding="utf-8"?>
+<p:sld xmlns:a="http://schemas.openxmlformats.org/drawingml/2006/main" xmlns:r="http://schemas.openxmlformats.org/officeDocument/2006/relationships" xmlns:p="http://schemas.openxmlformats.org/presentationml/2006/main">
+  <p:cSld>
+    <p:spTree>
+      <p:nvGrpSpPr>
+        <p:cNvPr id="1" name=""/>
+        <p:cNvGrpSpPr/>
+        <p:nvPr/>
+      </p:nvGrpSpPr>
+      <p:grpSpPr>
+        <a:xfrm>
+          <a:off x="0" y="0"/>
+          <a:ext cx="0" cy="0"/>
+          <a:chOff x="0" y="0"/>
+          <a:chExt cx="0" cy="0"/>
+        </a:xfrm>
+      </p:grpSpPr>
+      <p:sp>
+        <p:nvSpPr>
+          <p:cNvPr id="2" name="Trigger">
+            <a:extLst>
+              <a:ext uri="{FF2B5EF4-FFF2-40B4-BE49-F238E27FC236}">
+                <a16:creationId xmlns:a16="http://schemas.microsoft.com/office/drawing/2014/main" id="{015139AA-208E-41A9-9E9D-0FBF9B27A0E4}"/>
+              </a:ext>
+            </a:extLst>
+          </p:cNvPr>
+          <p:cNvSpPr/>
+          <p:nvPr/>
+        </p:nvSpPr>
+        <p:spPr>
+          <a:xfrm>
+            <a:off x="1600200" y="3733800"/>
+            <a:ext cx="1219200" cy="1219200"/>
+          </a:xfrm>
+          <a:prstGeom prst="ellipse">
+            <a:avLst/>
+          </a:prstGeom>
+        </p:spPr>
+        <p:style>
+          <a:lnRef idx="2">
+            <a:schemeClr val="accent1">
+              <a:shade val="50000"/>
+            </a:schemeClr>
+          </a:lnRef>
+          <a:fillRef idx="1">
+            <a:schemeClr val="accent1"/>
+          </a:fillRef>
+          <a:effectRef idx="0">
+            <a:schemeClr val="accent1"/>
+          </a:effectRef>
+          <a:fontRef idx="minor">
+            <a:schemeClr val="lt1"/>
+          </a:fontRef>
+        </p:style>
+        <p:txBody>
+          <a:bodyPr rtlCol="0" anchor="ctr"/>
+          <a:lstStyle/>
+          <a:p>
+            <a:pPr algn="ctr"/>
+            <a:r>
+              <a:rPr lang="en-US" dirty="0"/>
+              <a:t>Trigger</a:t>
+            </a:r>
+          </a:p>
+        </p:txBody>
+      </p:sp>
+      <p:sp>
+        <p:nvSpPr>
+          <p:cNvPr id="5" name="Callout">
+            <a:extLst>
+              <a:ext uri="{FF2B5EF4-FFF2-40B4-BE49-F238E27FC236}">
+                <a16:creationId xmlns:a16="http://schemas.microsoft.com/office/drawing/2014/main" id="{FA930241-05A7-4CEA-829A-96FA333C6D11}"/>
+              </a:ext>
+            </a:extLst>
+          </p:cNvPr>
+          <p:cNvSpPr/>
+          <p:nvPr/>
+        </p:nvSpPr>
+        <p:spPr>
+          <a:xfrm>
+            <a:off x="1866900" y="2209800"/>
+            <a:ext cx="1905000" cy="1270000"/>
+          </a:xfrm>
+          <a:prstGeom prst="wedgeRoundRectCallout">
+            <a:avLst/>
+          </a:prstGeom>
+          <a:solidFill>
+            <a:srgbClr val="000000">
+              <a:alpha val="80000"/>
+            </a:srgbClr>
+          </a:solidFill>
+          <a:ln w="635">
+            <a:solidFill>
+              <a:srgbClr val="FFFF00"/>
+            </a:solidFill>
+          </a:ln>
+          <a:effectLst>
+            <a:outerShdw blurRad="63500" sx="102000" sy="102000" algn="ctr">
+              <a:prstClr val="black">
+                <a:alpha val="40000"/>
+              </a:prstClr>
+            </a:outerShdw>
+          </a:effectLst>
+        </p:spPr>
+        <p:style>
+          <a:lnRef idx="2">
+            <a:schemeClr val="accent1">
+              <a:shade val="50000"/>
+            </a:schemeClr>
+          </a:lnRef>
+          <a:fillRef idx="1">
+            <a:schemeClr val="accent1"/>
+          </a:fillRef>
+          <a:effectRef idx="0">
+            <a:schemeClr val="accent1"/>
+          </a:effectRef>
+          <a:fontRef idx="minor">
+            <a:schemeClr val="lt1"/>
+          </a:fontRef>
+        </p:style>
+        <p:txBody>
+          <a:bodyPr rtlCol="0" anchor="ctr">
+            <a:normAutofit/>
+          </a:bodyPr>
+          <a:lstStyle/>
+          <a:p>
+            <a:pPr algn="ctr"/>
+            <a:r>
+              <a:rPr lang="en-SG" sz="1600" dirty="0">
+                <a:solidFill>
+                  <a:srgbClr val="FFFFFF"/>
+                </a:solidFill>
+              </a:rPr>
+              <a:t>Callout</a:t>
+            </a:r>
+          </a:p>
+        </p:txBody>
+      </p:sp>
+      <p:sp>
+        <p:nvSpPr>
+          <p:cNvPr id="4" name="Callout 2">
+            <a:extLst>
+              <a:ext uri="{FF2B5EF4-FFF2-40B4-BE49-F238E27FC236}">
+                <a16:creationId xmlns:a16="http://schemas.microsoft.com/office/drawing/2014/main" id="{0D5E0CA6-439B-4BDF-B437-B1B94696F950}"/>
+              </a:ext>
+            </a:extLst>
+          </p:cNvPr>
+          <p:cNvSpPr/>
+          <p:nvPr/>
+        </p:nvSpPr>
+        <p:spPr>
+          <a:xfrm>
+            <a:off x="381000" y="2209800"/>
+            <a:ext cx="1905000" cy="1270000"/>
+          </a:xfrm>
+          <a:prstGeom prst="wedgeRoundRectCallout">
+            <a:avLst/>
+          </a:prstGeom>
+          <a:solidFill>
+            <a:srgbClr val="000000">
+              <a:alpha val="80000"/>
+            </a:srgbClr>
+          </a:solidFill>
+          <a:ln w="635">
+            <a:solidFill>
+              <a:srgbClr val="FFFF00"/>
+            </a:solidFill>
+          </a:ln>
+          <a:effectLst>
+            <a:outerShdw blurRad="63500" sx="102000" sy="102000" algn="ctr">
+              <a:prstClr val="black">
+                <a:alpha val="40000"/>
+              </a:prstClr>
+            </a:outerShdw>
+          </a:effectLst>
+        </p:spPr>
+        <p:style>
+          <a:lnRef idx="2">
+            <a:schemeClr val="accent1">
+              <a:shade val="50000"/>
+            </a:schemeClr>
+          </a:lnRef>
+          <a:fillRef idx="1">
+            <a:schemeClr val="accent1"/>
+          </a:fillRef>
+          <a:effectRef idx="0">
+            <a:schemeClr val="accent1"/>
+          </a:effectRef>
+          <a:fontRef idx="minor">
+            <a:schemeClr val="lt1"/>
+          </a:fontRef>
+        </p:style>
+        <p:txBody>
+          <a:bodyPr rtlCol="0" anchor="ctr">
+            <a:normAutofit/>
+          </a:bodyPr>
+          <a:lstStyle/>
+          <a:p>
+            <a:pPr algn="ctr"/>
+            <a:r>
+              <a:rPr lang="en-SG" sz="1600" dirty="0">
+                <a:solidFill>
+                  <a:srgbClr val="FFFFFF"/>
+                </a:solidFill>
+              </a:rPr>
+              <a:t>Callout 2</a:t>
+            </a:r>
+          </a:p>
+        </p:txBody>
+      </p:sp>
+      <p:sp>
+        <p:nvSpPr>
+          <p:cNvPr id="6" name="Callout 4">
+            <a:extLst>
+              <a:ext uri="{FF2B5EF4-FFF2-40B4-BE49-F238E27FC236}">
+                <a16:creationId xmlns:a16="http://schemas.microsoft.com/office/drawing/2014/main" id="{A86F9699-5E67-465E-B139-66238F1EC41F}"/>
+              </a:ext>
+            </a:extLst>
+          </p:cNvPr>
+          <p:cNvSpPr/>
+          <p:nvPr/>
+        </p:nvSpPr>
+        <p:spPr>
+          <a:xfrm>
+            <a:off x="1866900" y="939800"/>
+            <a:ext cx="1905000" cy="1270000"/>
+          </a:xfrm>
+          <a:prstGeom prst="wedgeRoundRectCallout">
+            <a:avLst/>
+          </a:prstGeom>
+          <a:solidFill>
+            <a:srgbClr val="000000">
+              <a:alpha val="80000"/>
+            </a:srgbClr>
+          </a:solidFill>
+          <a:ln w="635">
+            <a:solidFill>
+              <a:srgbClr val="FFFF00"/>
+            </a:solidFill>
+          </a:ln>
+          <a:effectLst>
+            <a:outerShdw blurRad="63500" sx="102000" sy="102000" algn="ctr">
+              <a:prstClr val="black">
+                <a:alpha val="40000"/>
+              </a:prstClr>
+            </a:outerShdw>
+          </a:effectLst>
+        </p:spPr>
+        <p:style>
+          <a:lnRef idx="2">
+            <a:schemeClr val="accent1">
+              <a:shade val="50000"/>
+            </a:schemeClr>
+          </a:lnRef>
+          <a:fillRef idx="1">
+            <a:schemeClr val="accent1"/>
+          </a:fillRef>
+          <a:effectRef idx="0">
+            <a:schemeClr val="accent1"/>
+          </a:effectRef>
+          <a:fontRef idx="minor">
+            <a:schemeClr val="lt1"/>
+          </a:fontRef>
+        </p:style>
+        <p:txBody>
+          <a:bodyPr rtlCol="0" anchor="ctr">
+            <a:normAutofit/>
+          </a:bodyPr>
+          <a:lstStyle/>
+          <a:p>
+            <a:pPr algn="ctr"/>
+            <a:r>
+              <a:rPr lang="en-SG" sz="1600" dirty="0">
+                <a:solidFill>
+                  <a:srgbClr val="FFFFFF"/>
+                </a:solidFill>
+              </a:rPr>
+              <a:t>Callout 4</a:t>
+            </a:r>
+          </a:p>
+        </p:txBody>
+      </p:sp>
+      <p:sp>
+        <p:nvSpPr>
+          <p:cNvPr id="7" name="Callout 3">
+            <a:extLst>
+              <a:ext uri="{FF2B5EF4-FFF2-40B4-BE49-F238E27FC236}">
+                <a16:creationId xmlns:a16="http://schemas.microsoft.com/office/drawing/2014/main" id="{6BEC63F4-B377-46BB-9031-F5E92074DA81}"/>
+              </a:ext>
+            </a:extLst>
+          </p:cNvPr>
+          <p:cNvSpPr/>
+          <p:nvPr/>
+        </p:nvSpPr>
+        <p:spPr>
+          <a:xfrm>
+            <a:off x="381000" y="939800"/>
+            <a:ext cx="1905000" cy="1270000"/>
+          </a:xfrm>
+          <a:prstGeom prst="wedgeRoundRectCallout">
+            <a:avLst/>
+          </a:prstGeom>
+          <a:solidFill>
+            <a:srgbClr val="000000">
+              <a:alpha val="80000"/>
+            </a:srgbClr>
+          </a:solidFill>
+          <a:ln w="635">
+            <a:solidFill>
+              <a:srgbClr val="FFFF00"/>
+            </a:solidFill>
+          </a:ln>
+          <a:effectLst>
+            <a:outerShdw blurRad="63500" sx="102000" sy="102000" algn="ctr">
+              <a:prstClr val="black">
+                <a:alpha val="40000"/>
+              </a:prstClr>
+            </a:outerShdw>
+          </a:effectLst>
+        </p:spPr>
+        <p:style>
+          <a:lnRef idx="2">
+            <a:schemeClr val="accent1">
+              <a:shade val="50000"/>
+            </a:schemeClr>
+          </a:lnRef>
+          <a:fillRef idx="1">
+            <a:schemeClr val="accent1"/>
+          </a:fillRef>
+          <a:effectRef idx="0">
+            <a:schemeClr val="accent1"/>
+          </a:effectRef>
+          <a:fontRef idx="minor">
+            <a:schemeClr val="lt1"/>
+          </a:fontRef>
+        </p:style>
+        <p:txBody>
+          <a:bodyPr rtlCol="0" anchor="ctr">
+            <a:normAutofit/>
+          </a:bodyPr>
+          <a:lstStyle/>
+          <a:p>
+            <a:pPr algn="ctr"/>
+            <a:r>
+              <a:rPr lang="en-SG" sz="1600" dirty="0">
+                <a:solidFill>
+                  <a:srgbClr val="FFFFFF"/>
+                </a:solidFill>
+              </a:rPr>
+              <a:t>Callout 3</a:t>
+            </a:r>
+          </a:p>
+        </p:txBody>
+      </p:sp>
+      <p:sp>
+        <p:nvSpPr>
+          <p:cNvPr id="8" name="Callout 6">
+            <a:extLst>
+              <a:ext uri="{FF2B5EF4-FFF2-40B4-BE49-F238E27FC236}">
+                <a16:creationId xmlns:a16="http://schemas.microsoft.com/office/drawing/2014/main" id="{9A839260-D667-4D78-8D0D-5D6227E305B6}"/>
+              </a:ext>
+            </a:extLst>
+          </p:cNvPr>
+          <p:cNvSpPr/>
+          <p:nvPr/>
+        </p:nvSpPr>
+        <p:spPr>
+          <a:xfrm>
+            <a:off x="5242560" y="939800"/>
+            <a:ext cx="1905000" cy="1270000"/>
+          </a:xfrm>
+          <a:prstGeom prst="wedgeRoundRectCallout">
+            <a:avLst/>
+          </a:prstGeom>
+          <a:solidFill>
+            <a:srgbClr val="000000">
+              <a:alpha val="80000"/>
+            </a:srgbClr>
+          </a:solidFill>
+          <a:ln w="635">
+            <a:solidFill>
+              <a:srgbClr val="FFFF00"/>
+            </a:solidFill>
+          </a:ln>
+          <a:effectLst>
+            <a:outerShdw blurRad="63500" sx="102000" sy="102000" algn="ctr">
+              <a:prstClr val="black">
+                <a:alpha val="40000"/>
+              </a:prstClr>
+            </a:outerShdw>
+          </a:effectLst>
+        </p:spPr>
+        <p:style>
+          <a:lnRef idx="2">
+            <a:schemeClr val="accent1">
+              <a:shade val="50000"/>
+            </a:schemeClr>
+          </a:lnRef>
+          <a:fillRef idx="1">
+            <a:schemeClr val="accent1"/>
+          </a:fillRef>
+          <a:effectRef idx="0">
+            <a:schemeClr val="accent1"/>
+          </a:effectRef>
+          <a:fontRef idx="minor">
+            <a:schemeClr val="lt1"/>
+          </a:fontRef>
+        </p:style>
+        <p:txBody>
+          <a:bodyPr rtlCol="0" anchor="ctr">
+            <a:normAutofit/>
+          </a:bodyPr>
+          <a:lstStyle/>
+          <a:p>
+            <a:pPr algn="ctr"/>
+            <a:r>
+              <a:rPr lang="en-SG" sz="1600" dirty="0">
+                <a:solidFill>
+                  <a:srgbClr val="FFFFFF"/>
+                </a:solidFill>
+              </a:rPr>
+              <a:t>Callout 6</a:t>
+            </a:r>
+          </a:p>
+        </p:txBody>
+      </p:sp>
+      <p:sp>
+        <p:nvSpPr>
+          <p:cNvPr id="9" name="Callout 5">
+            <a:extLst>
+              <a:ext uri="{FF2B5EF4-FFF2-40B4-BE49-F238E27FC236}">
+                <a16:creationId xmlns:a16="http://schemas.microsoft.com/office/drawing/2014/main" id="{E32D3B2F-2936-431E-8434-9010773C86BF}"/>
+              </a:ext>
+            </a:extLst>
+          </p:cNvPr>
+          <p:cNvSpPr/>
+          <p:nvPr/>
+        </p:nvSpPr>
+        <p:spPr>
+          <a:xfrm>
+            <a:off x="3756660" y="939800"/>
+            <a:ext cx="1905000" cy="1270000"/>
+          </a:xfrm>
+          <a:prstGeom prst="wedgeRoundRectCallout">
+            <a:avLst/>
+          </a:prstGeom>
+          <a:solidFill>
+            <a:srgbClr val="000000">
+              <a:alpha val="80000"/>
+            </a:srgbClr>
+          </a:solidFill>
+          <a:ln w="635">
+            <a:solidFill>
+              <a:srgbClr val="FFFF00"/>
+            </a:solidFill>
+          </a:ln>
+          <a:effectLst>
+            <a:outerShdw blurRad="63500" sx="102000" sy="102000" algn="ctr">
+              <a:prstClr val="black">
+                <a:alpha val="40000"/>
+              </a:prstClr>
+            </a:outerShdw>
+          </a:effectLst>
+        </p:spPr>
+        <p:style>
+          <a:lnRef idx="2">
+            <a:schemeClr val="accent1">
+              <a:shade val="50000"/>
+            </a:schemeClr>
+          </a:lnRef>
+          <a:fillRef idx="1">
+            <a:schemeClr val="accent1"/>
+          </a:fillRef>
+          <a:effectRef idx="0">
+            <a:schemeClr val="accent1"/>
+          </a:effectRef>
+          <a:fontRef idx="minor">
+            <a:schemeClr val="lt1"/>
+          </a:fontRef>
+        </p:style>
+        <p:txBody>
+          <a:bodyPr rtlCol="0" anchor="ctr">
+            <a:normAutofit/>
+          </a:bodyPr>
+          <a:lstStyle/>
+          <a:p>
+            <a:pPr algn="ctr"/>
+            <a:r>
+              <a:rPr lang="en-SG" sz="1600" dirty="0">
+                <a:solidFill>
+                  <a:srgbClr val="FFFFFF"/>
+                </a:solidFill>
+              </a:rPr>
+              <a:t>Callout 5</a:t>
+            </a:r>
+          </a:p>
+        </p:txBody>
+      </p:sp>
+      <p:sp>
+        <p:nvSpPr>
+          <p:cNvPr id="10" name="Callout 7">
+            <a:extLst>
+              <a:ext uri="{FF2B5EF4-FFF2-40B4-BE49-F238E27FC236}">
+                <a16:creationId xmlns:a16="http://schemas.microsoft.com/office/drawing/2014/main" id="{C00545B0-92B4-4E45-AA70-2FF3EC6E1D80}"/>
+              </a:ext>
+            </a:extLst>
+          </p:cNvPr>
+          <p:cNvSpPr/>
+          <p:nvPr/>
+        </p:nvSpPr>
+        <p:spPr>
+          <a:xfrm>
+            <a:off x="5257800" y="2194560"/>
+            <a:ext cx="1905000" cy="1270000"/>
+          </a:xfrm>
+          <a:prstGeom prst="wedgeRoundRectCallout">
+            <a:avLst/>
+          </a:prstGeom>
+          <a:solidFill>
+            <a:srgbClr val="000000">
+              <a:alpha val="80000"/>
+            </a:srgbClr>
+          </a:solidFill>
+          <a:ln w="635">
+            <a:solidFill>
+              <a:srgbClr val="FFFF00"/>
+            </a:solidFill>
+          </a:ln>
+          <a:effectLst>
+            <a:outerShdw blurRad="63500" sx="102000" sy="102000" algn="ctr">
+              <a:prstClr val="black">
+                <a:alpha val="40000"/>
+              </a:prstClr>
+            </a:outerShdw>
+          </a:effectLst>
+        </p:spPr>
+        <p:style>
+          <a:lnRef idx="2">
+            <a:schemeClr val="accent1">
+              <a:shade val="50000"/>
+            </a:schemeClr>
+          </a:lnRef>
+          <a:fillRef idx="1">
+            <a:schemeClr val="accent1"/>
+          </a:fillRef>
+          <a:effectRef idx="0">
+            <a:schemeClr val="accent1"/>
+          </a:effectRef>
+          <a:fontRef idx="minor">
+            <a:schemeClr val="lt1"/>
+          </a:fontRef>
+        </p:style>
+        <p:txBody>
+          <a:bodyPr rtlCol="0" anchor="ctr">
+            <a:normAutofit/>
+          </a:bodyPr>
+          <a:lstStyle/>
+          <a:p>
+            <a:pPr algn="ctr"/>
+            <a:r>
+              <a:rPr lang="en-SG" sz="1600" dirty="0">
+                <a:solidFill>
+                  <a:srgbClr val="FFFFFF"/>
+                </a:solidFill>
+              </a:rPr>
+              <a:t>Callout 7</a:t>
+            </a:r>
+          </a:p>
+        </p:txBody>
+      </p:sp>
+      <p:sp>
+        <p:nvSpPr>
+          <p:cNvPr id="11" name="Callout 9">
+            <a:extLst>
+              <a:ext uri="{FF2B5EF4-FFF2-40B4-BE49-F238E27FC236}">
+                <a16:creationId xmlns:a16="http://schemas.microsoft.com/office/drawing/2014/main" id="{F9283D71-D8F1-41A9-884A-D8DA2401B34F}"/>
+              </a:ext>
+            </a:extLst>
+          </p:cNvPr>
+          <p:cNvSpPr/>
+          <p:nvPr/>
+        </p:nvSpPr>
+        <p:spPr>
+          <a:xfrm>
+            <a:off x="3771900" y="2194560"/>
+            <a:ext cx="1905000" cy="1270000"/>
+          </a:xfrm>
+          <a:prstGeom prst="wedgeRoundRectCallout">
+            <a:avLst/>
+          </a:prstGeom>
+          <a:solidFill>
+            <a:srgbClr val="000000">
+              <a:alpha val="80000"/>
+            </a:srgbClr>
+          </a:solidFill>
+          <a:ln w="635">
+            <a:solidFill>
+              <a:srgbClr val="FFFF00"/>
+            </a:solidFill>
+          </a:ln>
+          <a:effectLst>
+            <a:outerShdw blurRad="63500" sx="102000" sy="102000" algn="ctr">
+              <a:prstClr val="black">
+                <a:alpha val="40000"/>
+              </a:prstClr>
+            </a:outerShdw>
+          </a:effectLst>
+        </p:spPr>
+        <p:style>
+          <a:lnRef idx="2">
+            <a:schemeClr val="accent1">
+              <a:shade val="50000"/>
+            </a:schemeClr>
+          </a:lnRef>
+          <a:fillRef idx="1">
+            <a:schemeClr val="accent1"/>
+          </a:fillRef>
+          <a:effectRef idx="0">
+            <a:schemeClr val="accent1"/>
+          </a:effectRef>
+          <a:fontRef idx="minor">
+            <a:schemeClr val="lt1"/>
+          </a:fontRef>
+        </p:style>
+        <p:txBody>
+          <a:bodyPr rtlCol="0" anchor="ctr">
+            <a:normAutofit/>
+          </a:bodyPr>
+          <a:lstStyle/>
+          <a:p>
+            <a:pPr algn="ctr"/>
+            <a:r>
+              <a:rPr lang="en-SG" sz="1600" dirty="0">
+                <a:solidFill>
+                  <a:srgbClr val="FFFFFF"/>
+                </a:solidFill>
+              </a:rPr>
+              <a:t>Callout 9</a:t>
+            </a:r>
+          </a:p>
+        </p:txBody>
+      </p:sp>
+      <p:sp>
+        <p:nvSpPr>
+          <p:cNvPr id="12" name="Callout 8">
+            <a:extLst>
+              <a:ext uri="{FF2B5EF4-FFF2-40B4-BE49-F238E27FC236}">
+                <a16:creationId xmlns:a16="http://schemas.microsoft.com/office/drawing/2014/main" id="{9CE155FA-FF9D-4C68-9F68-76370ECF0CEB}"/>
+              </a:ext>
+            </a:extLst>
+          </p:cNvPr>
+          <p:cNvSpPr/>
+          <p:nvPr/>
+        </p:nvSpPr>
+        <p:spPr>
+          <a:xfrm>
+            <a:off x="4394202" y="3200400"/>
+            <a:ext cx="1905000" cy="1270000"/>
+          </a:xfrm>
+          <a:prstGeom prst="wedgeRoundRectCallout">
+            <a:avLst/>
+          </a:prstGeom>
+          <a:solidFill>
+            <a:srgbClr val="000000">
+              <a:alpha val="80000"/>
+            </a:srgbClr>
+          </a:solidFill>
+          <a:ln w="635">
+            <a:solidFill>
+              <a:srgbClr val="FFFF00"/>
+            </a:solidFill>
+          </a:ln>
+          <a:effectLst>
+            <a:outerShdw blurRad="63500" sx="102000" sy="102000" algn="ctr">
+              <a:prstClr val="black">
+                <a:alpha val="40000"/>
+              </a:prstClr>
+            </a:outerShdw>
+          </a:effectLst>
+        </p:spPr>
+        <p:style>
+          <a:lnRef idx="2">
+            <a:schemeClr val="accent1">
+              <a:shade val="50000"/>
+            </a:schemeClr>
+          </a:lnRef>
+          <a:fillRef idx="1">
+            <a:schemeClr val="accent1"/>
+          </a:fillRef>
+          <a:effectRef idx="0">
+            <a:schemeClr val="accent1"/>
+          </a:effectRef>
+          <a:fontRef idx="minor">
+            <a:schemeClr val="lt1"/>
+          </a:fontRef>
+        </p:style>
+        <p:txBody>
+          <a:bodyPr rtlCol="0" anchor="ctr">
+            <a:normAutofit/>
+          </a:bodyPr>
+          <a:lstStyle/>
+          <a:p>
+            <a:pPr algn="ctr"/>
+            <a:r>
+              <a:rPr lang="en-SG" sz="1600" dirty="0">
+                <a:solidFill>
+                  <a:srgbClr val="FFFFFF"/>
+                </a:solidFill>
+              </a:rPr>
+              <a:t>Callout 8</a:t>
+            </a:r>
+          </a:p>
+        </p:txBody>
+      </p:sp>
+    </p:spTree>
+    <p:extLst>
+      <p:ext uri="{BB962C8B-B14F-4D97-AF65-F5344CB8AC3E}">
+        <p14:creationId xmlns:p14="http://schemas.microsoft.com/office/powerpoint/2010/main" val="1143565253"/>
+      </p:ext>
+    </p:extLst>
+  </p:cSld>
+  <p:clrMapOvr>
+    <a:masterClrMapping/>
+  </p:clrMapOvr>
+  <p:timing>
+    <p:tnLst>
+      <p:par>
+        <p:cTn id="1" dur="indefinite" restart="never" nodeType="tmRoot">
+          <p:childTnLst>
+            <p:seq concurrent="1" nextAc="seek">
+              <p:cTn id="2" dur="indefinite" nodeType="mainSeq">
+                <p:childTnLst>
+                  <p:par>
+                    <p:cTn id="3" fill="hold">
+                      <p:stCondLst>
+                        <p:cond delay="indefinite"/>
+                      </p:stCondLst>
+                      <p:childTnLst>
+                        <p:par>
+                          <p:cTn id="4" fill="hold">
+                            <p:stCondLst>
+                              <p:cond delay="0"/>
+                            </p:stCondLst>
+                            <p:childTnLst>
+                              <p:par>
+                                <p:cTn id="5" presetID="10" presetClass="entr" presetSubtype="0" fill="hold" grpId="0" nodeType="clickEffect">
+                                  <p:stCondLst>
+                                    <p:cond delay="0"/>
+                                  </p:stCondLst>
+                                  <p:childTnLst>
+                                    <p:set>
+                                      <p:cBhvr>
+                                        <p:cTn id="6" dur="1" fill="hold">
+                                          <p:stCondLst>
+                                            <p:cond delay="0"/>
+                                          </p:stCondLst>
+                                        </p:cTn>
+                                        <p:tgtEl>
+                                          <p:spTgt spid="5"/>
+                                        </p:tgtEl>
+                                        <p:attrNameLst>
+                                          <p:attrName>style.visibility</p:attrName>
+                                        </p:attrNameLst>
+                                      </p:cBhvr>
+                                      <p:to>
+                                        <p:strVal val="visible"/>
+                                      </p:to>
+                                    </p:set>
+                                    <p:animEffect transition="in" filter="fade">
+                                      <p:cBhvr>
+                                        <p:cTn id="7" dur="500"/>
+                                        <p:tgtEl>
+                                          <p:spTgt spid="5"/>
+                                        </p:tgtEl>
+                                      </p:cBhvr>
+                                    </p:animEffect>
+                                  </p:childTnLst>
+                                </p:cTn>
+                              </p:par>
+                            </p:childTnLst>
+                          </p:cTn>
+                        </p:par>
+                      </p:childTnLst>
+                    </p:cTn>
+                  </p:par>
+                  <p:par>
+                    <p:cTn id="8" fill="hold">
+                      <p:stCondLst>
+                        <p:cond delay="indefinite"/>
+                      </p:stCondLst>
+                      <p:childTnLst>
+                        <p:par>
+                          <p:cTn id="9" fill="hold">
+                            <p:stCondLst>
+                              <p:cond delay="0"/>
+                            </p:stCondLst>
+                            <p:childTnLst>
+                              <p:par>
+                                <p:cTn id="10" presetID="10" presetClass="exit" presetSubtype="0" fill="hold" grpId="1" nodeType="clickEffect">
+                                  <p:stCondLst>
+                                    <p:cond delay="0"/>
+                                  </p:stCondLst>
+                                  <p:childTnLst>
+                                    <p:animEffect transition="out" filter="fade">
+                                      <p:cBhvr>
+                                        <p:cTn id="11" dur="500"/>
+                                        <p:tgtEl>
+                                          <p:spTgt spid="5"/>
+                                        </p:tgtEl>
+                                      </p:cBhvr>
+                                    </p:animEffect>
+                                    <p:set>
+                                      <p:cBhvr>
+                                        <p:cTn id="12" dur="1" fill="hold">
+                                          <p:stCondLst>
+                                            <p:cond delay="499"/>
+                                          </p:stCondLst>
+                                        </p:cTn>
+                                        <p:tgtEl>
+                                          <p:spTgt spid="5"/>
+                                        </p:tgtEl>
+                                        <p:attrNameLst>
+                                          <p:attrName>style.visibility</p:attrName>
+                                        </p:attrNameLst>
+                                      </p:cBhvr>
+                                      <p:to>
+                                        <p:strVal val="hidden"/>
+                                      </p:to>
+                                    </p:set>
+                                  </p:childTnLst>
+                                </p:cTn>
+                              </p:par>
+                            </p:childTnLst>
+                          </p:cTn>
+                        </p:par>
+                      </p:childTnLst>
+                    </p:cTn>
+                  </p:par>
+                  <p:par>
+                    <p:cTn id="13" fill="hold">
+                      <p:stCondLst>
+                        <p:cond delay="indefinite"/>
+                      </p:stCondLst>
+                      <p:childTnLst>
+                        <p:par>
+                          <p:cTn id="14" fill="hold">
+                            <p:stCondLst>
+                              <p:cond delay="0"/>
+                            </p:stCondLst>
+                            <p:childTnLst>
+                              <p:par>
+                                <p:cTn id="15" presetID="10" presetClass="entr" presetSubtype="0" fill="hold" grpId="0" nodeType="clickEffect">
+                                  <p:stCondLst>
+                                    <p:cond delay="0"/>
+                                  </p:stCondLst>
+                                  <p:childTnLst>
+                                    <p:set>
+                                      <p:cBhvr>
+                                        <p:cTn id="16" dur="1" fill="hold">
+                                          <p:stCondLst>
+                                            <p:cond delay="0"/>
+                                          </p:stCondLst>
+                                        </p:cTn>
+                                        <p:tgtEl>
+                                          <p:spTgt spid="4"/>
+                                        </p:tgtEl>
+                                        <p:attrNameLst>
+                                          <p:attrName>style.visibility</p:attrName>
+                                        </p:attrNameLst>
+                                      </p:cBhvr>
+                                      <p:to>
+                                        <p:strVal val="visible"/>
+                                      </p:to>
+                                    </p:set>
+                                    <p:animEffect transition="in" filter="fade">
+                                      <p:cBhvr>
+                                        <p:cTn id="17" dur="500"/>
+                                        <p:tgtEl>
+                                          <p:spTgt spid="4"/>
+                                        </p:tgtEl>
+                                      </p:cBhvr>
+                                    </p:animEffect>
+                                  </p:childTnLst>
+                                </p:cTn>
+                              </p:par>
+                            </p:childTnLst>
+                          </p:cTn>
+                        </p:par>
+                      </p:childTnLst>
+                    </p:cTn>
+                  </p:par>
+                  <p:par>
+                    <p:cTn id="18" fill="hold">
+                      <p:stCondLst>
+                        <p:cond delay="indefinite"/>
+                      </p:stCondLst>
+                      <p:childTnLst>
+                        <p:par>
+                          <p:cTn id="19" fill="hold">
+                            <p:stCondLst>
+                              <p:cond delay="0"/>
+                            </p:stCondLst>
+                            <p:childTnLst>
+                              <p:par>
+                                <p:cTn id="20" presetID="10" presetClass="exit" presetSubtype="0" fill="hold" grpId="1" nodeType="clickEffect">
+                                  <p:stCondLst>
+                                    <p:cond delay="0"/>
+                                  </p:stCondLst>
+                                  <p:childTnLst>
+                                    <p:animEffect transition="out" filter="fade">
+                                      <p:cBhvr>
+                                        <p:cTn id="21" dur="500"/>
+                                        <p:tgtEl>
+                                          <p:spTgt spid="4"/>
+                                        </p:tgtEl>
+                                      </p:cBhvr>
+                                    </p:animEffect>
+                                    <p:set>
+                                      <p:cBhvr>
+                                        <p:cTn id="22" dur="1" fill="hold">
+                                          <p:stCondLst>
+                                            <p:cond delay="499"/>
+                                          </p:stCondLst>
+                                        </p:cTn>
+                                        <p:tgtEl>
+                                          <p:spTgt spid="4"/>
+                                        </p:tgtEl>
+                                        <p:attrNameLst>
+                                          <p:attrName>style.visibility</p:attrName>
+                                        </p:attrNameLst>
+                                      </p:cBhvr>
+                                      <p:to>
+                                        <p:strVal val="hidden"/>
+                                      </p:to>
+                                    </p:set>
+                                  </p:childTnLst>
+                                </p:cTn>
+                              </p:par>
+                            </p:childTnLst>
+                          </p:cTn>
+                        </p:par>
+                      </p:childTnLst>
+                    </p:cTn>
+                  </p:par>
+                  <p:par>
+                    <p:cTn id="23" fill="hold">
+                      <p:stCondLst>
+                        <p:cond delay="indefinite"/>
+                      </p:stCondLst>
+                      <p:childTnLst>
+                        <p:par>
+                          <p:cTn id="24" fill="hold">
+                            <p:stCondLst>
+                              <p:cond delay="0"/>
+                            </p:stCondLst>
+                            <p:childTnLst>
+                              <p:par>
+                                <p:cTn id="25" presetID="10" presetClass="entr" presetSubtype="0" fill="hold" grpId="0" nodeType="clickEffect">
+                                  <p:stCondLst>
+                                    <p:cond delay="0"/>
+                                  </p:stCondLst>
+                                  <p:childTnLst>
+                                    <p:set>
+                                      <p:cBhvr>
+                                        <p:cTn id="26" dur="1" fill="hold">
+                                          <p:stCondLst>
+                                            <p:cond delay="0"/>
+                                          </p:stCondLst>
+                                        </p:cTn>
+                                        <p:tgtEl>
+                                          <p:spTgt spid="6"/>
+                                        </p:tgtEl>
+                                        <p:attrNameLst>
+                                          <p:attrName>style.visibility</p:attrName>
+                                        </p:attrNameLst>
+                                      </p:cBhvr>
+                                      <p:to>
+                                        <p:strVal val="visible"/>
+                                      </p:to>
+                                    </p:set>
+                                    <p:animEffect transition="in" filter="fade">
+                                      <p:cBhvr>
+                                        <p:cTn id="27" dur="500"/>
+                                        <p:tgtEl>
+                                          <p:spTgt spid="6"/>
+                                        </p:tgtEl>
+                                      </p:cBhvr>
+                                    </p:animEffect>
+                                  </p:childTnLst>
+                                </p:cTn>
+                              </p:par>
+                            </p:childTnLst>
+                          </p:cTn>
+                        </p:par>
+                      </p:childTnLst>
+                    </p:cTn>
+                  </p:par>
+                  <p:par>
+                    <p:cTn id="28" fill="hold">
+                      <p:stCondLst>
+                        <p:cond delay="indefinite"/>
+                      </p:stCondLst>
+                      <p:childTnLst>
+                        <p:par>
+                          <p:cTn id="29" fill="hold">
+                            <p:stCondLst>
+                              <p:cond delay="0"/>
+                            </p:stCondLst>
+                            <p:childTnLst>
+                              <p:par>
+                                <p:cTn id="30" presetID="10" presetClass="exit" presetSubtype="0" fill="hold" grpId="1" nodeType="clickEffect">
+                                  <p:stCondLst>
+                                    <p:cond delay="0"/>
+                                  </p:stCondLst>
+                                  <p:childTnLst>
+                                    <p:animEffect transition="out" filter="fade">
+                                      <p:cBhvr>
+                                        <p:cTn id="31" dur="500"/>
+                                        <p:tgtEl>
+                                          <p:spTgt spid="6"/>
+                                        </p:tgtEl>
+                                      </p:cBhvr>
+                                    </p:animEffect>
+                                    <p:set>
+                                      <p:cBhvr>
+                                        <p:cTn id="32" dur="1" fill="hold">
+                                          <p:stCondLst>
+                                            <p:cond delay="499"/>
+                                          </p:stCondLst>
+                                        </p:cTn>
+                                        <p:tgtEl>
+                                          <p:spTgt spid="6"/>
+                                        </p:tgtEl>
+                                        <p:attrNameLst>
+                                          <p:attrName>style.visibility</p:attrName>
+                                        </p:attrNameLst>
+                                      </p:cBhvr>
+                                      <p:to>
+                                        <p:strVal val="hidden"/>
+                                      </p:to>
+                                    </p:set>
+                                  </p:childTnLst>
+                                </p:cTn>
+                              </p:par>
+                            </p:childTnLst>
+                          </p:cTn>
+                        </p:par>
+                      </p:childTnLst>
+                    </p:cTn>
+                  </p:par>
+                  <p:par>
+                    <p:cTn id="33" fill="hold">
+                      <p:stCondLst>
+                        <p:cond delay="indefinite"/>
+                      </p:stCondLst>
+                      <p:childTnLst>
+                        <p:par>
+                          <p:cTn id="34" fill="hold">
+                            <p:stCondLst>
+                              <p:cond delay="0"/>
+                            </p:stCondLst>
+                            <p:childTnLst>
+                              <p:par>
+                                <p:cTn id="35" presetID="10" presetClass="entr" presetSubtype="0" fill="hold" grpId="0" nodeType="clickEffect">
+                                  <p:stCondLst>
+                                    <p:cond delay="0"/>
+                                  </p:stCondLst>
+                                  <p:childTnLst>
+                                    <p:set>
+                                      <p:cBhvr>
+                                        <p:cTn id="36" dur="1" fill="hold">
+                                          <p:stCondLst>
+                                            <p:cond delay="0"/>
+                                          </p:stCondLst>
+                                        </p:cTn>
+                                        <p:tgtEl>
+                                          <p:spTgt spid="7"/>
+                                        </p:tgtEl>
+                                        <p:attrNameLst>
+                                          <p:attrName>style.visibility</p:attrName>
+                                        </p:attrNameLst>
+                                      </p:cBhvr>
+                                      <p:to>
+                                        <p:strVal val="visible"/>
+                                      </p:to>
+                                    </p:set>
+                                    <p:animEffect transition="in" filter="fade">
+                                      <p:cBhvr>
+                                        <p:cTn id="37" dur="500"/>
+                                        <p:tgtEl>
+                                          <p:spTgt spid="7"/>
+                                        </p:tgtEl>
+                                      </p:cBhvr>
+                                    </p:animEffect>
+                                  </p:childTnLst>
+                                </p:cTn>
+                              </p:par>
+                            </p:childTnLst>
+                          </p:cTn>
+                        </p:par>
+                      </p:childTnLst>
+                    </p:cTn>
+                  </p:par>
+                  <p:par>
+                    <p:cTn id="38" fill="hold">
+                      <p:stCondLst>
+                        <p:cond delay="indefinite"/>
+                      </p:stCondLst>
+                      <p:childTnLst>
+                        <p:par>
+                          <p:cTn id="39" fill="hold">
+                            <p:stCondLst>
+                              <p:cond delay="0"/>
+                            </p:stCondLst>
+                            <p:childTnLst>
+                              <p:par>
+                                <p:cTn id="40" presetID="10" presetClass="exit" presetSubtype="0" fill="hold" grpId="1" nodeType="clickEffect">
+                                  <p:stCondLst>
+                                    <p:cond delay="0"/>
+                                  </p:stCondLst>
+                                  <p:childTnLst>
+                                    <p:animEffect transition="out" filter="fade">
+                                      <p:cBhvr>
+                                        <p:cTn id="41" dur="500"/>
+                                        <p:tgtEl>
+                                          <p:spTgt spid="7"/>
+                                        </p:tgtEl>
+                                      </p:cBhvr>
+                                    </p:animEffect>
+                                    <p:set>
+                                      <p:cBhvr>
+                                        <p:cTn id="42" dur="1" fill="hold">
+                                          <p:stCondLst>
+                                            <p:cond delay="499"/>
+                                          </p:stCondLst>
+                                        </p:cTn>
+                                        <p:tgtEl>
+                                          <p:spTgt spid="7"/>
+                                        </p:tgtEl>
+                                        <p:attrNameLst>
+                                          <p:attrName>style.visibility</p:attrName>
+                                        </p:attrNameLst>
+                                      </p:cBhvr>
+                                      <p:to>
+                                        <p:strVal val="hidden"/>
+                                      </p:to>
+                                    </p:set>
+                                  </p:childTnLst>
+                                </p:cTn>
+                              </p:par>
+                            </p:childTnLst>
+                          </p:cTn>
+                        </p:par>
+                      </p:childTnLst>
+                    </p:cTn>
+                  </p:par>
+                  <p:par>
+                    <p:cTn id="43" fill="hold">
+                      <p:stCondLst>
+                        <p:cond delay="indefinite"/>
+                      </p:stCondLst>
+                      <p:childTnLst>
+                        <p:par>
+                          <p:cTn id="44" fill="hold">
+                            <p:stCondLst>
+                              <p:cond delay="0"/>
+                            </p:stCondLst>
+                            <p:childTnLst>
+                              <p:par>
+                                <p:cTn id="45" presetID="10" presetClass="entr" presetSubtype="0" fill="hold" grpId="0" nodeType="clickEffect">
+                                  <p:stCondLst>
+                                    <p:cond delay="0"/>
+                                  </p:stCondLst>
+                                  <p:childTnLst>
+                                    <p:set>
+                                      <p:cBhvr>
+                                        <p:cTn id="46" dur="1" fill="hold">
+                                          <p:stCondLst>
+                                            <p:cond delay="0"/>
+                                          </p:stCondLst>
+                                        </p:cTn>
+                                        <p:tgtEl>
+                                          <p:spTgt spid="8"/>
+                                        </p:tgtEl>
+                                        <p:attrNameLst>
+                                          <p:attrName>style.visibility</p:attrName>
+                                        </p:attrNameLst>
+                                      </p:cBhvr>
+                                      <p:to>
+                                        <p:strVal val="visible"/>
+                                      </p:to>
+                                    </p:set>
+                                    <p:animEffect transition="in" filter="fade">
+                                      <p:cBhvr>
+                                        <p:cTn id="47" dur="500"/>
+                                        <p:tgtEl>
+                                          <p:spTgt spid="8"/>
+                                        </p:tgtEl>
+                                      </p:cBhvr>
+                                    </p:animEffect>
+                                  </p:childTnLst>
+                                </p:cTn>
+                              </p:par>
+                            </p:childTnLst>
+                          </p:cTn>
+                        </p:par>
+                      </p:childTnLst>
+                    </p:cTn>
+                  </p:par>
+                  <p:par>
+                    <p:cTn id="48" fill="hold">
+                      <p:stCondLst>
+                        <p:cond delay="indefinite"/>
+                      </p:stCondLst>
+                      <p:childTnLst>
+                        <p:par>
+                          <p:cTn id="49" fill="hold">
+                            <p:stCondLst>
+                              <p:cond delay="0"/>
+                            </p:stCondLst>
+                            <p:childTnLst>
+                              <p:par>
+                                <p:cTn id="50" presetID="10" presetClass="exit" presetSubtype="0" fill="hold" grpId="1" nodeType="clickEffect">
+                                  <p:stCondLst>
+                                    <p:cond delay="0"/>
+                                  </p:stCondLst>
+                                  <p:childTnLst>
+                                    <p:animEffect transition="out" filter="fade">
+                                      <p:cBhvr>
+                                        <p:cTn id="51" dur="500"/>
+                                        <p:tgtEl>
+                                          <p:spTgt spid="8"/>
+                                        </p:tgtEl>
+                                      </p:cBhvr>
+                                    </p:animEffect>
+                                    <p:set>
+                                      <p:cBhvr>
+                                        <p:cTn id="52" dur="1" fill="hold">
+                                          <p:stCondLst>
+                                            <p:cond delay="499"/>
+                                          </p:stCondLst>
+                                        </p:cTn>
+                                        <p:tgtEl>
+                                          <p:spTgt spid="8"/>
+                                        </p:tgtEl>
+                                        <p:attrNameLst>
+                                          <p:attrName>style.visibility</p:attrName>
+                                        </p:attrNameLst>
+                                      </p:cBhvr>
+                                      <p:to>
+                                        <p:strVal val="hidden"/>
+                                      </p:to>
+                                    </p:set>
+                                  </p:childTnLst>
+                                </p:cTn>
+                              </p:par>
+                            </p:childTnLst>
+                          </p:cTn>
+                        </p:par>
+                      </p:childTnLst>
+                    </p:cTn>
+                  </p:par>
+                  <p:par>
+                    <p:cTn id="53" fill="hold">
+                      <p:stCondLst>
+                        <p:cond delay="indefinite"/>
+                      </p:stCondLst>
+                      <p:childTnLst>
+                        <p:par>
+                          <p:cTn id="54" fill="hold">
+                            <p:stCondLst>
+                              <p:cond delay="0"/>
+                            </p:stCondLst>
+                            <p:childTnLst>
+                              <p:par>
+                                <p:cTn id="55" presetID="10" presetClass="entr" presetSubtype="0" fill="hold" grpId="0" nodeType="clickEffect">
+                                  <p:stCondLst>
+                                    <p:cond delay="0"/>
+                                  </p:stCondLst>
+                                  <p:childTnLst>
+                                    <p:set>
+                                      <p:cBhvr>
+                                        <p:cTn id="56" dur="1" fill="hold">
+                                          <p:stCondLst>
+                                            <p:cond delay="0"/>
+                                          </p:stCondLst>
+                                        </p:cTn>
+                                        <p:tgtEl>
+                                          <p:spTgt spid="9"/>
+                                        </p:tgtEl>
+                                        <p:attrNameLst>
+                                          <p:attrName>style.visibility</p:attrName>
+                                        </p:attrNameLst>
+                                      </p:cBhvr>
+                                      <p:to>
+                                        <p:strVal val="visible"/>
+                                      </p:to>
+                                    </p:set>
+                                    <p:animEffect transition="in" filter="fade">
+                                      <p:cBhvr>
+                                        <p:cTn id="57" dur="500"/>
+                                        <p:tgtEl>
+                                          <p:spTgt spid="9"/>
+                                        </p:tgtEl>
+                                      </p:cBhvr>
+                                    </p:animEffect>
+                                  </p:childTnLst>
+                                </p:cTn>
+                              </p:par>
+                            </p:childTnLst>
+                          </p:cTn>
+                        </p:par>
+                      </p:childTnLst>
+                    </p:cTn>
+                  </p:par>
+                  <p:par>
+                    <p:cTn id="58" fill="hold">
+                      <p:stCondLst>
+                        <p:cond delay="indefinite"/>
+                      </p:stCondLst>
+                      <p:childTnLst>
+                        <p:par>
+                          <p:cTn id="59" fill="hold">
+                            <p:stCondLst>
+                              <p:cond delay="0"/>
+                            </p:stCondLst>
+                            <p:childTnLst>
+                              <p:par>
+                                <p:cTn id="60" presetID="10" presetClass="exit" presetSubtype="0" fill="hold" grpId="1" nodeType="clickEffect">
+                                  <p:stCondLst>
+                                    <p:cond delay="0"/>
+                                  </p:stCondLst>
+                                  <p:childTnLst>
+                                    <p:animEffect transition="out" filter="fade">
+                                      <p:cBhvr>
+                                        <p:cTn id="61" dur="500"/>
+                                        <p:tgtEl>
+                                          <p:spTgt spid="9"/>
+                                        </p:tgtEl>
+                                      </p:cBhvr>
+                                    </p:animEffect>
+                                    <p:set>
+                                      <p:cBhvr>
+                                        <p:cTn id="62" dur="1" fill="hold">
+                                          <p:stCondLst>
+                                            <p:cond delay="499"/>
+                                          </p:stCondLst>
+                                        </p:cTn>
+                                        <p:tgtEl>
+                                          <p:spTgt spid="9"/>
+                                        </p:tgtEl>
+                                        <p:attrNameLst>
+                                          <p:attrName>style.visibility</p:attrName>
+                                        </p:attrNameLst>
+                                      </p:cBhvr>
+                                      <p:to>
+                                        <p:strVal val="hidden"/>
+                                      </p:to>
+                                    </p:set>
+                                  </p:childTnLst>
+                                </p:cTn>
+                              </p:par>
+                            </p:childTnLst>
+                          </p:cTn>
+                        </p:par>
+                      </p:childTnLst>
+                    </p:cTn>
+                  </p:par>
+                  <p:par>
+                    <p:cTn id="63" fill="hold">
+                      <p:stCondLst>
+                        <p:cond delay="indefinite"/>
+                      </p:stCondLst>
+                      <p:childTnLst>
+                        <p:par>
+                          <p:cTn id="64" fill="hold">
+                            <p:stCondLst>
+                              <p:cond delay="0"/>
+                            </p:stCondLst>
+                            <p:childTnLst>
+                              <p:par>
+                                <p:cTn id="65" presetID="10" presetClass="entr" presetSubtype="0" fill="hold" grpId="0" nodeType="clickEffect">
+                                  <p:stCondLst>
+                                    <p:cond delay="0"/>
+                                  </p:stCondLst>
+                                  <p:childTnLst>
+                                    <p:set>
+                                      <p:cBhvr>
+                                        <p:cTn id="66" dur="1" fill="hold">
+                                          <p:stCondLst>
+                                            <p:cond delay="0"/>
+                                          </p:stCondLst>
+                                        </p:cTn>
+                                        <p:tgtEl>
+                                          <p:spTgt spid="10"/>
+                                        </p:tgtEl>
+                                        <p:attrNameLst>
+                                          <p:attrName>style.visibility</p:attrName>
+                                        </p:attrNameLst>
+                                      </p:cBhvr>
+                                      <p:to>
+                                        <p:strVal val="visible"/>
+                                      </p:to>
+                                    </p:set>
+                                    <p:animEffect transition="in" filter="fade">
+                                      <p:cBhvr>
+                                        <p:cTn id="67" dur="500"/>
+                                        <p:tgtEl>
+                                          <p:spTgt spid="10"/>
+                                        </p:tgtEl>
+                                      </p:cBhvr>
+                                    </p:animEffect>
+                                  </p:childTnLst>
+                                </p:cTn>
+                              </p:par>
+                            </p:childTnLst>
+                          </p:cTn>
+                        </p:par>
+                      </p:childTnLst>
+                    </p:cTn>
+                  </p:par>
+                  <p:par>
+                    <p:cTn id="68" fill="hold">
+                      <p:stCondLst>
+                        <p:cond delay="indefinite"/>
+                      </p:stCondLst>
+                      <p:childTnLst>
+                        <p:par>
+                          <p:cTn id="69" fill="hold">
+                            <p:stCondLst>
+                              <p:cond delay="0"/>
+                            </p:stCondLst>
+                            <p:childTnLst>
+                              <p:par>
+                                <p:cTn id="70" presetID="10" presetClass="exit" presetSubtype="0" fill="hold" grpId="1" nodeType="clickEffect">
+                                  <p:stCondLst>
+                                    <p:cond delay="0"/>
+                                  </p:stCondLst>
+                                  <p:childTnLst>
+                                    <p:animEffect transition="out" filter="fade">
+                                      <p:cBhvr>
+                                        <p:cTn id="71" dur="500"/>
+                                        <p:tgtEl>
+                                          <p:spTgt spid="10"/>
+                                        </p:tgtEl>
+                                      </p:cBhvr>
+                                    </p:animEffect>
+                                    <p:set>
+                                      <p:cBhvr>
+                                        <p:cTn id="72" dur="1" fill="hold">
+                                          <p:stCondLst>
+                                            <p:cond delay="499"/>
+                                          </p:stCondLst>
+                                        </p:cTn>
+                                        <p:tgtEl>
+                                          <p:spTgt spid="10"/>
+                                        </p:tgtEl>
+                                        <p:attrNameLst>
+                                          <p:attrName>style.visibility</p:attrName>
+                                        </p:attrNameLst>
+                                      </p:cBhvr>
+                                      <p:to>
+                                        <p:strVal val="hidden"/>
+                                      </p:to>
+                                    </p:set>
+                                  </p:childTnLst>
+                                </p:cTn>
+                              </p:par>
+                            </p:childTnLst>
+                          </p:cTn>
+                        </p:par>
+                      </p:childTnLst>
+                    </p:cTn>
+                  </p:par>
+                  <p:par>
+                    <p:cTn id="73" fill="hold">
+                      <p:stCondLst>
+                        <p:cond delay="indefinite"/>
+                      </p:stCondLst>
+                      <p:childTnLst>
+                        <p:par>
+                          <p:cTn id="74" fill="hold">
+                            <p:stCondLst>
+                              <p:cond delay="0"/>
+                            </p:stCondLst>
+                            <p:childTnLst>
+                              <p:par>
+                                <p:cTn id="75" presetID="10" presetClass="entr" presetSubtype="0" fill="hold" grpId="0" nodeType="clickEffect">
+                                  <p:stCondLst>
+                                    <p:cond delay="0"/>
+                                  </p:stCondLst>
+                                  <p:childTnLst>
+                                    <p:set>
+                                      <p:cBhvr>
+                                        <p:cTn id="76" dur="1" fill="hold">
+                                          <p:stCondLst>
+                                            <p:cond delay="0"/>
+                                          </p:stCondLst>
+                                        </p:cTn>
+                                        <p:tgtEl>
+                                          <p:spTgt spid="11"/>
+                                        </p:tgtEl>
+                                        <p:attrNameLst>
+                                          <p:attrName>style.visibility</p:attrName>
+                                        </p:attrNameLst>
+                                      </p:cBhvr>
+                                      <p:to>
+                                        <p:strVal val="visible"/>
+                                      </p:to>
+                                    </p:set>
+                                    <p:animEffect transition="in" filter="fade">
+                                      <p:cBhvr>
+                                        <p:cTn id="77" dur="500"/>
+                                        <p:tgtEl>
+                                          <p:spTgt spid="11"/>
+                                        </p:tgtEl>
+                                      </p:cBhvr>
+                                    </p:animEffect>
+                                  </p:childTnLst>
+                                </p:cTn>
+                              </p:par>
+                            </p:childTnLst>
+                          </p:cTn>
+                        </p:par>
+                      </p:childTnLst>
+                    </p:cTn>
+                  </p:par>
+                  <p:par>
+                    <p:cTn id="78" fill="hold">
+                      <p:stCondLst>
+                        <p:cond delay="indefinite"/>
+                      </p:stCondLst>
+                      <p:childTnLst>
+                        <p:par>
+                          <p:cTn id="79" fill="hold">
+                            <p:stCondLst>
+                              <p:cond delay="0"/>
+                            </p:stCondLst>
+                            <p:childTnLst>
+                              <p:par>
+                                <p:cTn id="80" presetID="10" presetClass="exit" presetSubtype="0" fill="hold" grpId="1" nodeType="clickEffect">
+                                  <p:stCondLst>
+                                    <p:cond delay="0"/>
+                                  </p:stCondLst>
+                                  <p:childTnLst>
+                                    <p:animEffect transition="out" filter="fade">
+                                      <p:cBhvr>
+                                        <p:cTn id="81" dur="500"/>
+                                        <p:tgtEl>
+                                          <p:spTgt spid="11"/>
+                                        </p:tgtEl>
+                                      </p:cBhvr>
+                                    </p:animEffect>
+                                    <p:set>
+                                      <p:cBhvr>
+                                        <p:cTn id="82" dur="1" fill="hold">
+                                          <p:stCondLst>
+                                            <p:cond delay="499"/>
+                                          </p:stCondLst>
+                                        </p:cTn>
+                                        <p:tgtEl>
+                                          <p:spTgt spid="11"/>
+                                        </p:tgtEl>
+                                        <p:attrNameLst>
+                                          <p:attrName>style.visibility</p:attrName>
+                                        </p:attrNameLst>
+                                      </p:cBhvr>
+                                      <p:to>
+                                        <p:strVal val="hidden"/>
+                                      </p:to>
+                                    </p:set>
+                                  </p:childTnLst>
+                                </p:cTn>
+                              </p:par>
+                            </p:childTnLst>
+                          </p:cTn>
+                        </p:par>
+                      </p:childTnLst>
+                    </p:cTn>
+                  </p:par>
+                  <p:par>
+                    <p:cTn id="83" fill="hold">
+                      <p:stCondLst>
+                        <p:cond delay="indefinite"/>
+                      </p:stCondLst>
+                      <p:childTnLst>
+                        <p:par>
+                          <p:cTn id="84" fill="hold">
+                            <p:stCondLst>
+                              <p:cond delay="0"/>
+                            </p:stCondLst>
+                            <p:childTnLst>
+                              <p:par>
+                                <p:cTn id="85" presetID="10" presetClass="entr" presetSubtype="0" fill="hold" grpId="0" nodeType="clickEffect">
+                                  <p:stCondLst>
+                                    <p:cond delay="0"/>
+                                  </p:stCondLst>
+                                  <p:childTnLst>
+                                    <p:set>
+                                      <p:cBhvr>
+                                        <p:cTn id="86" dur="1" fill="hold">
+                                          <p:stCondLst>
+                                            <p:cond delay="0"/>
+                                          </p:stCondLst>
+                                        </p:cTn>
+                                        <p:tgtEl>
+                                          <p:spTgt spid="12"/>
+                                        </p:tgtEl>
+                                        <p:attrNameLst>
+                                          <p:attrName>style.visibility</p:attrName>
+                                        </p:attrNameLst>
+                                      </p:cBhvr>
+                                      <p:to>
+                                        <p:strVal val="visible"/>
+                                      </p:to>
+                                    </p:set>
+                                    <p:animEffect transition="in" filter="fade">
+                                      <p:cBhvr>
+                                        <p:cTn id="87" dur="500"/>
+                                        <p:tgtEl>
+                                          <p:spTgt spid="12"/>
+                                        </p:tgtEl>
+                                      </p:cBhvr>
+                                    </p:animEffect>
+                                  </p:childTnLst>
+                                </p:cTn>
+                              </p:par>
+                            </p:childTnLst>
+                          </p:cTn>
+                        </p:par>
+                      </p:childTnLst>
+                    </p:cTn>
+                  </p:par>
+                  <p:par>
+                    <p:cTn id="88" fill="hold">
+                      <p:stCondLst>
+                        <p:cond delay="indefinite"/>
+                      </p:stCondLst>
+                      <p:childTnLst>
+                        <p:par>
+                          <p:cTn id="89" fill="hold">
+                            <p:stCondLst>
+                              <p:cond delay="0"/>
+                            </p:stCondLst>
+                            <p:childTnLst>
+                              <p:par>
+                                <p:cTn id="90" presetID="10" presetClass="exit" presetSubtype="0" fill="hold" grpId="1" nodeType="clickEffect">
+                                  <p:stCondLst>
+                                    <p:cond delay="0"/>
+                                  </p:stCondLst>
+                                  <p:childTnLst>
+                                    <p:animEffect transition="out" filter="fade">
+                                      <p:cBhvr>
+                                        <p:cTn id="91" dur="500"/>
+                                        <p:tgtEl>
+                                          <p:spTgt spid="12"/>
+                                        </p:tgtEl>
+                                      </p:cBhvr>
+                                    </p:animEffect>
+                                    <p:set>
+                                      <p:cBhvr>
+                                        <p:cTn id="92" dur="1" fill="hold">
+                                          <p:stCondLst>
+                                            <p:cond delay="499"/>
+                                          </p:stCondLst>
+                                        </p:cTn>
+                                        <p:tgtEl>
+                                          <p:spTgt spid="12"/>
+                                        </p:tgtEl>
+                                        <p:attrNameLst>
+                                          <p:attrName>style.visibility</p:attrName>
+                                        </p:attrNameLst>
+                                      </p:cBhvr>
+                                      <p:to>
+                                        <p:strVal val="hidden"/>
+                                      </p:to>
+                                    </p:set>
+                                  </p:childTnLst>
+                                </p:cTn>
+                              </p:par>
+                            </p:childTnLst>
+                          </p:cTn>
+                        </p:par>
+                      </p:childTnLst>
+                    </p:cTn>
+                  </p:par>
+                </p:childTnLst>
+              </p:cTn>
+              <p:prevCondLst>
+                <p:cond evt="onPrev" delay="0">
+                  <p:tgtEl>
+                    <p:sldTgt/>
+                  </p:tgtEl>
+                </p:cond>
+              </p:prevCondLst>
+              <p:nextCondLst>
+                <p:cond evt="onNext" delay="0">
+                  <p:tgtEl>
+                    <p:sldTgt/>
+                  </p:tgtEl>
+                </p:cond>
+              </p:nextCondLst>
+            </p:seq>
+            <p:seq concurrent="1" nextAc="seek">
+              <p:cTn id="93" restart="whenNotActive" fill="hold" evtFilter="cancelBubble" nodeType="interactiveSeq">
+                <p:stCondLst>
+                  <p:cond evt="onClick" delay="0">
+                    <p:tgtEl>
+                      <p:spTgt spid="2"/>
+                    </p:tgtEl>
+                  </p:cond>
+                </p:stCondLst>
+                <p:endSync evt="end" delay="0">
+                  <p:rtn val="all"/>
+                </p:endSync>
+                <p:childTnLst>
+                  <p:par>
+                    <p:cTn id="94" fill="hold">
+                      <p:stCondLst>
+                        <p:cond delay="0"/>
+                      </p:stCondLst>
+                      <p:childTnLst>
+                        <p:par>
+                          <p:cTn id="95" fill="hold">
+                            <p:stCondLst>
+                              <p:cond delay="0"/>
+                            </p:stCondLst>
+                            <p:childTnLst>
+                              <p:par>
+                                <p:cTn id="96" presetID="10" presetClass="entr" presetSubtype="0" fill="hold" grpId="2" nodeType="clickEffect">
+                                  <p:stCondLst>
+                                    <p:cond delay="0"/>
+                                  </p:stCondLst>
+                                  <p:childTnLst>
+                                    <p:set>
+                                      <p:cBhvr>
+                                        <p:cTn id="97" dur="1" fill="hold">
+                                          <p:stCondLst>
+                                            <p:cond delay="0"/>
+                                          </p:stCondLst>
+                                        </p:cTn>
+                                        <p:tgtEl>
+                                          <p:spTgt spid="5"/>
+                                        </p:tgtEl>
+                                        <p:attrNameLst>
+                                          <p:attrName>style.visibility</p:attrName>
+                                        </p:attrNameLst>
+                                      </p:cBhvr>
+                                      <p:to>
+                                        <p:strVal val="visible"/>
+                                      </p:to>
+                                    </p:set>
+                                    <p:animEffect transition="in" filter="fade">
+                                      <p:cBhvr>
+                                        <p:cTn id="98" dur="500"/>
+                                        <p:tgtEl>
+                                          <p:spTgt spid="5"/>
+                                        </p:tgtEl>
+                                      </p:cBhvr>
+                                    </p:animEffect>
+                                  </p:childTnLst>
+                                </p:cTn>
+                              </p:par>
+                              <p:par>
+                                <p:cTn id="99" presetID="10" presetClass="entr" presetSubtype="0" fill="hold" grpId="2" nodeType="withEffect">
+                                  <p:stCondLst>
+                                    <p:cond delay="0"/>
+                                  </p:stCondLst>
+                                  <p:childTnLst>
+                                    <p:set>
+                                      <p:cBhvr>
+                                        <p:cTn id="100" dur="1" fill="hold">
+                                          <p:stCondLst>
+                                            <p:cond delay="0"/>
+                                          </p:stCondLst>
+                                        </p:cTn>
+                                        <p:tgtEl>
+                                          <p:spTgt spid="4"/>
+                                        </p:tgtEl>
+                                        <p:attrNameLst>
+                                          <p:attrName>style.visibility</p:attrName>
+                                        </p:attrNameLst>
+                                      </p:cBhvr>
+                                      <p:to>
+                                        <p:strVal val="visible"/>
+                                      </p:to>
+                                    </p:set>
+                                    <p:animEffect transition="in" filter="fade">
+                                      <p:cBhvr>
+                                        <p:cTn id="101" dur="500"/>
+                                        <p:tgtEl>
+                                          <p:spTgt spid="4"/>
+                                        </p:tgtEl>
+                                      </p:cBhvr>
+                                    </p:animEffect>
+                                  </p:childTnLst>
+                                </p:cTn>
+                              </p:par>
+                              <p:par>
+                                <p:cTn id="102" presetID="10" presetClass="entr" presetSubtype="0" fill="hold" grpId="2" nodeType="withEffect">
+                                  <p:stCondLst>
+                                    <p:cond delay="0"/>
+                                  </p:stCondLst>
+                                  <p:childTnLst>
+                                    <p:set>
+                                      <p:cBhvr>
+                                        <p:cTn id="103" dur="1" fill="hold">
+                                          <p:stCondLst>
+                                            <p:cond delay="0"/>
+                                          </p:stCondLst>
+                                        </p:cTn>
+                                        <p:tgtEl>
+                                          <p:spTgt spid="7"/>
+                                        </p:tgtEl>
+                                        <p:attrNameLst>
+                                          <p:attrName>style.visibility</p:attrName>
+                                        </p:attrNameLst>
+                                      </p:cBhvr>
+                                      <p:to>
+                                        <p:strVal val="visible"/>
+                                      </p:to>
+                                    </p:set>
+                                    <p:animEffect transition="in" filter="fade">
+                                      <p:cBhvr>
+                                        <p:cTn id="104" dur="500"/>
+                                        <p:tgtEl>
+                                          <p:spTgt spid="7"/>
+                                        </p:tgtEl>
+                                      </p:cBhvr>
+                                    </p:animEffect>
+                                  </p:childTnLst>
+                                </p:cTn>
+                              </p:par>
+                              <p:par>
+                                <p:cTn id="105" presetID="10" presetClass="entr" presetSubtype="0" fill="hold" grpId="2" nodeType="withEffect">
+                                  <p:stCondLst>
+                                    <p:cond delay="0"/>
+                                  </p:stCondLst>
+                                  <p:childTnLst>
+                                    <p:set>
+                                      <p:cBhvr>
+                                        <p:cTn id="106" dur="1" fill="hold">
+                                          <p:stCondLst>
+                                            <p:cond delay="0"/>
+                                          </p:stCondLst>
+                                        </p:cTn>
+                                        <p:tgtEl>
+                                          <p:spTgt spid="6"/>
+                                        </p:tgtEl>
+                                        <p:attrNameLst>
+                                          <p:attrName>style.visibility</p:attrName>
+                                        </p:attrNameLst>
+                                      </p:cBhvr>
+                                      <p:to>
+                                        <p:strVal val="visible"/>
+                                      </p:to>
+                                    </p:set>
+                                    <p:animEffect transition="in" filter="fade">
+                                      <p:cBhvr>
+                                        <p:cTn id="107" dur="500"/>
+                                        <p:tgtEl>
+                                          <p:spTgt spid="6"/>
+                                        </p:tgtEl>
+                                      </p:cBhvr>
+                                    </p:animEffect>
+                                  </p:childTnLst>
+                                </p:cTn>
+                              </p:par>
+                              <p:par>
+                                <p:cTn id="108" presetID="10" presetClass="entr" presetSubtype="0" fill="hold" grpId="2" nodeType="withEffect">
+                                  <p:stCondLst>
+                                    <p:cond delay="0"/>
+                                  </p:stCondLst>
+                                  <p:childTnLst>
+                                    <p:set>
+                                      <p:cBhvr>
+                                        <p:cTn id="109" dur="1" fill="hold">
+                                          <p:stCondLst>
+                                            <p:cond delay="0"/>
+                                          </p:stCondLst>
+                                        </p:cTn>
+                                        <p:tgtEl>
+                                          <p:spTgt spid="9"/>
+                                        </p:tgtEl>
+                                        <p:attrNameLst>
+                                          <p:attrName>style.visibility</p:attrName>
+                                        </p:attrNameLst>
+                                      </p:cBhvr>
+                                      <p:to>
+                                        <p:strVal val="visible"/>
+                                      </p:to>
+                                    </p:set>
+                                    <p:animEffect transition="in" filter="fade">
+                                      <p:cBhvr>
+                                        <p:cTn id="110" dur="500"/>
+                                        <p:tgtEl>
+                                          <p:spTgt spid="9"/>
+                                        </p:tgtEl>
+                                      </p:cBhvr>
+                                    </p:animEffect>
+                                  </p:childTnLst>
+                                </p:cTn>
+                              </p:par>
+                              <p:par>
+                                <p:cTn id="111" presetID="10" presetClass="entr" presetSubtype="0" fill="hold" grpId="2" nodeType="withEffect">
+                                  <p:stCondLst>
+                                    <p:cond delay="0"/>
+                                  </p:stCondLst>
+                                  <p:childTnLst>
+                                    <p:set>
+                                      <p:cBhvr>
+                                        <p:cTn id="112" dur="1" fill="hold">
+                                          <p:stCondLst>
+                                            <p:cond delay="0"/>
+                                          </p:stCondLst>
+                                        </p:cTn>
+                                        <p:tgtEl>
+                                          <p:spTgt spid="8"/>
+                                        </p:tgtEl>
+                                        <p:attrNameLst>
+                                          <p:attrName>style.visibility</p:attrName>
+                                        </p:attrNameLst>
+                                      </p:cBhvr>
+                                      <p:to>
+                                        <p:strVal val="visible"/>
+                                      </p:to>
+                                    </p:set>
+                                    <p:animEffect transition="in" filter="fade">
+                                      <p:cBhvr>
+                                        <p:cTn id="113" dur="500"/>
+                                        <p:tgtEl>
+                                          <p:spTgt spid="8"/>
+                                        </p:tgtEl>
+                                      </p:cBhvr>
+                                    </p:animEffect>
+                                  </p:childTnLst>
+                                </p:cTn>
+                              </p:par>
+                              <p:par>
+                                <p:cTn id="114" presetID="10" presetClass="entr" presetSubtype="0" fill="hold" grpId="2" nodeType="withEffect">
+                                  <p:stCondLst>
+                                    <p:cond delay="0"/>
+                                  </p:stCondLst>
+                                  <p:childTnLst>
+                                    <p:set>
+                                      <p:cBhvr>
+                                        <p:cTn id="115" dur="1" fill="hold">
+                                          <p:stCondLst>
+                                            <p:cond delay="0"/>
+                                          </p:stCondLst>
+                                        </p:cTn>
+                                        <p:tgtEl>
+                                          <p:spTgt spid="10"/>
+                                        </p:tgtEl>
+                                        <p:attrNameLst>
+                                          <p:attrName>style.visibility</p:attrName>
+                                        </p:attrNameLst>
+                                      </p:cBhvr>
+                                      <p:to>
+                                        <p:strVal val="visible"/>
+                                      </p:to>
+                                    </p:set>
+                                    <p:animEffect transition="in" filter="fade">
+                                      <p:cBhvr>
+                                        <p:cTn id="116" dur="500"/>
+                                        <p:tgtEl>
+                                          <p:spTgt spid="10"/>
+                                        </p:tgtEl>
+                                      </p:cBhvr>
+                                    </p:animEffect>
+                                  </p:childTnLst>
+                                </p:cTn>
+                              </p:par>
+                              <p:par>
+                                <p:cTn id="117" presetID="10" presetClass="entr" presetSubtype="0" fill="hold" grpId="2" nodeType="withEffect">
+                                  <p:stCondLst>
+                                    <p:cond delay="0"/>
+                                  </p:stCondLst>
+                                  <p:childTnLst>
+                                    <p:set>
+                                      <p:cBhvr>
+                                        <p:cTn id="118" dur="1" fill="hold">
+                                          <p:stCondLst>
+                                            <p:cond delay="0"/>
+                                          </p:stCondLst>
+                                        </p:cTn>
+                                        <p:tgtEl>
+                                          <p:spTgt spid="12"/>
+                                        </p:tgtEl>
+                                        <p:attrNameLst>
+                                          <p:attrName>style.visibility</p:attrName>
+                                        </p:attrNameLst>
+                                      </p:cBhvr>
+                                      <p:to>
+                                        <p:strVal val="visible"/>
+                                      </p:to>
+                                    </p:set>
+                                    <p:animEffect transition="in" filter="fade">
+                                      <p:cBhvr>
+                                        <p:cTn id="119" dur="500"/>
+                                        <p:tgtEl>
+                                          <p:spTgt spid="12"/>
+                                        </p:tgtEl>
+                                      </p:cBhvr>
+                                    </p:animEffect>
+                                  </p:childTnLst>
+                                </p:cTn>
+                              </p:par>
+                              <p:par>
+                                <p:cTn id="120" presetID="10" presetClass="entr" presetSubtype="0" fill="hold" grpId="2" nodeType="withEffect">
+                                  <p:stCondLst>
+                                    <p:cond delay="0"/>
+                                  </p:stCondLst>
+                                  <p:childTnLst>
+                                    <p:set>
+                                      <p:cBhvr>
+                                        <p:cTn id="121" dur="1" fill="hold">
+                                          <p:stCondLst>
+                                            <p:cond delay="0"/>
+                                          </p:stCondLst>
+                                        </p:cTn>
+                                        <p:tgtEl>
+                                          <p:spTgt spid="11"/>
+                                        </p:tgtEl>
+                                        <p:attrNameLst>
+                                          <p:attrName>style.visibility</p:attrName>
+                                        </p:attrNameLst>
+                                      </p:cBhvr>
+                                      <p:to>
+                                        <p:strVal val="visible"/>
+                                      </p:to>
+                                    </p:set>
+                                    <p:animEffect transition="in" filter="fade">
+                                      <p:cBhvr>
+                                        <p:cTn id="122" dur="500"/>
+                                        <p:tgtEl>
+                                          <p:spTgt spid="11"/>
+                                        </p:tgtEl>
+                                      </p:cBhvr>
+                                    </p:animEffect>
+                                  </p:childTnLst>
+                                </p:cTn>
+                              </p:par>
+                            </p:childTnLst>
+                          </p:cTn>
+                        </p:par>
+                      </p:childTnLst>
+                    </p:cTn>
+                  </p:par>
+                  <p:par>
+                    <p:cTn id="123" fill="hold">
+                      <p:stCondLst>
+                        <p:cond delay="indefinite"/>
+                      </p:stCondLst>
+                      <p:childTnLst>
+                        <p:par>
+                          <p:cTn id="124" fill="hold">
+                            <p:stCondLst>
+                              <p:cond delay="0"/>
+                            </p:stCondLst>
+                            <p:childTnLst>
+                              <p:par>
+                                <p:cTn id="125" presetID="10" presetClass="exit" presetSubtype="0" fill="hold" grpId="3" nodeType="clickEffect">
+                                  <p:stCondLst>
+                                    <p:cond delay="0"/>
+                                  </p:stCondLst>
+                                  <p:childTnLst>
+                                    <p:animEffect transition="out" filter="fade">
+                                      <p:cBhvr>
+                                        <p:cTn id="126" dur="500"/>
+                                        <p:tgtEl>
+                                          <p:spTgt spid="5"/>
+                                        </p:tgtEl>
+                                      </p:cBhvr>
+                                    </p:animEffect>
+                                    <p:set>
+                                      <p:cBhvr>
+                                        <p:cTn id="127" dur="1" fill="hold">
+                                          <p:stCondLst>
+                                            <p:cond delay="499"/>
+                                          </p:stCondLst>
+                                        </p:cTn>
+                                        <p:tgtEl>
+                                          <p:spTgt spid="5"/>
+                                        </p:tgtEl>
+                                        <p:attrNameLst>
+                                          <p:attrName>style.visibility</p:attrName>
+                                        </p:attrNameLst>
+                                      </p:cBhvr>
+                                      <p:to>
+                                        <p:strVal val="hidden"/>
+                                      </p:to>
+                                    </p:set>
+                                  </p:childTnLst>
+                                </p:cTn>
+                              </p:par>
+                              <p:par>
+                                <p:cTn id="128" presetID="10" presetClass="exit" presetSubtype="0" fill="hold" grpId="3" nodeType="withEffect">
+                                  <p:stCondLst>
+                                    <p:cond delay="0"/>
+                                  </p:stCondLst>
+                                  <p:childTnLst>
+                                    <p:animEffect transition="out" filter="fade">
+                                      <p:cBhvr>
+                                        <p:cTn id="129" dur="500"/>
+                                        <p:tgtEl>
+                                          <p:spTgt spid="4"/>
+                                        </p:tgtEl>
+                                      </p:cBhvr>
+                                    </p:animEffect>
+                                    <p:set>
+                                      <p:cBhvr>
+                                        <p:cTn id="130" dur="1" fill="hold">
+                                          <p:stCondLst>
+                                            <p:cond delay="499"/>
+                                          </p:stCondLst>
+                                        </p:cTn>
+                                        <p:tgtEl>
+                                          <p:spTgt spid="4"/>
+                                        </p:tgtEl>
+                                        <p:attrNameLst>
+                                          <p:attrName>style.visibility</p:attrName>
+                                        </p:attrNameLst>
+                                      </p:cBhvr>
+                                      <p:to>
+                                        <p:strVal val="hidden"/>
+                                      </p:to>
+                                    </p:set>
+                                  </p:childTnLst>
+                                </p:cTn>
+                              </p:par>
+                              <p:par>
+                                <p:cTn id="131" presetID="10" presetClass="exit" presetSubtype="0" fill="hold" grpId="3" nodeType="withEffect">
+                                  <p:stCondLst>
+                                    <p:cond delay="0"/>
+                                  </p:stCondLst>
+                                  <p:childTnLst>
+                                    <p:animEffect transition="out" filter="fade">
+                                      <p:cBhvr>
+                                        <p:cTn id="132" dur="500"/>
+                                        <p:tgtEl>
+                                          <p:spTgt spid="7"/>
+                                        </p:tgtEl>
+                                      </p:cBhvr>
+                                    </p:animEffect>
+                                    <p:set>
+                                      <p:cBhvr>
+                                        <p:cTn id="133" dur="1" fill="hold">
+                                          <p:stCondLst>
+                                            <p:cond delay="499"/>
+                                          </p:stCondLst>
+                                        </p:cTn>
+                                        <p:tgtEl>
+                                          <p:spTgt spid="7"/>
+                                        </p:tgtEl>
+                                        <p:attrNameLst>
+                                          <p:attrName>style.visibility</p:attrName>
+                                        </p:attrNameLst>
+                                      </p:cBhvr>
+                                      <p:to>
+                                        <p:strVal val="hidden"/>
+                                      </p:to>
+                                    </p:set>
+                                  </p:childTnLst>
+                                </p:cTn>
+                              </p:par>
+                              <p:par>
+                                <p:cTn id="134" presetID="10" presetClass="exit" presetSubtype="0" fill="hold" grpId="3" nodeType="withEffect">
+                                  <p:stCondLst>
+                                    <p:cond delay="0"/>
+                                  </p:stCondLst>
+                                  <p:childTnLst>
+                                    <p:animEffect transition="out" filter="fade">
+                                      <p:cBhvr>
+                                        <p:cTn id="135" dur="500"/>
+                                        <p:tgtEl>
+                                          <p:spTgt spid="6"/>
+                                        </p:tgtEl>
+                                      </p:cBhvr>
+                                    </p:animEffect>
+                                    <p:set>
+                                      <p:cBhvr>
+                                        <p:cTn id="136" dur="1" fill="hold">
+                                          <p:stCondLst>
+                                            <p:cond delay="499"/>
+                                          </p:stCondLst>
+                                        </p:cTn>
+                                        <p:tgtEl>
+                                          <p:spTgt spid="6"/>
+                                        </p:tgtEl>
+                                        <p:attrNameLst>
+                                          <p:attrName>style.visibility</p:attrName>
+                                        </p:attrNameLst>
+                                      </p:cBhvr>
+                                      <p:to>
+                                        <p:strVal val="hidden"/>
+                                      </p:to>
+                                    </p:set>
+                                  </p:childTnLst>
+                                </p:cTn>
+                              </p:par>
+                              <p:par>
+                                <p:cTn id="137" presetID="10" presetClass="exit" presetSubtype="0" fill="hold" grpId="3" nodeType="withEffect">
+                                  <p:stCondLst>
+                                    <p:cond delay="0"/>
+                                  </p:stCondLst>
+                                  <p:childTnLst>
+                                    <p:animEffect transition="out" filter="fade">
+                                      <p:cBhvr>
+                                        <p:cTn id="138" dur="500"/>
+                                        <p:tgtEl>
+                                          <p:spTgt spid="9"/>
+                                        </p:tgtEl>
+                                      </p:cBhvr>
+                                    </p:animEffect>
+                                    <p:set>
+                                      <p:cBhvr>
+                                        <p:cTn id="139" dur="1" fill="hold">
+                                          <p:stCondLst>
+                                            <p:cond delay="499"/>
+                                          </p:stCondLst>
+                                        </p:cTn>
+                                        <p:tgtEl>
+                                          <p:spTgt spid="9"/>
+                                        </p:tgtEl>
+                                        <p:attrNameLst>
+                                          <p:attrName>style.visibility</p:attrName>
+                                        </p:attrNameLst>
+                                      </p:cBhvr>
+                                      <p:to>
+                                        <p:strVal val="hidden"/>
+                                      </p:to>
+                                    </p:set>
+                                  </p:childTnLst>
+                                </p:cTn>
+                              </p:par>
+                              <p:par>
+                                <p:cTn id="140" presetID="10" presetClass="exit" presetSubtype="0" fill="hold" grpId="3" nodeType="withEffect">
+                                  <p:stCondLst>
+                                    <p:cond delay="0"/>
+                                  </p:stCondLst>
+                                  <p:childTnLst>
+                                    <p:animEffect transition="out" filter="fade">
+                                      <p:cBhvr>
+                                        <p:cTn id="141" dur="500"/>
+                                        <p:tgtEl>
+                                          <p:spTgt spid="8"/>
+                                        </p:tgtEl>
+                                      </p:cBhvr>
+                                    </p:animEffect>
+                                    <p:set>
+                                      <p:cBhvr>
+                                        <p:cTn id="142" dur="1" fill="hold">
+                                          <p:stCondLst>
+                                            <p:cond delay="499"/>
+                                          </p:stCondLst>
+                                        </p:cTn>
+                                        <p:tgtEl>
+                                          <p:spTgt spid="8"/>
+                                        </p:tgtEl>
+                                        <p:attrNameLst>
+                                          <p:attrName>style.visibility</p:attrName>
+                                        </p:attrNameLst>
+                                      </p:cBhvr>
+                                      <p:to>
+                                        <p:strVal val="hidden"/>
+                                      </p:to>
+                                    </p:set>
+                                  </p:childTnLst>
+                                </p:cTn>
+                              </p:par>
+                              <p:par>
+                                <p:cTn id="143" presetID="10" presetClass="exit" presetSubtype="0" fill="hold" grpId="3" nodeType="withEffect">
+                                  <p:stCondLst>
+                                    <p:cond delay="0"/>
+                                  </p:stCondLst>
+                                  <p:childTnLst>
+                                    <p:animEffect transition="out" filter="fade">
+                                      <p:cBhvr>
+                                        <p:cTn id="144" dur="500"/>
+                                        <p:tgtEl>
+                                          <p:spTgt spid="10"/>
+                                        </p:tgtEl>
+                                      </p:cBhvr>
+                                    </p:animEffect>
+                                    <p:set>
+                                      <p:cBhvr>
+                                        <p:cTn id="145" dur="1" fill="hold">
+                                          <p:stCondLst>
+                                            <p:cond delay="499"/>
+                                          </p:stCondLst>
+                                        </p:cTn>
+                                        <p:tgtEl>
+                                          <p:spTgt spid="10"/>
+                                        </p:tgtEl>
+                                        <p:attrNameLst>
+                                          <p:attrName>style.visibility</p:attrName>
+                                        </p:attrNameLst>
+                                      </p:cBhvr>
+                                      <p:to>
+                                        <p:strVal val="hidden"/>
+                                      </p:to>
+                                    </p:set>
+                                  </p:childTnLst>
+                                </p:cTn>
+                              </p:par>
+                              <p:par>
+                                <p:cTn id="146" presetID="10" presetClass="exit" presetSubtype="0" fill="hold" grpId="3" nodeType="withEffect">
+                                  <p:stCondLst>
+                                    <p:cond delay="0"/>
+                                  </p:stCondLst>
+                                  <p:childTnLst>
+                                    <p:animEffect transition="out" filter="fade">
+                                      <p:cBhvr>
+                                        <p:cTn id="147" dur="500"/>
+                                        <p:tgtEl>
+                                          <p:spTgt spid="12"/>
+                                        </p:tgtEl>
+                                      </p:cBhvr>
+                                    </p:animEffect>
+                                    <p:set>
+                                      <p:cBhvr>
+                                        <p:cTn id="148" dur="1" fill="hold">
+                                          <p:stCondLst>
+                                            <p:cond delay="499"/>
+                                          </p:stCondLst>
+                                        </p:cTn>
+                                        <p:tgtEl>
+                                          <p:spTgt spid="12"/>
+                                        </p:tgtEl>
+                                        <p:attrNameLst>
+                                          <p:attrName>style.visibility</p:attrName>
+                                        </p:attrNameLst>
+                                      </p:cBhvr>
+                                      <p:to>
+                                        <p:strVal val="hidden"/>
+                                      </p:to>
+                                    </p:set>
+                                  </p:childTnLst>
+                                </p:cTn>
+                              </p:par>
+                              <p:par>
+                                <p:cTn id="149" presetID="10" presetClass="exit" presetSubtype="0" fill="hold" grpId="3" nodeType="withEffect">
+                                  <p:stCondLst>
+                                    <p:cond delay="0"/>
+                                  </p:stCondLst>
+                                  <p:childTnLst>
+                                    <p:animEffect transition="out" filter="fade">
+                                      <p:cBhvr>
+                                        <p:cTn id="150" dur="500"/>
+                                        <p:tgtEl>
+                                          <p:spTgt spid="11"/>
+                                        </p:tgtEl>
+                                      </p:cBhvr>
+                                    </p:animEffect>
+                                    <p:set>
+                                      <p:cBhvr>
+                                        <p:cTn id="151" dur="1" fill="hold">
+                                          <p:stCondLst>
+                                            <p:cond delay="499"/>
+                                          </p:stCondLst>
+                                        </p:cTn>
+                                        <p:tgtEl>
+                                          <p:spTgt spid="11"/>
+                                        </p:tgtEl>
+                                        <p:attrNameLst>
+                                          <p:attrName>style.visibility</p:attrName>
+                                        </p:attrNameLst>
+                                      </p:cBhvr>
+                                      <p:to>
+                                        <p:strVal val="hidden"/>
+                                      </p:to>
+                                    </p:set>
+                                  </p:childTnLst>
+                                </p:cTn>
+                              </p:par>
+                            </p:childTnLst>
+                          </p:cTn>
+                        </p:par>
+                      </p:childTnLst>
+                    </p:cTn>
+                  </p:par>
+                </p:childTnLst>
+              </p:cTn>
+              <p:nextCondLst>
+                <p:cond evt="onClick" delay="0">
+                  <p:tgtEl>
+                    <p:spTgt spid="2"/>
+                  </p:tgtEl>
+                </p:cond>
+              </p:nextCondLst>
+            </p:seq>
+          </p:childTnLst>
+        </p:cTn>
+      </p:par>
+    </p:tnLst>
+    <p:bldLst>
+      <p:bldP spid="5" grpId="0" animBg="1"/>
+      <p:bldP spid="5" grpId="1" animBg="1"/>
+      <p:bldP spid="5" grpId="2" animBg="1"/>
+      <p:bldP spid="5" grpId="3" animBg="1"/>
+      <p:bldP spid="4" grpId="0" animBg="1"/>
+      <p:bldP spid="4" grpId="1" animBg="1"/>
+      <p:bldP spid="4" grpId="2" animBg="1"/>
+      <p:bldP spid="4" grpId="3" animBg="1"/>
+      <p:bldP spid="6" grpId="0" animBg="1"/>
+      <p:bldP spid="6" grpId="1" animBg="1"/>
+      <p:bldP spid="6" grpId="2" animBg="1"/>
+      <p:bldP spid="6" grpId="3" animBg="1"/>
+      <p:bldP spid="7" grpId="0" animBg="1"/>
+      <p:bldP spid="7" grpId="1" animBg="1"/>
+      <p:bldP spid="7" grpId="2" animBg="1"/>
+      <p:bldP spid="7" grpId="3" animBg="1"/>
+      <p:bldP spid="8" grpId="0" animBg="1"/>
+      <p:bldP spid="8" grpId="1" animBg="1"/>
+      <p:bldP spid="8" grpId="2" animBg="1"/>
+      <p:bldP spid="8" grpId="3" animBg="1"/>
+      <p:bldP spid="9" grpId="0" animBg="1"/>
+      <p:bldP spid="9" grpId="1" animBg="1"/>
+      <p:bldP spid="9" grpId="2" animBg="1"/>
+      <p:bldP spid="9" grpId="3" animBg="1"/>
+      <p:bldP spid="10" grpId="0" animBg="1"/>
+      <p:bldP spid="10" grpId="1" animBg="1"/>
+      <p:bldP spid="10" grpId="2" animBg="1"/>
+      <p:bldP spid="10" grpId="3" animBg="1"/>
+      <p:bldP spid="11" grpId="0" animBg="1"/>
+      <p:bldP spid="11" grpId="1" animBg="1"/>
+      <p:bldP spid="11" grpId="2" animBg="1"/>
+      <p:bldP spid="11" grpId="3" animBg="1"/>
+      <p:bldP spid="12" grpId="0" animBg="1"/>
+      <p:bldP spid="12" grpId="1" animBg="1"/>
+      <p:bldP spid="12" grpId="2" animBg="1"/>
+      <p:bldP spid="12" grpId="3" animBg="1"/>
+    </p:bldLst>
+  </p:timing>
+</p:sld>
+</file>
+
+<file path=ppt/slides/slide15.xml><?xml version="1.0" encoding="utf-8"?>
 <p:sld xmlns:a="http://schemas.openxmlformats.org/drawingml/2006/main" xmlns:r="http://schemas.openxmlformats.org/officeDocument/2006/relationships" xmlns:p="http://schemas.openxmlformats.org/presentationml/2006/main" show="0">
   <p:cSld name="PPTLabsAcknowledgementSlide">
     <p:spTree>

</xml_diff>